<commit_message>
modified characters to be from custom stable diffusion prompts
</commit_message>
<xml_diff>
--- a/bert-fine-tuning.pptx
+++ b/bert-fine-tuning.pptx
@@ -5,20 +5,18 @@
     <p:sldMasterId id="2147483648" r:id="rId1"/>
   </p:sldMasterIdLst>
   <p:notesMasterIdLst>
-    <p:notesMasterId r:id="rId13"/>
+    <p:notesMasterId r:id="rId11"/>
   </p:notesMasterIdLst>
   <p:sldIdLst>
     <p:sldId id="256" r:id="rId2"/>
     <p:sldId id="259" r:id="rId3"/>
-    <p:sldId id="271" r:id="rId4"/>
+    <p:sldId id="269" r:id="rId4"/>
     <p:sldId id="267" r:id="rId5"/>
-    <p:sldId id="269" r:id="rId6"/>
-    <p:sldId id="270" r:id="rId7"/>
-    <p:sldId id="268" r:id="rId8"/>
-    <p:sldId id="263" r:id="rId9"/>
-    <p:sldId id="265" r:id="rId10"/>
-    <p:sldId id="264" r:id="rId11"/>
-    <p:sldId id="266" r:id="rId12"/>
+    <p:sldId id="268" r:id="rId6"/>
+    <p:sldId id="263" r:id="rId7"/>
+    <p:sldId id="271" r:id="rId8"/>
+    <p:sldId id="264" r:id="rId9"/>
+    <p:sldId id="266" r:id="rId10"/>
   </p:sldIdLst>
   <p:sldSz cx="12192000" cy="6858000"/>
   <p:notesSz cx="6858000" cy="9144000"/>
@@ -117,6 +115,11 @@
       </a:defRPr>
     </a:lvl9pPr>
   </p:defaultTextStyle>
+  <p:extLst>
+    <p:ext uri="{EFAFB233-063F-42B5-8137-9DF3F51BA10A}">
+      <p15:sldGuideLst xmlns:p15="http://schemas.microsoft.com/office/powerpoint/2012/main"/>
+    </p:ext>
+  </p:extLst>
 </p:presentation>
 </file>
 
@@ -202,7 +205,7 @@
           <a:p>
             <a:fld id="{30CB70B9-F0F0-444C-8F79-91952E7D545E}" type="datetimeFigureOut">
               <a:rPr lang="en-US" smtClean="0"/>
-              <a:t>4/9/23</a:t>
+              <a:t>4/12/23</a:t>
             </a:fld>
             <a:endParaRPr lang="en-US"/>
           </a:p>
@@ -534,7 +537,7 @@
           <a:p>
             <a:fld id="{D9004DD6-F74A-5D41-9858-124FE7317CA6}" type="slidenum">
               <a:rPr lang="en-US" smtClean="0"/>
-              <a:t>2</a:t>
+              <a:t>1</a:t>
             </a:fld>
             <a:endParaRPr lang="en-US"/>
           </a:p>
@@ -543,7 +546,7 @@
     </p:spTree>
     <p:extLst>
       <p:ext uri="{BB962C8B-B14F-4D97-AF65-F5344CB8AC3E}">
-        <p14:creationId xmlns:p14="http://schemas.microsoft.com/office/powerpoint/2010/main" val="4109142031"/>
+        <p14:creationId xmlns:p14="http://schemas.microsoft.com/office/powerpoint/2010/main" val="3501914391"/>
       </p:ext>
     </p:extLst>
   </p:cSld>
@@ -618,7 +621,7 @@
           <a:p>
             <a:fld id="{D9004DD6-F74A-5D41-9858-124FE7317CA6}" type="slidenum">
               <a:rPr lang="en-US" smtClean="0"/>
-              <a:t>3</a:t>
+              <a:t>2</a:t>
             </a:fld>
             <a:endParaRPr lang="en-US"/>
           </a:p>
@@ -627,7 +630,7 @@
     </p:spTree>
     <p:extLst>
       <p:ext uri="{BB962C8B-B14F-4D97-AF65-F5344CB8AC3E}">
-        <p14:creationId xmlns:p14="http://schemas.microsoft.com/office/powerpoint/2010/main" val="1710479310"/>
+        <p14:creationId xmlns:p14="http://schemas.microsoft.com/office/powerpoint/2010/main" val="4109142031"/>
       </p:ext>
     </p:extLst>
   </p:cSld>
@@ -702,7 +705,7 @@
           <a:p>
             <a:fld id="{D9004DD6-F74A-5D41-9858-124FE7317CA6}" type="slidenum">
               <a:rPr lang="en-US" smtClean="0"/>
-              <a:t>5</a:t>
+              <a:t>3</a:t>
             </a:fld>
             <a:endParaRPr lang="en-US"/>
           </a:p>
@@ -795,7 +798,7 @@
     </p:spTree>
     <p:extLst>
       <p:ext uri="{BB962C8B-B14F-4D97-AF65-F5344CB8AC3E}">
-        <p14:creationId xmlns:p14="http://schemas.microsoft.com/office/powerpoint/2010/main" val="2936334189"/>
+        <p14:creationId xmlns:p14="http://schemas.microsoft.com/office/powerpoint/2010/main" val="1799015281"/>
       </p:ext>
     </p:extLst>
   </p:cSld>
@@ -870,7 +873,7 @@
           <a:p>
             <a:fld id="{D9004DD6-F74A-5D41-9858-124FE7317CA6}" type="slidenum">
               <a:rPr lang="en-US" smtClean="0"/>
-              <a:t>8</a:t>
+              <a:t>7</a:t>
             </a:fld>
             <a:endParaRPr lang="en-US"/>
           </a:p>
@@ -879,91 +882,7 @@
     </p:spTree>
     <p:extLst>
       <p:ext uri="{BB962C8B-B14F-4D97-AF65-F5344CB8AC3E}">
-        <p14:creationId xmlns:p14="http://schemas.microsoft.com/office/powerpoint/2010/main" val="1799015281"/>
-      </p:ext>
-    </p:extLst>
-  </p:cSld>
-  <p:clrMapOvr>
-    <a:masterClrMapping/>
-  </p:clrMapOvr>
-</p:notes>
-</file>
-
-<file path=ppt/notesSlides/notesSlide6.xml><?xml version="1.0" encoding="utf-8"?>
-<p:notes xmlns:a="http://schemas.openxmlformats.org/drawingml/2006/main" xmlns:r="http://schemas.openxmlformats.org/officeDocument/2006/relationships" xmlns:p="http://schemas.openxmlformats.org/presentationml/2006/main">
-  <p:cSld>
-    <p:spTree>
-      <p:nvGrpSpPr>
-        <p:cNvPr id="1" name=""/>
-        <p:cNvGrpSpPr/>
-        <p:nvPr/>
-      </p:nvGrpSpPr>
-      <p:grpSpPr>
-        <a:xfrm>
-          <a:off x="0" y="0"/>
-          <a:ext cx="0" cy="0"/>
-          <a:chOff x="0" y="0"/>
-          <a:chExt cx="0" cy="0"/>
-        </a:xfrm>
-      </p:grpSpPr>
-      <p:sp>
-        <p:nvSpPr>
-          <p:cNvPr id="2" name="Slide Image Placeholder 1"/>
-          <p:cNvSpPr>
-            <a:spLocks noGrp="1" noRot="1" noChangeAspect="1"/>
-          </p:cNvSpPr>
-          <p:nvPr>
-            <p:ph type="sldImg"/>
-          </p:nvPr>
-        </p:nvSpPr>
-        <p:spPr/>
-      </p:sp>
-      <p:sp>
-        <p:nvSpPr>
-          <p:cNvPr id="3" name="Notes Placeholder 2"/>
-          <p:cNvSpPr>
-            <a:spLocks noGrp="1"/>
-          </p:cNvSpPr>
-          <p:nvPr>
-            <p:ph type="body" idx="1"/>
-          </p:nvPr>
-        </p:nvSpPr>
-        <p:spPr/>
-        <p:txBody>
-          <a:bodyPr/>
-          <a:lstStyle/>
-          <a:p>
-            <a:endParaRPr lang="en-US" dirty="0"/>
-          </a:p>
-        </p:txBody>
-      </p:sp>
-      <p:sp>
-        <p:nvSpPr>
-          <p:cNvPr id="4" name="Slide Number Placeholder 3"/>
-          <p:cNvSpPr>
-            <a:spLocks noGrp="1"/>
-          </p:cNvSpPr>
-          <p:nvPr>
-            <p:ph type="sldNum" sz="quarter" idx="5"/>
-          </p:nvPr>
-        </p:nvSpPr>
-        <p:spPr/>
-        <p:txBody>
-          <a:bodyPr/>
-          <a:lstStyle/>
-          <a:p>
-            <a:fld id="{D9004DD6-F74A-5D41-9858-124FE7317CA6}" type="slidenum">
-              <a:rPr lang="en-US" smtClean="0"/>
-              <a:t>9</a:t>
-            </a:fld>
-            <a:endParaRPr lang="en-US"/>
-          </a:p>
-        </p:txBody>
-      </p:sp>
-    </p:spTree>
-    <p:extLst>
-      <p:ext uri="{BB962C8B-B14F-4D97-AF65-F5344CB8AC3E}">
-        <p14:creationId xmlns:p14="http://schemas.microsoft.com/office/powerpoint/2010/main" val="2978216986"/>
+        <p14:creationId xmlns:p14="http://schemas.microsoft.com/office/powerpoint/2010/main" val="3887847197"/>
       </p:ext>
     </p:extLst>
   </p:cSld>
@@ -1120,7 +1039,7 @@
           <a:p>
             <a:fld id="{846D818F-93E2-AF49-BE7C-1303E1C61400}" type="datetimeFigureOut">
               <a:rPr lang="en-US" smtClean="0"/>
-              <a:t>4/9/23</a:t>
+              <a:t>4/12/23</a:t>
             </a:fld>
             <a:endParaRPr lang="en-US"/>
           </a:p>
@@ -1318,7 +1237,7 @@
           <a:p>
             <a:fld id="{846D818F-93E2-AF49-BE7C-1303E1C61400}" type="datetimeFigureOut">
               <a:rPr lang="en-US" smtClean="0"/>
-              <a:t>4/9/23</a:t>
+              <a:t>4/12/23</a:t>
             </a:fld>
             <a:endParaRPr lang="en-US"/>
           </a:p>
@@ -1526,7 +1445,7 @@
           <a:p>
             <a:fld id="{846D818F-93E2-AF49-BE7C-1303E1C61400}" type="datetimeFigureOut">
               <a:rPr lang="en-US" smtClean="0"/>
-              <a:t>4/9/23</a:t>
+              <a:t>4/12/23</a:t>
             </a:fld>
             <a:endParaRPr lang="en-US"/>
           </a:p>
@@ -1724,7 +1643,7 @@
           <a:p>
             <a:fld id="{846D818F-93E2-AF49-BE7C-1303E1C61400}" type="datetimeFigureOut">
               <a:rPr lang="en-US" smtClean="0"/>
-              <a:t>4/9/23</a:t>
+              <a:t>4/12/23</a:t>
             </a:fld>
             <a:endParaRPr lang="en-US"/>
           </a:p>
@@ -1999,7 +1918,7 @@
           <a:p>
             <a:fld id="{846D818F-93E2-AF49-BE7C-1303E1C61400}" type="datetimeFigureOut">
               <a:rPr lang="en-US" smtClean="0"/>
-              <a:t>4/9/23</a:t>
+              <a:t>4/12/23</a:t>
             </a:fld>
             <a:endParaRPr lang="en-US"/>
           </a:p>
@@ -2264,7 +2183,7 @@
           <a:p>
             <a:fld id="{846D818F-93E2-AF49-BE7C-1303E1C61400}" type="datetimeFigureOut">
               <a:rPr lang="en-US" smtClean="0"/>
-              <a:t>4/9/23</a:t>
+              <a:t>4/12/23</a:t>
             </a:fld>
             <a:endParaRPr lang="en-US"/>
           </a:p>
@@ -2676,7 +2595,7 @@
           <a:p>
             <a:fld id="{846D818F-93E2-AF49-BE7C-1303E1C61400}" type="datetimeFigureOut">
               <a:rPr lang="en-US" smtClean="0"/>
-              <a:t>4/9/23</a:t>
+              <a:t>4/12/23</a:t>
             </a:fld>
             <a:endParaRPr lang="en-US"/>
           </a:p>
@@ -2817,7 +2736,7 @@
           <a:p>
             <a:fld id="{846D818F-93E2-AF49-BE7C-1303E1C61400}" type="datetimeFigureOut">
               <a:rPr lang="en-US" smtClean="0"/>
-              <a:t>4/9/23</a:t>
+              <a:t>4/12/23</a:t>
             </a:fld>
             <a:endParaRPr lang="en-US"/>
           </a:p>
@@ -2930,7 +2849,7 @@
           <a:p>
             <a:fld id="{846D818F-93E2-AF49-BE7C-1303E1C61400}" type="datetimeFigureOut">
               <a:rPr lang="en-US" smtClean="0"/>
-              <a:t>4/9/23</a:t>
+              <a:t>4/12/23</a:t>
             </a:fld>
             <a:endParaRPr lang="en-US"/>
           </a:p>
@@ -3241,7 +3160,7 @@
           <a:p>
             <a:fld id="{846D818F-93E2-AF49-BE7C-1303E1C61400}" type="datetimeFigureOut">
               <a:rPr lang="en-US" smtClean="0"/>
-              <a:t>4/9/23</a:t>
+              <a:t>4/12/23</a:t>
             </a:fld>
             <a:endParaRPr lang="en-US"/>
           </a:p>
@@ -3529,7 +3448,7 @@
           <a:p>
             <a:fld id="{846D818F-93E2-AF49-BE7C-1303E1C61400}" type="datetimeFigureOut">
               <a:rPr lang="en-US" smtClean="0"/>
-              <a:t>4/9/23</a:t>
+              <a:t>4/12/23</a:t>
             </a:fld>
             <a:endParaRPr lang="en-US"/>
           </a:p>
@@ -3770,7 +3689,7 @@
           <a:p>
             <a:fld id="{846D818F-93E2-AF49-BE7C-1303E1C61400}" type="datetimeFigureOut">
               <a:rPr lang="en-US" smtClean="0"/>
-              <a:t>4/9/23</a:t>
+              <a:t>4/12/23</a:t>
             </a:fld>
             <a:endParaRPr lang="en-US"/>
           </a:p>
@@ -4319,7 +4238,7 @@
           <p:nvPr/>
         </p:nvPicPr>
         <p:blipFill rotWithShape="1">
-          <a:blip r:embed="rId2"/>
+          <a:blip r:embed="rId3"/>
           <a:srcRect t="8980" r="2" b="2"/>
           <a:stretch/>
         </p:blipFill>
@@ -4508,7 +4427,7 @@
         </p:nvSpPr>
         <p:spPr>
           <a:xfrm>
-            <a:off x="6343650" y="4572000"/>
+            <a:off x="6405642" y="4062675"/>
             <a:ext cx="5395975" cy="1080809"/>
           </a:xfrm>
         </p:spPr>
@@ -4546,7 +4465,7 @@
         </p:nvSpPr>
         <p:spPr>
           <a:xfrm>
-            <a:off x="6343650" y="5709565"/>
+            <a:off x="6768105" y="5237450"/>
             <a:ext cx="5395975" cy="646785"/>
           </a:xfrm>
         </p:spPr>
@@ -4581,7 +4500,7 @@
           <p:nvPr/>
         </p:nvPicPr>
         <p:blipFill rotWithShape="1">
-          <a:blip r:embed="rId3"/>
+          <a:blip r:embed="rId4"/>
           <a:srcRect t="14569" r="-1" b="-1"/>
           <a:stretch/>
         </p:blipFill>
@@ -4659,341 +4578,87 @@
           </a:custGeom>
         </p:spPr>
       </p:pic>
+      <p:sp>
+        <p:nvSpPr>
+          <p:cNvPr id="4" name="TextBox 3">
+            <a:extLst>
+              <a:ext uri="{FF2B5EF4-FFF2-40B4-BE49-F238E27FC236}">
+                <a16:creationId xmlns:a16="http://schemas.microsoft.com/office/drawing/2014/main" id="{C0ED9DD3-DCB6-A3B9-BCFF-03EF7A9E4AEB}"/>
+              </a:ext>
+            </a:extLst>
+          </p:cNvPr>
+          <p:cNvSpPr txBox="1"/>
+          <p:nvPr/>
+        </p:nvSpPr>
+        <p:spPr>
+          <a:xfrm>
+            <a:off x="8019832" y="5937431"/>
+            <a:ext cx="4172168" cy="830997"/>
+          </a:xfrm>
+          <a:prstGeom prst="rect">
+            <a:avLst/>
+          </a:prstGeom>
+          <a:noFill/>
+        </p:spPr>
+        <p:txBody>
+          <a:bodyPr wrap="none" rtlCol="0">
+            <a:spAutoFit/>
+          </a:bodyPr>
+          <a:lstStyle/>
+          <a:p>
+            <a:r>
+              <a:rPr lang="en-US" sz="1200" dirty="0">
+                <a:solidFill>
+                  <a:srgbClr val="9616A0"/>
+                </a:solidFill>
+              </a:rPr>
+              <a:t>Images generated by stable-diffusion. </a:t>
+            </a:r>
+          </a:p>
+          <a:p>
+            <a:r>
+              <a:rPr lang="en-US" sz="1200" dirty="0">
+                <a:solidFill>
+                  <a:srgbClr val="9616A0"/>
+                </a:solidFill>
+              </a:rPr>
+              <a:t>Prompts: </a:t>
+            </a:r>
+          </a:p>
+          <a:p>
+            <a:pPr marL="171450" indent="-171450">
+              <a:buFont typeface="Arial" panose="020B0604020202020204" pitchFamily="34" charset="0"/>
+              <a:buChar char="•"/>
+            </a:pPr>
+            <a:r>
+              <a:rPr lang="en-US" sz="1200" dirty="0">
+                <a:solidFill>
+                  <a:srgbClr val="9616A0"/>
+                </a:solidFill>
+              </a:rPr>
+              <a:t>Ernie from sesame street is a DJ with headphones on one ear</a:t>
+            </a:r>
+          </a:p>
+          <a:p>
+            <a:pPr marL="171450" indent="-171450">
+              <a:buFont typeface="Arial" panose="020B0604020202020204" pitchFamily="34" charset="0"/>
+              <a:buChar char="•"/>
+            </a:pPr>
+            <a:r>
+              <a:rPr lang="en-US" sz="1200" dirty="0">
+                <a:solidFill>
+                  <a:srgbClr val="9616A0"/>
+                </a:solidFill>
+              </a:rPr>
+              <a:t>Bert from sesame street dressed as a synthesizer</a:t>
+            </a:r>
+          </a:p>
+        </p:txBody>
+      </p:sp>
     </p:spTree>
     <p:extLst>
       <p:ext uri="{BB962C8B-B14F-4D97-AF65-F5344CB8AC3E}">
         <p14:creationId xmlns:p14="http://schemas.microsoft.com/office/powerpoint/2010/main" val="3828472501"/>
-      </p:ext>
-    </p:extLst>
-  </p:cSld>
-  <p:clrMapOvr>
-    <a:masterClrMapping/>
-  </p:clrMapOvr>
-</p:sld>
-</file>
-
-<file path=ppt/slides/slide10.xml><?xml version="1.0" encoding="utf-8"?>
-<p:sld xmlns:a="http://schemas.openxmlformats.org/drawingml/2006/main" xmlns:r="http://schemas.openxmlformats.org/officeDocument/2006/relationships" xmlns:p="http://schemas.openxmlformats.org/presentationml/2006/main">
-  <p:cSld>
-    <p:spTree>
-      <p:nvGrpSpPr>
-        <p:cNvPr id="1" name=""/>
-        <p:cNvGrpSpPr/>
-        <p:nvPr/>
-      </p:nvGrpSpPr>
-      <p:grpSpPr>
-        <a:xfrm>
-          <a:off x="0" y="0"/>
-          <a:ext cx="0" cy="0"/>
-          <a:chOff x="0" y="0"/>
-          <a:chExt cx="0" cy="0"/>
-        </a:xfrm>
-      </p:grpSpPr>
-      <p:sp>
-        <p:nvSpPr>
-          <p:cNvPr id="2" name="Title 1">
-            <a:extLst>
-              <a:ext uri="{FF2B5EF4-FFF2-40B4-BE49-F238E27FC236}">
-                <a16:creationId xmlns:a16="http://schemas.microsoft.com/office/drawing/2014/main" id="{6C30AB85-D04F-4EE5-8BAF-0F9816B94B29}"/>
-              </a:ext>
-            </a:extLst>
-          </p:cNvPr>
-          <p:cNvSpPr>
-            <a:spLocks noGrp="1"/>
-          </p:cNvSpPr>
-          <p:nvPr>
-            <p:ph type="title"/>
-          </p:nvPr>
-        </p:nvSpPr>
-        <p:spPr/>
-        <p:txBody>
-          <a:bodyPr/>
-          <a:lstStyle/>
-          <a:p>
-            <a:r>
-              <a:rPr lang="en-US" dirty="0">
-                <a:latin typeface="Arial Rounded MT Bold" panose="020F0704030504030204" pitchFamily="34" charset="77"/>
-              </a:rPr>
-              <a:t>Transfer Learning</a:t>
-            </a:r>
-          </a:p>
-        </p:txBody>
-      </p:sp>
-      <p:sp>
-        <p:nvSpPr>
-          <p:cNvPr id="3" name="Content Placeholder 2">
-            <a:extLst>
-              <a:ext uri="{FF2B5EF4-FFF2-40B4-BE49-F238E27FC236}">
-                <a16:creationId xmlns:a16="http://schemas.microsoft.com/office/drawing/2014/main" id="{9A39B4AB-ADF5-A47E-1380-B2992815D3DB}"/>
-              </a:ext>
-            </a:extLst>
-          </p:cNvPr>
-          <p:cNvSpPr>
-            <a:spLocks noGrp="1"/>
-          </p:cNvSpPr>
-          <p:nvPr>
-            <p:ph idx="1"/>
-          </p:nvPr>
-        </p:nvSpPr>
-        <p:spPr/>
-        <p:txBody>
-          <a:bodyPr>
-            <a:normAutofit/>
-          </a:bodyPr>
-          <a:lstStyle/>
-          <a:p>
-            <a:pPr marL="0" indent="0" algn="l">
-              <a:buNone/>
-            </a:pPr>
-            <a:r>
-              <a:rPr lang="en-US" sz="1400" b="0" i="0" dirty="0">
-                <a:solidFill>
-                  <a:srgbClr val="202122"/>
-                </a:solidFill>
-                <a:effectLst/>
-                <a:latin typeface="Arial" panose="020B0604020202020204" pitchFamily="34" charset="0"/>
-              </a:rPr>
-              <a:t>From Wikipedia</a:t>
-            </a:r>
-          </a:p>
-          <a:p>
-            <a:pPr marL="0" indent="0" algn="l">
-              <a:buNone/>
-            </a:pPr>
-            <a:r>
-              <a:rPr lang="en-US" b="1" i="0" dirty="0">
-                <a:solidFill>
-                  <a:srgbClr val="202122"/>
-                </a:solidFill>
-                <a:effectLst/>
-                <a:latin typeface="Arial" panose="020B0604020202020204" pitchFamily="34" charset="0"/>
-              </a:rPr>
-              <a:t>Transfer learning</a:t>
-            </a:r>
-            <a:r>
-              <a:rPr lang="en-US" b="0" i="0" dirty="0">
-                <a:solidFill>
-                  <a:srgbClr val="202122"/>
-                </a:solidFill>
-                <a:effectLst/>
-                <a:latin typeface="Arial" panose="020B0604020202020204" pitchFamily="34" charset="0"/>
-              </a:rPr>
-              <a:t> (</a:t>
-            </a:r>
-            <a:r>
-              <a:rPr lang="en-US" b="1" i="0" dirty="0">
-                <a:solidFill>
-                  <a:srgbClr val="202122"/>
-                </a:solidFill>
-                <a:effectLst/>
-                <a:latin typeface="Arial" panose="020B0604020202020204" pitchFamily="34" charset="0"/>
-              </a:rPr>
-              <a:t>TL</a:t>
-            </a:r>
-            <a:r>
-              <a:rPr lang="en-US" b="0" i="0" dirty="0">
-                <a:solidFill>
-                  <a:srgbClr val="202122"/>
-                </a:solidFill>
-                <a:effectLst/>
-                <a:latin typeface="Arial" panose="020B0604020202020204" pitchFamily="34" charset="0"/>
-              </a:rPr>
-              <a:t>) is a research problem in </a:t>
-            </a:r>
-            <a:r>
-              <a:rPr lang="en-US" b="0" i="0" u="none" strike="noStrike" dirty="0">
-                <a:solidFill>
-                  <a:srgbClr val="3366CC"/>
-                </a:solidFill>
-                <a:effectLst/>
-                <a:latin typeface="Arial" panose="020B0604020202020204" pitchFamily="34" charset="0"/>
-                <a:hlinkClick r:id="rId2" tooltip="Machine learning"/>
-              </a:rPr>
-              <a:t>machine learning</a:t>
-            </a:r>
-            <a:r>
-              <a:rPr lang="en-US" b="0" i="0" dirty="0">
-                <a:solidFill>
-                  <a:srgbClr val="202122"/>
-                </a:solidFill>
-                <a:effectLst/>
-                <a:latin typeface="Arial" panose="020B0604020202020204" pitchFamily="34" charset="0"/>
-              </a:rPr>
-              <a:t> (ML) that focuses on applying knowledge gained while solving one task to a related task.</a:t>
-            </a:r>
-            <a:r>
-              <a:rPr lang="en-US" b="0" i="0" u="none" strike="noStrike" baseline="30000" dirty="0">
-                <a:solidFill>
-                  <a:srgbClr val="3366CC"/>
-                </a:solidFill>
-                <a:effectLst/>
-                <a:latin typeface="Arial" panose="020B0604020202020204" pitchFamily="34" charset="0"/>
-                <a:hlinkClick r:id="rId3"/>
-              </a:rPr>
-              <a:t>[1]</a:t>
-            </a:r>
-            <a:r>
-              <a:rPr lang="en-US" b="0" i="0" dirty="0">
-                <a:solidFill>
-                  <a:srgbClr val="202122"/>
-                </a:solidFill>
-                <a:effectLst/>
-                <a:latin typeface="Arial" panose="020B0604020202020204" pitchFamily="34" charset="0"/>
-              </a:rPr>
-              <a:t> For example, knowledge gained while learning to </a:t>
-            </a:r>
-            <a:r>
-              <a:rPr lang="en-US" b="0" i="0" u="none" strike="noStrike" dirty="0">
-                <a:solidFill>
-                  <a:srgbClr val="3366CC"/>
-                </a:solidFill>
-                <a:effectLst/>
-                <a:latin typeface="Arial" panose="020B0604020202020204" pitchFamily="34" charset="0"/>
-                <a:hlinkClick r:id="rId4" tooltip="Computer vision"/>
-              </a:rPr>
-              <a:t>recognize</a:t>
-            </a:r>
-            <a:r>
-              <a:rPr lang="en-US" b="0" i="0" dirty="0">
-                <a:solidFill>
-                  <a:srgbClr val="202122"/>
-                </a:solidFill>
-                <a:effectLst/>
-                <a:latin typeface="Arial" panose="020B0604020202020204" pitchFamily="34" charset="0"/>
-              </a:rPr>
-              <a:t> cars could be applied when trying to recognize trucks. This topic is related to the psychological literature on </a:t>
-            </a:r>
-            <a:r>
-              <a:rPr lang="en-US" b="0" i="0" u="none" strike="noStrike" dirty="0">
-                <a:solidFill>
-                  <a:srgbClr val="3366CC"/>
-                </a:solidFill>
-                <a:effectLst/>
-                <a:latin typeface="Arial" panose="020B0604020202020204" pitchFamily="34" charset="0"/>
-                <a:hlinkClick r:id="rId5" tooltip="Transfer of learning"/>
-              </a:rPr>
-              <a:t>transfer of learning</a:t>
-            </a:r>
-            <a:r>
-              <a:rPr lang="en-US" b="0" i="0" dirty="0">
-                <a:solidFill>
-                  <a:srgbClr val="202122"/>
-                </a:solidFill>
-                <a:effectLst/>
-                <a:latin typeface="Arial" panose="020B0604020202020204" pitchFamily="34" charset="0"/>
-              </a:rPr>
-              <a:t>, although practical ties between the two fields are limited. Reusing/transferring information from previously learned tasks to new tasks has the potential to significantly improve learning efficiency.</a:t>
-            </a:r>
-            <a:r>
-              <a:rPr lang="en-US" b="0" i="0" u="none" strike="noStrike" baseline="30000" dirty="0">
-                <a:solidFill>
-                  <a:srgbClr val="3366CC"/>
-                </a:solidFill>
-                <a:effectLst/>
-                <a:latin typeface="Arial" panose="020B0604020202020204" pitchFamily="34" charset="0"/>
-                <a:hlinkClick r:id="rId6"/>
-              </a:rPr>
-              <a:t>[2]</a:t>
-            </a:r>
-            <a:endParaRPr lang="en-US" b="0" i="0" dirty="0">
-              <a:solidFill>
-                <a:srgbClr val="202122"/>
-              </a:solidFill>
-              <a:effectLst/>
-              <a:latin typeface="Arial" panose="020B0604020202020204" pitchFamily="34" charset="0"/>
-            </a:endParaRPr>
-          </a:p>
-        </p:txBody>
-      </p:sp>
-    </p:spTree>
-    <p:extLst>
-      <p:ext uri="{BB962C8B-B14F-4D97-AF65-F5344CB8AC3E}">
-        <p14:creationId xmlns:p14="http://schemas.microsoft.com/office/powerpoint/2010/main" val="3958029402"/>
-      </p:ext>
-    </p:extLst>
-  </p:cSld>
-  <p:clrMapOvr>
-    <a:masterClrMapping/>
-  </p:clrMapOvr>
-</p:sld>
-</file>
-
-<file path=ppt/slides/slide11.xml><?xml version="1.0" encoding="utf-8"?>
-<p:sld xmlns:a="http://schemas.openxmlformats.org/drawingml/2006/main" xmlns:r="http://schemas.openxmlformats.org/officeDocument/2006/relationships" xmlns:p="http://schemas.openxmlformats.org/presentationml/2006/main">
-  <p:cSld>
-    <p:spTree>
-      <p:nvGrpSpPr>
-        <p:cNvPr id="1" name=""/>
-        <p:cNvGrpSpPr/>
-        <p:nvPr/>
-      </p:nvGrpSpPr>
-      <p:grpSpPr>
-        <a:xfrm>
-          <a:off x="0" y="0"/>
-          <a:ext cx="0" cy="0"/>
-          <a:chOff x="0" y="0"/>
-          <a:chExt cx="0" cy="0"/>
-        </a:xfrm>
-      </p:grpSpPr>
-      <p:sp>
-        <p:nvSpPr>
-          <p:cNvPr id="2" name="Title 1">
-            <a:extLst>
-              <a:ext uri="{FF2B5EF4-FFF2-40B4-BE49-F238E27FC236}">
-                <a16:creationId xmlns:a16="http://schemas.microsoft.com/office/drawing/2014/main" id="{C7F65800-AF6C-3E2B-9F3C-BB7A2DD69597}"/>
-              </a:ext>
-            </a:extLst>
-          </p:cNvPr>
-          <p:cNvSpPr>
-            <a:spLocks noGrp="1"/>
-          </p:cNvSpPr>
-          <p:nvPr>
-            <p:ph type="title"/>
-          </p:nvPr>
-        </p:nvSpPr>
-        <p:spPr/>
-        <p:txBody>
-          <a:bodyPr/>
-          <a:lstStyle/>
-          <a:p>
-            <a:r>
-              <a:rPr lang="en-US" dirty="0">
-                <a:latin typeface="Arial Rounded MT Bold" panose="020F0704030504030204" pitchFamily="34" charset="77"/>
-              </a:rPr>
-              <a:t>Fine Tuning</a:t>
-            </a:r>
-          </a:p>
-        </p:txBody>
-      </p:sp>
-      <p:sp>
-        <p:nvSpPr>
-          <p:cNvPr id="3" name="Content Placeholder 2">
-            <a:extLst>
-              <a:ext uri="{FF2B5EF4-FFF2-40B4-BE49-F238E27FC236}">
-                <a16:creationId xmlns:a16="http://schemas.microsoft.com/office/drawing/2014/main" id="{D9CE928D-DF8F-B165-1FF9-B25EC18F2FBC}"/>
-              </a:ext>
-            </a:extLst>
-          </p:cNvPr>
-          <p:cNvSpPr>
-            <a:spLocks noGrp="1"/>
-          </p:cNvSpPr>
-          <p:nvPr>
-            <p:ph idx="1"/>
-          </p:nvPr>
-        </p:nvSpPr>
-        <p:spPr/>
-        <p:txBody>
-          <a:bodyPr/>
-          <a:lstStyle/>
-          <a:p>
-            <a:endParaRPr lang="en-US"/>
-          </a:p>
-        </p:txBody>
-      </p:sp>
-    </p:spTree>
-    <p:extLst>
-      <p:ext uri="{BB962C8B-B14F-4D97-AF65-F5344CB8AC3E}">
-        <p14:creationId xmlns:p14="http://schemas.microsoft.com/office/powerpoint/2010/main" val="2859973748"/>
       </p:ext>
     </p:extLst>
   </p:cSld>
@@ -5109,11 +4774,13 @@
             <a:avLst/>
           </a:prstGeom>
           <a:solidFill>
-            <a:schemeClr val="accent4">
-              <a:lumMod val="40000"/>
-              <a:lumOff val="60000"/>
-            </a:schemeClr>
+            <a:srgbClr val="4472C4"/>
           </a:solidFill>
+          <a:ln>
+            <a:solidFill>
+              <a:schemeClr val="accent1"/>
+            </a:solidFill>
+          </a:ln>
         </p:spPr>
         <p:style>
           <a:lnRef idx="2">
@@ -5140,35 +4807,6 @@
           </a:p>
         </p:txBody>
       </p:sp>
-      <p:pic>
-        <p:nvPicPr>
-          <p:cNvPr id="5" name="Content Placeholder 4" descr="A puppet sitting at a desk&#10;&#10;Description automatically generated with low confidence">
-            <a:extLst>
-              <a:ext uri="{FF2B5EF4-FFF2-40B4-BE49-F238E27FC236}">
-                <a16:creationId xmlns:a16="http://schemas.microsoft.com/office/drawing/2014/main" id="{801D97F1-CA8C-9C85-432E-3D1EB78B2896}"/>
-              </a:ext>
-            </a:extLst>
-          </p:cNvPr>
-          <p:cNvPicPr>
-            <a:picLocks noGrp="1" noChangeAspect="1"/>
-          </p:cNvPicPr>
-          <p:nvPr>
-            <p:ph idx="1"/>
-          </p:nvPr>
-        </p:nvPicPr>
-        <p:blipFill>
-          <a:blip r:embed="rId3"/>
-          <a:stretch>
-            <a:fillRect/>
-          </a:stretch>
-        </p:blipFill>
-        <p:spPr>
-          <a:xfrm>
-            <a:off x="2649469" y="-16007"/>
-            <a:ext cx="6890013" cy="6890013"/>
-          </a:xfrm>
-        </p:spPr>
-      </p:pic>
       <p:sp>
         <p:nvSpPr>
           <p:cNvPr id="13" name="Freeform: Shape 12">
@@ -5610,6 +5248,36 @@
           </a:p>
         </p:txBody>
       </p:sp>
+      <p:pic>
+        <p:nvPicPr>
+          <p:cNvPr id="8" name="Picture 7" descr="A puppet sitting at a desk with a computer&#10;&#10;Description automatically generated with low confidence">
+            <a:extLst>
+              <a:ext uri="{FF2B5EF4-FFF2-40B4-BE49-F238E27FC236}">
+                <a16:creationId xmlns:a16="http://schemas.microsoft.com/office/drawing/2014/main" id="{A68E5AC4-5FDF-6213-D8F7-5A5ED92F1F17}"/>
+              </a:ext>
+            </a:extLst>
+          </p:cNvPr>
+          <p:cNvPicPr>
+            <a:picLocks noChangeAspect="1"/>
+          </p:cNvPicPr>
+          <p:nvPr/>
+        </p:nvPicPr>
+        <p:blipFill>
+          <a:blip r:embed="rId3"/>
+          <a:stretch>
+            <a:fillRect/>
+          </a:stretch>
+        </p:blipFill>
+        <p:spPr>
+          <a:xfrm>
+            <a:off x="5334000" y="0"/>
+            <a:ext cx="6858000" cy="6858000"/>
+          </a:xfrm>
+          <a:prstGeom prst="rect">
+            <a:avLst/>
+          </a:prstGeom>
+        </p:spPr>
+      </p:pic>
       <p:sp>
         <p:nvSpPr>
           <p:cNvPr id="6" name="Cloud Callout 5">
@@ -5623,9 +5291,9 @@
           <p:nvPr/>
         </p:nvSpPr>
         <p:spPr>
-          <a:xfrm rot="744093">
-            <a:off x="8099371" y="1297"/>
-            <a:ext cx="3891928" cy="2591571"/>
+          <a:xfrm rot="303230">
+            <a:off x="8522130" y="-30700"/>
+            <a:ext cx="2525584" cy="1750157"/>
           </a:xfrm>
           <a:prstGeom prst="cloudCallout">
             <a:avLst/>
@@ -5668,6 +5336,61 @@
                 <a:latin typeface="Arial Rounded MT Bold" panose="020F0704030504030204" pitchFamily="34" charset="77"/>
               </a:rPr>
               <a:t>Me?</a:t>
+            </a:r>
+          </a:p>
+        </p:txBody>
+      </p:sp>
+      <p:sp>
+        <p:nvSpPr>
+          <p:cNvPr id="4" name="TextBox 3">
+            <a:extLst>
+              <a:ext uri="{FF2B5EF4-FFF2-40B4-BE49-F238E27FC236}">
+                <a16:creationId xmlns:a16="http://schemas.microsoft.com/office/drawing/2014/main" id="{63329EF3-87D4-7A0C-A182-17A5C4F3818A}"/>
+              </a:ext>
+            </a:extLst>
+          </p:cNvPr>
+          <p:cNvSpPr txBox="1"/>
+          <p:nvPr/>
+        </p:nvSpPr>
+        <p:spPr>
+          <a:xfrm>
+            <a:off x="-17613" y="6396334"/>
+            <a:ext cx="3285641" cy="461665"/>
+          </a:xfrm>
+          <a:prstGeom prst="rect">
+            <a:avLst/>
+          </a:prstGeom>
+          <a:noFill/>
+        </p:spPr>
+        <p:txBody>
+          <a:bodyPr wrap="square" rtlCol="0">
+            <a:spAutoFit/>
+          </a:bodyPr>
+          <a:lstStyle/>
+          <a:p>
+            <a:r>
+              <a:rPr lang="en-US" sz="1200" dirty="0">
+                <a:solidFill>
+                  <a:schemeClr val="accent5">
+                    <a:lumMod val="60000"/>
+                    <a:lumOff val="40000"/>
+                  </a:schemeClr>
+                </a:solidFill>
+              </a:rPr>
+              <a:t>Image generated by stable-diffusion. </a:t>
+            </a:r>
+          </a:p>
+          <a:p>
+            <a:r>
+              <a:rPr lang="en-US" sz="1200" dirty="0">
+                <a:solidFill>
+                  <a:schemeClr val="accent5">
+                    <a:lumMod val="60000"/>
+                    <a:lumOff val="40000"/>
+                  </a:schemeClr>
+                </a:solidFill>
+              </a:rPr>
+              <a:t>Prompt: Sesame street character sitting at a desk</a:t>
             </a:r>
           </a:p>
         </p:txBody>
@@ -5770,87 +5493,6 @@
           </a:p>
         </p:txBody>
       </p:sp>
-      <p:sp>
-        <p:nvSpPr>
-          <p:cNvPr id="9" name="Rectangle 8">
-            <a:extLst>
-              <a:ext uri="{FF2B5EF4-FFF2-40B4-BE49-F238E27FC236}">
-                <a16:creationId xmlns:a16="http://schemas.microsoft.com/office/drawing/2014/main" id="{F46E584C-E12F-7F78-FB82-7500F5558AD6}"/>
-              </a:ext>
-            </a:extLst>
-          </p:cNvPr>
-          <p:cNvSpPr/>
-          <p:nvPr/>
-        </p:nvSpPr>
-        <p:spPr>
-          <a:xfrm>
-            <a:off x="0" y="0"/>
-            <a:ext cx="12224178" cy="6857999"/>
-          </a:xfrm>
-          <a:prstGeom prst="rect">
-            <a:avLst/>
-          </a:prstGeom>
-          <a:solidFill>
-            <a:schemeClr val="accent4">
-              <a:lumMod val="40000"/>
-              <a:lumOff val="60000"/>
-            </a:schemeClr>
-          </a:solidFill>
-        </p:spPr>
-        <p:style>
-          <a:lnRef idx="2">
-            <a:schemeClr val="accent1">
-              <a:shade val="50000"/>
-            </a:schemeClr>
-          </a:lnRef>
-          <a:fillRef idx="1">
-            <a:schemeClr val="accent1"/>
-          </a:fillRef>
-          <a:effectRef idx="0">
-            <a:schemeClr val="accent1"/>
-          </a:effectRef>
-          <a:fontRef idx="minor">
-            <a:schemeClr val="lt1"/>
-          </a:fontRef>
-        </p:style>
-        <p:txBody>
-          <a:bodyPr rtlCol="0" anchor="ctr"/>
-          <a:lstStyle/>
-          <a:p>
-            <a:pPr algn="ctr"/>
-            <a:endParaRPr lang="en-US"/>
-          </a:p>
-        </p:txBody>
-      </p:sp>
-      <p:pic>
-        <p:nvPicPr>
-          <p:cNvPr id="5" name="Content Placeholder 4" descr="A puppet sitting at a desk&#10;&#10;Description automatically generated with low confidence">
-            <a:extLst>
-              <a:ext uri="{FF2B5EF4-FFF2-40B4-BE49-F238E27FC236}">
-                <a16:creationId xmlns:a16="http://schemas.microsoft.com/office/drawing/2014/main" id="{801D97F1-CA8C-9C85-432E-3D1EB78B2896}"/>
-              </a:ext>
-            </a:extLst>
-          </p:cNvPr>
-          <p:cNvPicPr>
-            <a:picLocks noGrp="1" noChangeAspect="1"/>
-          </p:cNvPicPr>
-          <p:nvPr>
-            <p:ph idx="1"/>
-          </p:nvPr>
-        </p:nvPicPr>
-        <p:blipFill>
-          <a:blip r:embed="rId3"/>
-          <a:stretch>
-            <a:fillRect/>
-          </a:stretch>
-        </p:blipFill>
-        <p:spPr>
-          <a:xfrm>
-            <a:off x="2649469" y="-16007"/>
-            <a:ext cx="6890013" cy="6890013"/>
-          </a:xfrm>
-        </p:spPr>
-      </p:pic>
       <p:sp>
         <p:nvSpPr>
           <p:cNvPr id="13" name="Freeform: Shape 12">
@@ -6252,52 +5894,42 @@
           </a:p>
         </p:txBody>
       </p:sp>
-      <p:sp>
-        <p:nvSpPr>
-          <p:cNvPr id="2" name="Title 1">
-            <a:extLst>
-              <a:ext uri="{FF2B5EF4-FFF2-40B4-BE49-F238E27FC236}">
-                <a16:creationId xmlns:a16="http://schemas.microsoft.com/office/drawing/2014/main" id="{3734CC0B-5220-C936-C463-8A950F2F69BE}"/>
-              </a:ext>
-            </a:extLst>
-          </p:cNvPr>
-          <p:cNvSpPr>
-            <a:spLocks noGrp="1"/>
-          </p:cNvSpPr>
-          <p:nvPr>
-            <p:ph type="title"/>
-          </p:nvPr>
-        </p:nvSpPr>
+      <p:pic>
+        <p:nvPicPr>
+          <p:cNvPr id="9" name="Picture 8" descr="A picture containing text, indoor, parrot, bird&#10;&#10;Description automatically generated">
+            <a:extLst>
+              <a:ext uri="{FF2B5EF4-FFF2-40B4-BE49-F238E27FC236}">
+                <a16:creationId xmlns:a16="http://schemas.microsoft.com/office/drawing/2014/main" id="{79418BA3-AA3F-E756-2A64-D0FB4D69F461}"/>
+              </a:ext>
+            </a:extLst>
+          </p:cNvPr>
+          <p:cNvPicPr>
+            <a:picLocks noChangeAspect="1"/>
+          </p:cNvPicPr>
+          <p:nvPr/>
+        </p:nvPicPr>
+        <p:blipFill>
+          <a:blip r:embed="rId3"/>
+          <a:stretch>
+            <a:fillRect/>
+          </a:stretch>
+        </p:blipFill>
         <p:spPr>
           <a:xfrm>
-            <a:off x="838200" y="673770"/>
-            <a:ext cx="3220329" cy="2027227"/>
+            <a:off x="1" y="16006"/>
+            <a:ext cx="6890010" cy="6890010"/>
           </a:xfrm>
+          <a:prstGeom prst="rect">
+            <a:avLst/>
+          </a:prstGeom>
         </p:spPr>
-        <p:txBody>
-          <a:bodyPr anchor="t">
-            <a:normAutofit/>
-          </a:bodyPr>
-          <a:lstStyle/>
-          <a:p>
-            <a:r>
-              <a:rPr lang="en-US" sz="5000">
-                <a:solidFill>
-                  <a:srgbClr val="FFFFFF"/>
-                </a:solidFill>
-                <a:latin typeface="Arial Rounded MT Bold" panose="020F0704030504030204" pitchFamily="34" charset="77"/>
-              </a:rPr>
-              <a:t>Why are you here?</a:t>
-            </a:r>
-          </a:p>
-        </p:txBody>
-      </p:sp>
-      <p:sp>
-        <p:nvSpPr>
-          <p:cNvPr id="6" name="Cloud Callout 5">
-            <a:extLst>
-              <a:ext uri="{FF2B5EF4-FFF2-40B4-BE49-F238E27FC236}">
-                <a16:creationId xmlns:a16="http://schemas.microsoft.com/office/drawing/2014/main" id="{245CDE1A-C91D-4851-142B-A1A0EA456238}"/>
+      </p:pic>
+      <p:sp>
+        <p:nvSpPr>
+          <p:cNvPr id="12" name="Oval Callout 11">
+            <a:extLst>
+              <a:ext uri="{FF2B5EF4-FFF2-40B4-BE49-F238E27FC236}">
+                <a16:creationId xmlns:a16="http://schemas.microsoft.com/office/drawing/2014/main" id="{8E9D7D5D-3A78-6F25-F53F-46CEB00364C3}"/>
               </a:ext>
             </a:extLst>
           </p:cNvPr>
@@ -6305,17 +5937,147 @@
           <p:nvPr/>
         </p:nvSpPr>
         <p:spPr>
-          <a:xfrm rot="744093">
-            <a:off x="8099371" y="1297"/>
-            <a:ext cx="3891928" cy="2591571"/>
+          <a:xfrm rot="662834">
+            <a:off x="3529045" y="1167692"/>
+            <a:ext cx="3013191" cy="1216021"/>
           </a:xfrm>
-          <a:prstGeom prst="cloudCallout">
+          <a:custGeom>
             <a:avLst/>
-          </a:prstGeom>
-          <a:ln w="38100">
+            <a:gdLst>
+              <a:gd name="connsiteX0" fmla="*/ 878857 w 3013191"/>
+              <a:gd name="connsiteY0" fmla="*/ 1368024 h 1216021"/>
+              <a:gd name="connsiteX1" fmla="*/ 766208 w 3013191"/>
+              <a:gd name="connsiteY1" fmla="*/ 1137537 h 1216021"/>
+              <a:gd name="connsiteX2" fmla="*/ 947836 w 3013191"/>
+              <a:gd name="connsiteY2" fmla="*/ 43361 h 1216021"/>
+              <a:gd name="connsiteX3" fmla="*/ 1932980 w 3013191"/>
+              <a:gd name="connsiteY3" fmla="*/ 24857 h 1216021"/>
+              <a:gd name="connsiteX4" fmla="*/ 2440882 w 3013191"/>
+              <a:gd name="connsiteY4" fmla="*/ 1084995 h 1216021"/>
+              <a:gd name="connsiteX5" fmla="*/ 1311649 w 3013191"/>
+              <a:gd name="connsiteY5" fmla="*/ 1210910 h 1216021"/>
+              <a:gd name="connsiteX6" fmla="*/ 878857 w 3013191"/>
+              <a:gd name="connsiteY6" fmla="*/ 1368024 h 1216021"/>
+            </a:gdLst>
+            <a:ahLst/>
+            <a:cxnLst>
+              <a:cxn ang="0">
+                <a:pos x="connsiteX0" y="connsiteY0"/>
+              </a:cxn>
+              <a:cxn ang="0">
+                <a:pos x="connsiteX1" y="connsiteY1"/>
+              </a:cxn>
+              <a:cxn ang="0">
+                <a:pos x="connsiteX2" y="connsiteY2"/>
+              </a:cxn>
+              <a:cxn ang="0">
+                <a:pos x="connsiteX3" y="connsiteY3"/>
+              </a:cxn>
+              <a:cxn ang="0">
+                <a:pos x="connsiteX4" y="connsiteY4"/>
+              </a:cxn>
+              <a:cxn ang="0">
+                <a:pos x="connsiteX5" y="connsiteY5"/>
+              </a:cxn>
+              <a:cxn ang="0">
+                <a:pos x="connsiteX6" y="connsiteY6"/>
+              </a:cxn>
+            </a:cxnLst>
+            <a:rect l="l" t="t" r="r" b="b"/>
+            <a:pathLst>
+              <a:path w="3013191" h="1216021" fill="none" extrusionOk="0">
+                <a:moveTo>
+                  <a:pt x="878857" y="1368024"/>
+                </a:moveTo>
+                <a:cubicBezTo>
+                  <a:pt x="829249" y="1289801"/>
+                  <a:pt x="822209" y="1221232"/>
+                  <a:pt x="766208" y="1137537"/>
+                </a:cubicBezTo>
+                <a:cubicBezTo>
+                  <a:pt x="-321177" y="894661"/>
+                  <a:pt x="-124368" y="257343"/>
+                  <a:pt x="947836" y="43361"/>
+                </a:cubicBezTo>
+                <a:cubicBezTo>
+                  <a:pt x="1240347" y="-10701"/>
+                  <a:pt x="1642511" y="13854"/>
+                  <a:pt x="1932980" y="24857"/>
+                </a:cubicBezTo>
+                <a:cubicBezTo>
+                  <a:pt x="3124294" y="193406"/>
+                  <a:pt x="3400743" y="793483"/>
+                  <a:pt x="2440882" y="1084995"/>
+                </a:cubicBezTo>
+                <a:cubicBezTo>
+                  <a:pt x="2157672" y="1241710"/>
+                  <a:pt x="1762623" y="1290794"/>
+                  <a:pt x="1311649" y="1210910"/>
+                </a:cubicBezTo>
+                <a:cubicBezTo>
+                  <a:pt x="1114886" y="1241329"/>
+                  <a:pt x="934637" y="1328532"/>
+                  <a:pt x="878857" y="1368024"/>
+                </a:cubicBezTo>
+                <a:close/>
+              </a:path>
+              <a:path w="3013191" h="1216021" stroke="0" extrusionOk="0">
+                <a:moveTo>
+                  <a:pt x="878857" y="1368024"/>
+                </a:moveTo>
+                <a:cubicBezTo>
+                  <a:pt x="837513" y="1271014"/>
+                  <a:pt x="787377" y="1224118"/>
+                  <a:pt x="766208" y="1137537"/>
+                </a:cubicBezTo>
+                <a:cubicBezTo>
+                  <a:pt x="-300524" y="894020"/>
+                  <a:pt x="-335059" y="236129"/>
+                  <a:pt x="947836" y="43361"/>
+                </a:cubicBezTo>
+                <a:cubicBezTo>
+                  <a:pt x="1230373" y="23430"/>
+                  <a:pt x="1607686" y="-7849"/>
+                  <a:pt x="1932980" y="24857"/>
+                </a:cubicBezTo>
+                <a:cubicBezTo>
+                  <a:pt x="3043768" y="131004"/>
+                  <a:pt x="3518386" y="836096"/>
+                  <a:pt x="2440882" y="1084995"/>
+                </a:cubicBezTo>
+                <a:cubicBezTo>
+                  <a:pt x="2152888" y="1190396"/>
+                  <a:pt x="1741234" y="1177609"/>
+                  <a:pt x="1311649" y="1210910"/>
+                </a:cubicBezTo>
+                <a:cubicBezTo>
+                  <a:pt x="1168610" y="1226133"/>
+                  <a:pt x="977149" y="1372573"/>
+                  <a:pt x="878857" y="1368024"/>
+                </a:cubicBezTo>
+                <a:close/>
+              </a:path>
+            </a:pathLst>
+          </a:custGeom>
+          <a:solidFill>
+            <a:srgbClr val="4472C4"/>
+          </a:solidFill>
+          <a:ln w="76200">
             <a:solidFill>
               <a:srgbClr val="7030A0"/>
             </a:solidFill>
+            <a:extLst>
+              <a:ext uri="{C807C97D-BFC1-408E-A445-0C87EB9F89A2}">
+                <ask:lineSketchStyleProps xmlns:ask="http://schemas.microsoft.com/office/drawing/2018/sketchyshapes" sd="1219033472">
+                  <a:prstGeom prst="wedgeEllipseCallout">
+                    <a:avLst/>
+                  </a:prstGeom>
+                  <ask:type>
+                    <ask:lineSketchCurved/>
+                  </ask:type>
+                </ask:lineSketchStyleProps>
+              </a:ext>
+            </a:extLst>
           </a:ln>
         </p:spPr>
         <p:style>
@@ -6339,8 +6101,115 @@
           <a:lstStyle/>
           <a:p>
             <a:pPr algn="ctr"/>
-            <a:r>
-              <a:rPr lang="en-US" sz="4000" dirty="0">
+            <a:endParaRPr lang="en-US" sz="2000" b="0" dirty="0">
+              <a:solidFill>
+                <a:schemeClr val="accent6">
+                  <a:lumMod val="40000"/>
+                  <a:lumOff val="60000"/>
+                </a:schemeClr>
+              </a:solidFill>
+              <a:effectLst/>
+              <a:latin typeface="Arial Rounded MT Bold" panose="020F0704030504030204" pitchFamily="34" charset="77"/>
+            </a:endParaRPr>
+          </a:p>
+          <a:p>
+            <a:pPr algn="ctr"/>
+            <a:r>
+              <a:rPr lang="en-US" sz="2000" b="0" dirty="0">
+                <a:solidFill>
+                  <a:schemeClr val="accent6">
+                    <a:lumMod val="40000"/>
+                    <a:lumOff val="60000"/>
+                  </a:schemeClr>
+                </a:solidFill>
+                <a:effectLst/>
+                <a:latin typeface="Arial Rounded MT Bold" panose="020F0704030504030204" pitchFamily="34" charset="77"/>
+              </a:rPr>
+              <a:t>I want to specialize in NLP!</a:t>
+            </a:r>
+          </a:p>
+          <a:p>
+            <a:pPr algn="ctr"/>
+            <a:endParaRPr lang="en-US" dirty="0"/>
+          </a:p>
+        </p:txBody>
+      </p:sp>
+      <p:sp>
+        <p:nvSpPr>
+          <p:cNvPr id="2" name="Rectangle 1">
+            <a:extLst>
+              <a:ext uri="{FF2B5EF4-FFF2-40B4-BE49-F238E27FC236}">
+                <a16:creationId xmlns:a16="http://schemas.microsoft.com/office/drawing/2014/main" id="{29C2A692-5175-CC81-4144-9F57A97C5A1D}"/>
+              </a:ext>
+            </a:extLst>
+          </p:cNvPr>
+          <p:cNvSpPr/>
+          <p:nvPr/>
+        </p:nvSpPr>
+        <p:spPr>
+          <a:xfrm>
+            <a:off x="6890011" y="16006"/>
+            <a:ext cx="5333998" cy="6858000"/>
+          </a:xfrm>
+          <a:prstGeom prst="rect">
+            <a:avLst/>
+          </a:prstGeom>
+        </p:spPr>
+        <p:style>
+          <a:lnRef idx="2">
+            <a:schemeClr val="accent1">
+              <a:shade val="50000"/>
+            </a:schemeClr>
+          </a:lnRef>
+          <a:fillRef idx="1">
+            <a:schemeClr val="accent1"/>
+          </a:fillRef>
+          <a:effectRef idx="0">
+            <a:schemeClr val="accent1"/>
+          </a:effectRef>
+          <a:fontRef idx="minor">
+            <a:schemeClr val="lt1"/>
+          </a:fontRef>
+        </p:style>
+        <p:txBody>
+          <a:bodyPr rtlCol="0" anchor="ctr"/>
+          <a:lstStyle/>
+          <a:p>
+            <a:pPr algn="ctr"/>
+            <a:endParaRPr lang="en-US" dirty="0"/>
+          </a:p>
+        </p:txBody>
+      </p:sp>
+      <p:sp>
+        <p:nvSpPr>
+          <p:cNvPr id="3" name="TextBox 2">
+            <a:extLst>
+              <a:ext uri="{FF2B5EF4-FFF2-40B4-BE49-F238E27FC236}">
+                <a16:creationId xmlns:a16="http://schemas.microsoft.com/office/drawing/2014/main" id="{30DF1EB7-ADEE-3B17-4844-E9AFC4ABDBB3}"/>
+              </a:ext>
+            </a:extLst>
+          </p:cNvPr>
+          <p:cNvSpPr txBox="1"/>
+          <p:nvPr/>
+        </p:nvSpPr>
+        <p:spPr>
+          <a:xfrm>
+            <a:off x="7488663" y="3429000"/>
+            <a:ext cx="4016869" cy="1138773"/>
+          </a:xfrm>
+          <a:prstGeom prst="rect">
+            <a:avLst/>
+          </a:prstGeom>
+          <a:noFill/>
+        </p:spPr>
+        <p:txBody>
+          <a:bodyPr wrap="none" rtlCol="0">
+            <a:spAutoFit/>
+          </a:bodyPr>
+          <a:lstStyle/>
+          <a:p>
+            <a:r>
+              <a:rPr lang="en-US" sz="2800" dirty="0">
                 <a:solidFill>
                   <a:schemeClr val="accent6">
                     <a:lumMod val="40000"/>
@@ -6349,7 +6218,218 @@
                 </a:solidFill>
                 <a:latin typeface="Arial Rounded MT Bold" panose="020F0704030504030204" pitchFamily="34" charset="77"/>
               </a:rPr>
-              <a:t>Me?</a:t>
+              <a:t>Additional Resources:</a:t>
+            </a:r>
+          </a:p>
+          <a:p>
+            <a:endParaRPr lang="en-US" sz="2000" dirty="0">
+              <a:solidFill>
+                <a:schemeClr val="accent6">
+                  <a:lumMod val="40000"/>
+                  <a:lumOff val="60000"/>
+                </a:schemeClr>
+              </a:solidFill>
+              <a:latin typeface="Arial Rounded MT Bold" panose="020F0704030504030204" pitchFamily="34" charset="77"/>
+            </a:endParaRPr>
+          </a:p>
+          <a:p>
+            <a:endParaRPr lang="en-US" sz="2000" dirty="0">
+              <a:solidFill>
+                <a:schemeClr val="accent6">
+                  <a:lumMod val="40000"/>
+                  <a:lumOff val="60000"/>
+                </a:schemeClr>
+              </a:solidFill>
+              <a:latin typeface="Arial Rounded MT Bold" panose="020F0704030504030204" pitchFamily="34" charset="77"/>
+            </a:endParaRPr>
+          </a:p>
+        </p:txBody>
+      </p:sp>
+      <p:sp>
+        <p:nvSpPr>
+          <p:cNvPr id="5" name="TextBox 4">
+            <a:extLst>
+              <a:ext uri="{FF2B5EF4-FFF2-40B4-BE49-F238E27FC236}">
+                <a16:creationId xmlns:a16="http://schemas.microsoft.com/office/drawing/2014/main" id="{5E3BC038-85C4-28D5-E575-C59632BE0BA5}"/>
+              </a:ext>
+            </a:extLst>
+          </p:cNvPr>
+          <p:cNvSpPr txBox="1"/>
+          <p:nvPr/>
+        </p:nvSpPr>
+        <p:spPr>
+          <a:xfrm>
+            <a:off x="7408385" y="858616"/>
+            <a:ext cx="4897303" cy="2431435"/>
+          </a:xfrm>
+          <a:prstGeom prst="rect">
+            <a:avLst/>
+          </a:prstGeom>
+          <a:noFill/>
+        </p:spPr>
+        <p:txBody>
+          <a:bodyPr wrap="none" rtlCol="0">
+            <a:spAutoFit/>
+          </a:bodyPr>
+          <a:lstStyle/>
+          <a:p>
+            <a:r>
+              <a:rPr lang="en-US" sz="2800" dirty="0">
+                <a:solidFill>
+                  <a:schemeClr val="accent6">
+                    <a:lumMod val="40000"/>
+                    <a:lumOff val="60000"/>
+                  </a:schemeClr>
+                </a:solidFill>
+                <a:latin typeface="Arial Rounded MT Bold" panose="020F0704030504030204" pitchFamily="34" charset="77"/>
+              </a:rPr>
+              <a:t>Tune in to Part 2:</a:t>
+            </a:r>
+          </a:p>
+          <a:p>
+            <a:pPr marL="457200" indent="-457200">
+              <a:buFontTx/>
+              <a:buChar char="-"/>
+            </a:pPr>
+            <a:r>
+              <a:rPr lang="en-US" sz="2800" dirty="0">
+                <a:solidFill>
+                  <a:schemeClr val="accent6">
+                    <a:lumMod val="40000"/>
+                    <a:lumOff val="60000"/>
+                  </a:schemeClr>
+                </a:solidFill>
+                <a:latin typeface="Arial Rounded MT Bold" panose="020F0704030504030204" pitchFamily="34" charset="77"/>
+              </a:rPr>
+              <a:t>Vocab</a:t>
+            </a:r>
+          </a:p>
+          <a:p>
+            <a:pPr marL="457200" indent="-457200">
+              <a:buFontTx/>
+              <a:buChar char="-"/>
+            </a:pPr>
+            <a:r>
+              <a:rPr lang="en-US" sz="2800" dirty="0">
+                <a:solidFill>
+                  <a:schemeClr val="accent6">
+                    <a:lumMod val="40000"/>
+                    <a:lumOff val="60000"/>
+                  </a:schemeClr>
+                </a:solidFill>
+                <a:latin typeface="Arial Rounded MT Bold" panose="020F0704030504030204" pitchFamily="34" charset="77"/>
+              </a:rPr>
+              <a:t>Evaluating the Tokenizer</a:t>
+            </a:r>
+          </a:p>
+          <a:p>
+            <a:endParaRPr lang="en-US" sz="2800" dirty="0">
+              <a:solidFill>
+                <a:schemeClr val="accent6">
+                  <a:lumMod val="40000"/>
+                  <a:lumOff val="60000"/>
+                </a:schemeClr>
+              </a:solidFill>
+              <a:latin typeface="Arial Rounded MT Bold" panose="020F0704030504030204" pitchFamily="34" charset="77"/>
+            </a:endParaRPr>
+          </a:p>
+          <a:p>
+            <a:endParaRPr lang="en-US" sz="2000" dirty="0">
+              <a:solidFill>
+                <a:schemeClr val="accent6">
+                  <a:lumMod val="40000"/>
+                  <a:lumOff val="60000"/>
+                </a:schemeClr>
+              </a:solidFill>
+              <a:latin typeface="Arial Rounded MT Bold" panose="020F0704030504030204" pitchFamily="34" charset="77"/>
+            </a:endParaRPr>
+          </a:p>
+          <a:p>
+            <a:endParaRPr lang="en-US" sz="2000" dirty="0">
+              <a:solidFill>
+                <a:schemeClr val="accent6">
+                  <a:lumMod val="40000"/>
+                  <a:lumOff val="60000"/>
+                </a:schemeClr>
+              </a:solidFill>
+              <a:latin typeface="Arial Rounded MT Bold" panose="020F0704030504030204" pitchFamily="34" charset="77"/>
+            </a:endParaRPr>
+          </a:p>
+        </p:txBody>
+      </p:sp>
+      <p:sp>
+        <p:nvSpPr>
+          <p:cNvPr id="7" name="TextBox 6">
+            <a:extLst>
+              <a:ext uri="{FF2B5EF4-FFF2-40B4-BE49-F238E27FC236}">
+                <a16:creationId xmlns:a16="http://schemas.microsoft.com/office/drawing/2014/main" id="{20CB0248-1722-4557-C887-BC316E481D91}"/>
+              </a:ext>
+            </a:extLst>
+          </p:cNvPr>
+          <p:cNvSpPr txBox="1"/>
+          <p:nvPr/>
+        </p:nvSpPr>
+        <p:spPr>
+          <a:xfrm>
+            <a:off x="8288819" y="6412340"/>
+            <a:ext cx="4016869" cy="461665"/>
+          </a:xfrm>
+          <a:prstGeom prst="rect">
+            <a:avLst/>
+          </a:prstGeom>
+          <a:noFill/>
+        </p:spPr>
+        <p:txBody>
+          <a:bodyPr wrap="square" rtlCol="0">
+            <a:spAutoFit/>
+          </a:bodyPr>
+          <a:lstStyle/>
+          <a:p>
+            <a:r>
+              <a:rPr lang="en-US" sz="1200" dirty="0">
+                <a:solidFill>
+                  <a:schemeClr val="accent5">
+                    <a:lumMod val="60000"/>
+                    <a:lumOff val="40000"/>
+                  </a:schemeClr>
+                </a:solidFill>
+              </a:rPr>
+              <a:t>Image generated by stable-diffusion. </a:t>
+            </a:r>
+          </a:p>
+          <a:p>
+            <a:r>
+              <a:rPr lang="en-US" sz="1200" dirty="0">
+                <a:solidFill>
+                  <a:schemeClr val="accent5">
+                    <a:lumMod val="60000"/>
+                    <a:lumOff val="40000"/>
+                  </a:schemeClr>
+                </a:solidFill>
+              </a:rPr>
+              <a:t>Prompt: A polyglot </a:t>
+            </a:r>
+            <a:r>
+              <a:rPr lang="en-US" sz="1200" dirty="0" err="1">
+                <a:solidFill>
+                  <a:schemeClr val="accent5">
+                    <a:lumMod val="60000"/>
+                    <a:lumOff val="40000"/>
+                  </a:schemeClr>
+                </a:solidFill>
+              </a:rPr>
+              <a:t>esame</a:t>
+            </a:r>
+            <a:r>
+              <a:rPr lang="en-US" sz="1200" dirty="0">
+                <a:solidFill>
+                  <a:schemeClr val="accent5">
+                    <a:lumMod val="60000"/>
+                    <a:lumOff val="40000"/>
+                  </a:schemeClr>
+                </a:solidFill>
+              </a:rPr>
+              <a:t> street character sitting at a desk</a:t>
             </a:r>
           </a:p>
         </p:txBody>
@@ -6357,7 +6437,7 @@
     </p:spTree>
     <p:extLst>
       <p:ext uri="{BB962C8B-B14F-4D97-AF65-F5344CB8AC3E}">
-        <p14:creationId xmlns:p14="http://schemas.microsoft.com/office/powerpoint/2010/main" val="74463353"/>
+        <p14:creationId xmlns:p14="http://schemas.microsoft.com/office/powerpoint/2010/main" val="89120223"/>
       </p:ext>
     </p:extLst>
   </p:cSld>
@@ -6384,6 +6464,36 @@
           <a:chExt cx="0" cy="0"/>
         </a:xfrm>
       </p:grpSpPr>
+      <p:pic>
+        <p:nvPicPr>
+          <p:cNvPr id="9" name="Picture 8" descr="A puppet holding a computer&#10;&#10;Description automatically generated with medium confidence">
+            <a:extLst>
+              <a:ext uri="{FF2B5EF4-FFF2-40B4-BE49-F238E27FC236}">
+                <a16:creationId xmlns:a16="http://schemas.microsoft.com/office/drawing/2014/main" id="{A223D859-380A-2F3F-03B7-80F9090F95D2}"/>
+              </a:ext>
+            </a:extLst>
+          </p:cNvPr>
+          <p:cNvPicPr>
+            <a:picLocks noChangeAspect="1"/>
+          </p:cNvPicPr>
+          <p:nvPr/>
+        </p:nvPicPr>
+        <p:blipFill>
+          <a:blip r:embed="rId2"/>
+          <a:stretch>
+            <a:fillRect/>
+          </a:stretch>
+        </p:blipFill>
+        <p:spPr>
+          <a:xfrm>
+            <a:off x="5333998" y="-24499"/>
+            <a:ext cx="6906998" cy="6906998"/>
+          </a:xfrm>
+          <a:prstGeom prst="rect">
+            <a:avLst/>
+          </a:prstGeom>
+        </p:spPr>
+      </p:pic>
       <p:sp>
         <p:nvSpPr>
           <p:cNvPr id="6" name="Rectangle 5">
@@ -6443,52 +6553,22 @@
           </a:p>
         </p:txBody>
       </p:sp>
-      <p:pic>
-        <p:nvPicPr>
-          <p:cNvPr id="4" name="Content Placeholder 4" descr="A puppet sitting at a desk&#10;&#10;Description automatically generated with low confidence">
-            <a:extLst>
-              <a:ext uri="{FF2B5EF4-FFF2-40B4-BE49-F238E27FC236}">
-                <a16:creationId xmlns:a16="http://schemas.microsoft.com/office/drawing/2014/main" id="{36B38AF0-7E87-5902-4FF7-5B457D7330B1}"/>
-              </a:ext>
-            </a:extLst>
-          </p:cNvPr>
-          <p:cNvPicPr>
-            <a:picLocks noChangeAspect="1"/>
-          </p:cNvPicPr>
+      <p:sp>
+        <p:nvSpPr>
+          <p:cNvPr id="5" name="Cloud Callout 4">
+            <a:extLst>
+              <a:ext uri="{FF2B5EF4-FFF2-40B4-BE49-F238E27FC236}">
+                <a16:creationId xmlns:a16="http://schemas.microsoft.com/office/drawing/2014/main" id="{1B59217F-83C9-D15C-FBF7-08E187140109}"/>
+              </a:ext>
+            </a:extLst>
+          </p:cNvPr>
+          <p:cNvSpPr/>
           <p:nvPr/>
-        </p:nvPicPr>
-        <p:blipFill>
-          <a:blip r:embed="rId2"/>
-          <a:stretch>
-            <a:fillRect/>
-          </a:stretch>
-        </p:blipFill>
+        </p:nvSpPr>
         <p:spPr>
           <a:xfrm>
-            <a:off x="5333998" y="0"/>
-            <a:ext cx="6858001" cy="6858001"/>
-          </a:xfrm>
-          <a:prstGeom prst="rect">
-            <a:avLst/>
-          </a:prstGeom>
-        </p:spPr>
-      </p:pic>
-      <p:sp>
-        <p:nvSpPr>
-          <p:cNvPr id="5" name="Cloud Callout 4">
-            <a:extLst>
-              <a:ext uri="{FF2B5EF4-FFF2-40B4-BE49-F238E27FC236}">
-                <a16:creationId xmlns:a16="http://schemas.microsoft.com/office/drawing/2014/main" id="{1B59217F-83C9-D15C-FBF7-08E187140109}"/>
-              </a:ext>
-            </a:extLst>
-          </p:cNvPr>
-          <p:cNvSpPr/>
-          <p:nvPr/>
-        </p:nvSpPr>
-        <p:spPr>
-          <a:xfrm rot="20539302" flipH="1">
-            <a:off x="5039144" y="449225"/>
-            <a:ext cx="3075856" cy="2547132"/>
+            <a:off x="7877996" y="29491"/>
+            <a:ext cx="4251971" cy="1708925"/>
           </a:xfrm>
           <a:prstGeom prst="cloudCallout">
             <a:avLst/>
@@ -6530,7 +6610,7 @@
                 <a:effectLst/>
                 <a:latin typeface="Arial Rounded MT Bold" panose="020F0704030504030204" pitchFamily="34" charset="77"/>
               </a:rPr>
-              <a:t>I’m a manager and sentiment analysis is on my roadmap for Q3.</a:t>
+              <a:t>I’m a product manager and sentiment analysis is on our roadmap for Q3.</a:t>
             </a:r>
           </a:p>
         </p:txBody>
@@ -6629,7 +6709,7 @@
         <p:spPr>
           <a:xfrm>
             <a:off x="62033" y="568618"/>
-            <a:ext cx="4851428" cy="1569660"/>
+            <a:ext cx="4851428" cy="2000548"/>
           </a:xfrm>
           <a:prstGeom prst="rect">
             <a:avLst/>
@@ -6652,7 +6732,7 @@
                 </a:solidFill>
                 <a:latin typeface="Arial Rounded MT Bold" panose="020F0704030504030204" pitchFamily="34" charset="77"/>
               </a:rPr>
-              <a:t>Tune in to Part 2:</a:t>
+              <a:t>Tune in to Part 2 and 3:</a:t>
             </a:r>
           </a:p>
           <a:p>
@@ -6670,7 +6750,7 @@
                 </a:solidFill>
                 <a:latin typeface="Arial Rounded MT Bold" panose="020F0704030504030204" pitchFamily="34" charset="77"/>
               </a:rPr>
-              <a:t>Our case study</a:t>
+              <a:t>Leveraging open-source datasets for your clients</a:t>
             </a:r>
           </a:p>
           <a:p>
@@ -6694,6 +6774,61 @@
               </a:solidFill>
               <a:latin typeface="Arial Rounded MT Bold" panose="020F0704030504030204" pitchFamily="34" charset="77"/>
             </a:endParaRPr>
+          </a:p>
+        </p:txBody>
+      </p:sp>
+      <p:sp>
+        <p:nvSpPr>
+          <p:cNvPr id="2" name="TextBox 1">
+            <a:extLst>
+              <a:ext uri="{FF2B5EF4-FFF2-40B4-BE49-F238E27FC236}">
+                <a16:creationId xmlns:a16="http://schemas.microsoft.com/office/drawing/2014/main" id="{97CDC681-DAC7-643A-2858-3B27DABEF56E}"/>
+              </a:ext>
+            </a:extLst>
+          </p:cNvPr>
+          <p:cNvSpPr txBox="1"/>
+          <p:nvPr/>
+        </p:nvSpPr>
+        <p:spPr>
+          <a:xfrm>
+            <a:off x="-17613" y="6396334"/>
+            <a:ext cx="5225044" cy="461665"/>
+          </a:xfrm>
+          <a:prstGeom prst="rect">
+            <a:avLst/>
+          </a:prstGeom>
+          <a:noFill/>
+        </p:spPr>
+        <p:txBody>
+          <a:bodyPr wrap="square" rtlCol="0">
+            <a:spAutoFit/>
+          </a:bodyPr>
+          <a:lstStyle/>
+          <a:p>
+            <a:r>
+              <a:rPr lang="en-US" sz="1200" dirty="0">
+                <a:solidFill>
+                  <a:schemeClr val="accent5">
+                    <a:lumMod val="60000"/>
+                    <a:lumOff val="40000"/>
+                  </a:schemeClr>
+                </a:solidFill>
+              </a:rPr>
+              <a:t>Image generated by stable-diffusion. </a:t>
+            </a:r>
+          </a:p>
+          <a:p>
+            <a:r>
+              <a:rPr lang="en-US" sz="1200" dirty="0">
+                <a:solidFill>
+                  <a:schemeClr val="accent5">
+                    <a:lumMod val="60000"/>
+                    <a:lumOff val="40000"/>
+                  </a:schemeClr>
+                </a:solidFill>
+              </a:rPr>
+              <a:t>Prompt: A sesame street character who is a product manager sitting at a desk</a:t>
+            </a:r>
           </a:p>
         </p:txBody>
       </p:sp>
@@ -6713,14 +6848,6 @@
 <file path=ppt/slides/slide5.xml><?xml version="1.0" encoding="utf-8"?>
 <p:sld xmlns:a="http://schemas.openxmlformats.org/drawingml/2006/main" xmlns:r="http://schemas.openxmlformats.org/officeDocument/2006/relationships" xmlns:p="http://schemas.openxmlformats.org/presentationml/2006/main">
   <p:cSld>
-    <p:bg>
-      <p:bgPr>
-        <a:solidFill>
-          <a:schemeClr val="bg1"/>
-        </a:solidFill>
-        <a:effectLst/>
-      </p:bgPr>
-    </p:bg>
     <p:spTree>
       <p:nvGrpSpPr>
         <p:cNvPr id="1" name=""/>
@@ -6735,38 +6862,144 @@
           <a:chExt cx="0" cy="0"/>
         </a:xfrm>
       </p:grpSpPr>
-      <p:sp useBgFill="1">
-        <p:nvSpPr>
-          <p:cNvPr id="11" name="Rectangle 10">
-            <a:extLst>
-              <a:ext uri="{FF2B5EF4-FFF2-40B4-BE49-F238E27FC236}">
-                <a16:creationId xmlns:a16="http://schemas.microsoft.com/office/drawing/2014/main" id="{C05CBC3C-2E5A-4839-8B9B-2E5A6ADF0F58}"/>
-              </a:ext>
-              <a:ext uri="{C183D7F6-B498-43B3-948B-1728B52AA6E4}">
-                <adec:decorative xmlns:adec="http://schemas.microsoft.com/office/drawing/2017/decorative" val="1"/>
-              </a:ext>
-            </a:extLst>
-          </p:cNvPr>
-          <p:cNvSpPr>
-            <a:spLocks noGrp="1" noRot="1" noChangeAspect="1" noMove="1" noResize="1" noEditPoints="1" noAdjustHandles="1" noChangeArrowheads="1" noChangeShapeType="1" noTextEdit="1"/>
-          </p:cNvSpPr>
-          <p:nvPr>
-            <p:extLst>
-              <p:ext uri="{386F3935-93C4-4BCD-93E2-E3B085C9AB24}">
-                <p16:designElem xmlns:p16="http://schemas.microsoft.com/office/powerpoint/2015/main" val="1"/>
-              </p:ext>
-            </p:extLst>
-          </p:nvPr>
-        </p:nvSpPr>
+      <p:pic>
+        <p:nvPicPr>
+          <p:cNvPr id="6" name="Picture 5" descr="A stuffed toy next to a computer&#10;&#10;Description automatically generated with medium confidence">
+            <a:extLst>
+              <a:ext uri="{FF2B5EF4-FFF2-40B4-BE49-F238E27FC236}">
+                <a16:creationId xmlns:a16="http://schemas.microsoft.com/office/drawing/2014/main" id="{E8C5F0D7-B226-E5C5-082F-07B40475EAB1}"/>
+              </a:ext>
+            </a:extLst>
+          </p:cNvPr>
+          <p:cNvPicPr>
+            <a:picLocks noChangeAspect="1"/>
+          </p:cNvPicPr>
+          <p:nvPr/>
+        </p:nvPicPr>
+        <p:blipFill>
+          <a:blip r:embed="rId2"/>
+          <a:stretch>
+            <a:fillRect/>
+          </a:stretch>
+        </p:blipFill>
         <p:spPr>
           <a:xfrm>
             <a:off x="0" y="0"/>
-            <a:ext cx="12188952" cy="6858000"/>
+            <a:ext cx="6875790" cy="6875790"/>
           </a:xfrm>
           <a:prstGeom prst="rect">
             <a:avLst/>
           </a:prstGeom>
-          <a:ln>
+        </p:spPr>
+      </p:pic>
+      <p:sp>
+        <p:nvSpPr>
+          <p:cNvPr id="8" name="Cloud Callout 7">
+            <a:extLst>
+              <a:ext uri="{FF2B5EF4-FFF2-40B4-BE49-F238E27FC236}">
+                <a16:creationId xmlns:a16="http://schemas.microsoft.com/office/drawing/2014/main" id="{D0A5B3C1-92AE-FA02-66A0-35440EAA9C9E}"/>
+              </a:ext>
+            </a:extLst>
+          </p:cNvPr>
+          <p:cNvSpPr/>
+          <p:nvPr/>
+        </p:nvSpPr>
+        <p:spPr>
+          <a:xfrm>
+            <a:off x="728681" y="180918"/>
+            <a:ext cx="4605318" cy="2035339"/>
+          </a:xfrm>
+          <a:prstGeom prst="cloudCallout">
+            <a:avLst/>
+          </a:prstGeom>
+          <a:ln w="38100">
+            <a:solidFill>
+              <a:srgbClr val="7030A0"/>
+            </a:solidFill>
+          </a:ln>
+        </p:spPr>
+        <p:style>
+          <a:lnRef idx="2">
+            <a:schemeClr val="accent1">
+              <a:shade val="50000"/>
+            </a:schemeClr>
+          </a:lnRef>
+          <a:fillRef idx="1">
+            <a:schemeClr val="accent1"/>
+          </a:fillRef>
+          <a:effectRef idx="0">
+            <a:schemeClr val="accent1"/>
+          </a:effectRef>
+          <a:fontRef idx="minor">
+            <a:schemeClr val="lt1"/>
+          </a:fontRef>
+        </p:style>
+        <p:txBody>
+          <a:bodyPr vert="horz" lIns="91440" tIns="45720" rIns="91440" bIns="45720" rtlCol="0" anchor="t">
+            <a:noAutofit/>
+          </a:bodyPr>
+          <a:lstStyle/>
+          <a:p>
+            <a:pPr>
+              <a:lnSpc>
+                <a:spcPct val="90000"/>
+              </a:lnSpc>
+              <a:spcAft>
+                <a:spcPts val="600"/>
+              </a:spcAft>
+            </a:pPr>
+            <a:r>
+              <a:rPr lang="en-US" b="0" dirty="0">
+                <a:solidFill>
+                  <a:schemeClr val="accent6">
+                    <a:lumMod val="40000"/>
+                    <a:lumOff val="60000"/>
+                  </a:schemeClr>
+                </a:solidFill>
+                <a:effectLst/>
+                <a:latin typeface="Arial Rounded MT Bold" panose="020F0704030504030204" pitchFamily="34" charset="77"/>
+              </a:rPr>
+              <a:t>I’m a software engineer who was laid off and I want to learn </a:t>
+            </a:r>
+            <a:r>
+              <a:rPr lang="en-US" dirty="0">
+                <a:solidFill>
+                  <a:schemeClr val="accent6">
+                    <a:lumMod val="40000"/>
+                    <a:lumOff val="60000"/>
+                  </a:schemeClr>
+                </a:solidFill>
+                <a:latin typeface="Arial Rounded MT Bold" panose="020F0704030504030204" pitchFamily="34" charset="77"/>
+              </a:rPr>
+              <a:t>fine-tuning for vision and generative models too. </a:t>
+            </a:r>
+          </a:p>
+        </p:txBody>
+      </p:sp>
+      <p:sp>
+        <p:nvSpPr>
+          <p:cNvPr id="4" name="Rectangle 3">
+            <a:extLst>
+              <a:ext uri="{FF2B5EF4-FFF2-40B4-BE49-F238E27FC236}">
+                <a16:creationId xmlns:a16="http://schemas.microsoft.com/office/drawing/2014/main" id="{49BB250C-8331-7189-1EFB-0A18C5974E44}"/>
+              </a:ext>
+            </a:extLst>
+          </p:cNvPr>
+          <p:cNvSpPr/>
+          <p:nvPr/>
+        </p:nvSpPr>
+        <p:spPr>
+          <a:xfrm>
+            <a:off x="6858002" y="0"/>
+            <a:ext cx="5333998" cy="6858000"/>
+          </a:xfrm>
+          <a:prstGeom prst="rect">
+            <a:avLst/>
+          </a:prstGeom>
+          <a:solidFill>
+            <a:srgbClr val="4472C4"/>
+          </a:solidFill>
+          <a:ln w="38100">
             <a:noFill/>
           </a:ln>
         </p:spPr>
@@ -6797,694 +7030,20 @@
       </p:sp>
       <p:sp>
         <p:nvSpPr>
-          <p:cNvPr id="13" name="Freeform: Shape 12">
-            <a:extLst>
-              <a:ext uri="{FF2B5EF4-FFF2-40B4-BE49-F238E27FC236}">
-                <a16:creationId xmlns:a16="http://schemas.microsoft.com/office/drawing/2014/main" id="{DB5B423A-57CC-4C58-AA26-8E2E862B03A0}"/>
-              </a:ext>
-              <a:ext uri="{C183D7F6-B498-43B3-948B-1728B52AA6E4}">
-                <adec:decorative xmlns:adec="http://schemas.microsoft.com/office/drawing/2017/decorative" val="1"/>
-              </a:ext>
-            </a:extLst>
-          </p:cNvPr>
-          <p:cNvSpPr>
-            <a:spLocks noGrp="1" noRot="1" noChangeAspect="1" noMove="1" noResize="1" noEditPoints="1" noAdjustHandles="1" noChangeArrowheads="1" noChangeShapeType="1" noTextEdit="1"/>
-          </p:cNvSpPr>
-          <p:nvPr>
-            <p:extLst>
-              <p:ext uri="{386F3935-93C4-4BCD-93E2-E3B085C9AB24}">
-                <p16:designElem xmlns:p16="http://schemas.microsoft.com/office/powerpoint/2015/main" val="1"/>
-              </p:ext>
-            </p:extLst>
-          </p:nvPr>
+          <p:cNvPr id="10" name="TextBox 9">
+            <a:extLst>
+              <a:ext uri="{FF2B5EF4-FFF2-40B4-BE49-F238E27FC236}">
+                <a16:creationId xmlns:a16="http://schemas.microsoft.com/office/drawing/2014/main" id="{47740309-4EC8-5230-4C2C-5E852684572E}"/>
+              </a:ext>
+            </a:extLst>
+          </p:cNvPr>
+          <p:cNvSpPr txBox="1"/>
+          <p:nvPr/>
         </p:nvSpPr>
         <p:spPr>
           <a:xfrm>
-            <a:off x="1" y="1"/>
-            <a:ext cx="5217023" cy="3994777"/>
-          </a:xfrm>
-          <a:custGeom>
-            <a:avLst/>
-            <a:gdLst>
-              <a:gd name="connsiteX0" fmla="*/ 1945461 w 5217023"/>
-              <a:gd name="connsiteY0" fmla="*/ 3787398 h 3994777"/>
-              <a:gd name="connsiteX1" fmla="*/ 1942113 w 5217023"/>
-              <a:gd name="connsiteY1" fmla="*/ 3790053 h 3994777"/>
-              <a:gd name="connsiteX2" fmla="*/ 1946982 w 5217023"/>
-              <a:gd name="connsiteY2" fmla="*/ 3787990 h 3994777"/>
-              <a:gd name="connsiteX3" fmla="*/ 1945461 w 5217023"/>
-              <a:gd name="connsiteY3" fmla="*/ 3787398 h 3994777"/>
-              <a:gd name="connsiteX4" fmla="*/ 0 w 5217023"/>
-              <a:gd name="connsiteY4" fmla="*/ 0 h 3994777"/>
-              <a:gd name="connsiteX5" fmla="*/ 5030958 w 5217023"/>
-              <a:gd name="connsiteY5" fmla="*/ 0 h 3994777"/>
-              <a:gd name="connsiteX6" fmla="*/ 5046198 w 5217023"/>
-              <a:gd name="connsiteY6" fmla="*/ 153449 h 3994777"/>
-              <a:gd name="connsiteX7" fmla="*/ 5055729 w 5217023"/>
-              <a:gd name="connsiteY7" fmla="*/ 415828 h 3994777"/>
-              <a:gd name="connsiteX8" fmla="*/ 4735242 w 5217023"/>
-              <a:gd name="connsiteY8" fmla="*/ 1867130 h 3994777"/>
-              <a:gd name="connsiteX9" fmla="*/ 3907395 w 5217023"/>
-              <a:gd name="connsiteY9" fmla="*/ 2938441 h 3994777"/>
-              <a:gd name="connsiteX10" fmla="*/ 3946497 w 5217023"/>
-              <a:gd name="connsiteY10" fmla="*/ 2908567 h 3994777"/>
-              <a:gd name="connsiteX11" fmla="*/ 4585421 w 5217023"/>
-              <a:gd name="connsiteY11" fmla="*/ 2188401 h 3994777"/>
-              <a:gd name="connsiteX12" fmla="*/ 5142585 w 5217023"/>
-              <a:gd name="connsiteY12" fmla="*/ 276891 h 3994777"/>
-              <a:gd name="connsiteX13" fmla="*/ 5121833 w 5217023"/>
-              <a:gd name="connsiteY13" fmla="*/ 30208 h 3994777"/>
-              <a:gd name="connsiteX14" fmla="*/ 5116229 w 5217023"/>
-              <a:gd name="connsiteY14" fmla="*/ 0 h 3994777"/>
-              <a:gd name="connsiteX15" fmla="*/ 5184724 w 5217023"/>
-              <a:gd name="connsiteY15" fmla="*/ 0 h 3994777"/>
-              <a:gd name="connsiteX16" fmla="*/ 5196265 w 5217023"/>
-              <a:gd name="connsiteY16" fmla="*/ 66113 h 3994777"/>
-              <a:gd name="connsiteX17" fmla="*/ 5058603 w 5217023"/>
-              <a:gd name="connsiteY17" fmla="*/ 1368242 h 3994777"/>
-              <a:gd name="connsiteX18" fmla="*/ 4096624 w 5217023"/>
-              <a:gd name="connsiteY18" fmla="*/ 2870829 h 3994777"/>
-              <a:gd name="connsiteX19" fmla="*/ 3833203 w 5217023"/>
-              <a:gd name="connsiteY19" fmla="*/ 3092190 h 3994777"/>
-              <a:gd name="connsiteX20" fmla="*/ 3536509 w 5217023"/>
-              <a:gd name="connsiteY20" fmla="*/ 3297128 h 3994777"/>
-              <a:gd name="connsiteX21" fmla="*/ 3148966 w 5217023"/>
-              <a:gd name="connsiteY21" fmla="*/ 3485478 h 3994777"/>
-              <a:gd name="connsiteX22" fmla="*/ 1860557 w 5217023"/>
-              <a:gd name="connsiteY22" fmla="*/ 3880910 h 3994777"/>
-              <a:gd name="connsiteX23" fmla="*/ 573715 w 5217023"/>
-              <a:gd name="connsiteY23" fmla="*/ 3983764 h 3994777"/>
-              <a:gd name="connsiteX24" fmla="*/ 108410 w 5217023"/>
-              <a:gd name="connsiteY24" fmla="*/ 3908816 h 3994777"/>
-              <a:gd name="connsiteX25" fmla="*/ 0 w 5217023"/>
-              <a:gd name="connsiteY25" fmla="*/ 3876793 h 3994777"/>
-              <a:gd name="connsiteX26" fmla="*/ 0 w 5217023"/>
-              <a:gd name="connsiteY26" fmla="*/ 3802912 h 3994777"/>
-              <a:gd name="connsiteX27" fmla="*/ 36975 w 5217023"/>
-              <a:gd name="connsiteY27" fmla="*/ 3815954 h 3994777"/>
-              <a:gd name="connsiteX28" fmla="*/ 561628 w 5217023"/>
-              <a:gd name="connsiteY28" fmla="*/ 3912655 h 3994777"/>
-              <a:gd name="connsiteX29" fmla="*/ 1683086 w 5217023"/>
-              <a:gd name="connsiteY29" fmla="*/ 3844334 h 3994777"/>
-              <a:gd name="connsiteX30" fmla="*/ 1806023 w 5217023"/>
-              <a:gd name="connsiteY30" fmla="*/ 3820992 h 3994777"/>
-              <a:gd name="connsiteX31" fmla="*/ 1921817 w 5217023"/>
-              <a:gd name="connsiteY31" fmla="*/ 3795747 h 3994777"/>
-              <a:gd name="connsiteX32" fmla="*/ 1243689 w 5217023"/>
-              <a:gd name="connsiteY32" fmla="*/ 3846539 h 3994777"/>
-              <a:gd name="connsiteX33" fmla="*/ 62875 w 5217023"/>
-              <a:gd name="connsiteY33" fmla="*/ 3668143 h 3994777"/>
-              <a:gd name="connsiteX34" fmla="*/ 0 w 5217023"/>
-              <a:gd name="connsiteY34" fmla="*/ 3644185 h 3994777"/>
-            </a:gdLst>
-            <a:ahLst/>
-            <a:cxnLst>
-              <a:cxn ang="0">
-                <a:pos x="connsiteX0" y="connsiteY0"/>
-              </a:cxn>
-              <a:cxn ang="0">
-                <a:pos x="connsiteX1" y="connsiteY1"/>
-              </a:cxn>
-              <a:cxn ang="0">
-                <a:pos x="connsiteX2" y="connsiteY2"/>
-              </a:cxn>
-              <a:cxn ang="0">
-                <a:pos x="connsiteX3" y="connsiteY3"/>
-              </a:cxn>
-              <a:cxn ang="0">
-                <a:pos x="connsiteX4" y="connsiteY4"/>
-              </a:cxn>
-              <a:cxn ang="0">
-                <a:pos x="connsiteX5" y="connsiteY5"/>
-              </a:cxn>
-              <a:cxn ang="0">
-                <a:pos x="connsiteX6" y="connsiteY6"/>
-              </a:cxn>
-              <a:cxn ang="0">
-                <a:pos x="connsiteX7" y="connsiteY7"/>
-              </a:cxn>
-              <a:cxn ang="0">
-                <a:pos x="connsiteX8" y="connsiteY8"/>
-              </a:cxn>
-              <a:cxn ang="0">
-                <a:pos x="connsiteX9" y="connsiteY9"/>
-              </a:cxn>
-              <a:cxn ang="0">
-                <a:pos x="connsiteX10" y="connsiteY10"/>
-              </a:cxn>
-              <a:cxn ang="0">
-                <a:pos x="connsiteX11" y="connsiteY11"/>
-              </a:cxn>
-              <a:cxn ang="0">
-                <a:pos x="connsiteX12" y="connsiteY12"/>
-              </a:cxn>
-              <a:cxn ang="0">
-                <a:pos x="connsiteX13" y="connsiteY13"/>
-              </a:cxn>
-              <a:cxn ang="0">
-                <a:pos x="connsiteX14" y="connsiteY14"/>
-              </a:cxn>
-              <a:cxn ang="0">
-                <a:pos x="connsiteX15" y="connsiteY15"/>
-              </a:cxn>
-              <a:cxn ang="0">
-                <a:pos x="connsiteX16" y="connsiteY16"/>
-              </a:cxn>
-              <a:cxn ang="0">
-                <a:pos x="connsiteX17" y="connsiteY17"/>
-              </a:cxn>
-              <a:cxn ang="0">
-                <a:pos x="connsiteX18" y="connsiteY18"/>
-              </a:cxn>
-              <a:cxn ang="0">
-                <a:pos x="connsiteX19" y="connsiteY19"/>
-              </a:cxn>
-              <a:cxn ang="0">
-                <a:pos x="connsiteX20" y="connsiteY20"/>
-              </a:cxn>
-              <a:cxn ang="0">
-                <a:pos x="connsiteX21" y="connsiteY21"/>
-              </a:cxn>
-              <a:cxn ang="0">
-                <a:pos x="connsiteX22" y="connsiteY22"/>
-              </a:cxn>
-              <a:cxn ang="0">
-                <a:pos x="connsiteX23" y="connsiteY23"/>
-              </a:cxn>
-              <a:cxn ang="0">
-                <a:pos x="connsiteX24" y="connsiteY24"/>
-              </a:cxn>
-              <a:cxn ang="0">
-                <a:pos x="connsiteX25" y="connsiteY25"/>
-              </a:cxn>
-              <a:cxn ang="0">
-                <a:pos x="connsiteX26" y="connsiteY26"/>
-              </a:cxn>
-              <a:cxn ang="0">
-                <a:pos x="connsiteX27" y="connsiteY27"/>
-              </a:cxn>
-              <a:cxn ang="0">
-                <a:pos x="connsiteX28" y="connsiteY28"/>
-              </a:cxn>
-              <a:cxn ang="0">
-                <a:pos x="connsiteX29" y="connsiteY29"/>
-              </a:cxn>
-              <a:cxn ang="0">
-                <a:pos x="connsiteX30" y="connsiteY30"/>
-              </a:cxn>
-              <a:cxn ang="0">
-                <a:pos x="connsiteX31" y="connsiteY31"/>
-              </a:cxn>
-              <a:cxn ang="0">
-                <a:pos x="connsiteX32" y="connsiteY32"/>
-              </a:cxn>
-              <a:cxn ang="0">
-                <a:pos x="connsiteX33" y="connsiteY33"/>
-              </a:cxn>
-              <a:cxn ang="0">
-                <a:pos x="connsiteX34" y="connsiteY34"/>
-              </a:cxn>
-            </a:cxnLst>
-            <a:rect l="l" t="t" r="r" b="b"/>
-            <a:pathLst>
-              <a:path w="5217023" h="3994777">
-                <a:moveTo>
-                  <a:pt x="1945461" y="3787398"/>
-                </a:moveTo>
-                <a:lnTo>
-                  <a:pt x="1942113" y="3790053"/>
-                </a:lnTo>
-                <a:lnTo>
-                  <a:pt x="1946982" y="3787990"/>
-                </a:lnTo>
-                <a:cubicBezTo>
-                  <a:pt x="1946982" y="3787990"/>
-                  <a:pt x="1946379" y="3787019"/>
-                  <a:pt x="1945461" y="3787398"/>
-                </a:cubicBezTo>
-                <a:close/>
-                <a:moveTo>
-                  <a:pt x="0" y="0"/>
-                </a:moveTo>
-                <a:lnTo>
-                  <a:pt x="5030958" y="0"/>
-                </a:lnTo>
-                <a:lnTo>
-                  <a:pt x="5046198" y="153449"/>
-                </a:lnTo>
-                <a:cubicBezTo>
-                  <a:pt x="5052189" y="240558"/>
-                  <a:pt x="5055458" y="328007"/>
-                  <a:pt x="5055729" y="415828"/>
-                </a:cubicBezTo>
-                <a:cubicBezTo>
-                  <a:pt x="5057604" y="923672"/>
-                  <a:pt x="4959210" y="1409054"/>
-                  <a:pt x="4735242" y="1867130"/>
-                </a:cubicBezTo>
-                <a:cubicBezTo>
-                  <a:pt x="4533284" y="2280198"/>
-                  <a:pt x="4248921" y="2629330"/>
-                  <a:pt x="3907395" y="2938441"/>
-                </a:cubicBezTo>
-                <a:cubicBezTo>
-                  <a:pt x="3922498" y="2931535"/>
-                  <a:pt x="3935859" y="2921330"/>
-                  <a:pt x="3946497" y="2908567"/>
-                </a:cubicBezTo>
-                <a:cubicBezTo>
-                  <a:pt x="4193494" y="2700987"/>
-                  <a:pt x="4408756" y="2458364"/>
-                  <a:pt x="4585421" y="2188401"/>
-                </a:cubicBezTo>
-                <a:cubicBezTo>
-                  <a:pt x="4967641" y="1608533"/>
-                  <a:pt x="5169304" y="975361"/>
-                  <a:pt x="5142585" y="276891"/>
-                </a:cubicBezTo>
-                <a:cubicBezTo>
-                  <a:pt x="5139764" y="194215"/>
-                  <a:pt x="5132824" y="111888"/>
-                  <a:pt x="5121833" y="30208"/>
-                </a:cubicBezTo>
-                <a:lnTo>
-                  <a:pt x="5116229" y="0"/>
-                </a:lnTo>
-                <a:lnTo>
-                  <a:pt x="5184724" y="0"/>
-                </a:lnTo>
-                <a:lnTo>
-                  <a:pt x="5196265" y="66113"/>
-                </a:lnTo>
-                <a:cubicBezTo>
-                  <a:pt x="5249921" y="496647"/>
-                  <a:pt x="5197997" y="931171"/>
-                  <a:pt x="5058603" y="1368242"/>
-                </a:cubicBezTo>
-                <a:cubicBezTo>
-                  <a:pt x="4872414" y="1953929"/>
-                  <a:pt x="4544298" y="2451351"/>
-                  <a:pt x="4096624" y="2870829"/>
-                </a:cubicBezTo>
-                <a:cubicBezTo>
-                  <a:pt x="4012832" y="2949426"/>
-                  <a:pt x="3924415" y="3022439"/>
-                  <a:pt x="3833203" y="3092190"/>
-                </a:cubicBezTo>
-                <a:cubicBezTo>
-                  <a:pt x="3741992" y="3161943"/>
-                  <a:pt x="3648667" y="3225510"/>
-                  <a:pt x="3536509" y="3297128"/>
-                </a:cubicBezTo>
-                <a:cubicBezTo>
-                  <a:pt x="3427215" y="3372735"/>
-                  <a:pt x="3288598" y="3430233"/>
-                  <a:pt x="3148966" y="3485478"/>
-                </a:cubicBezTo>
-                <a:cubicBezTo>
-                  <a:pt x="2729930" y="3651299"/>
-                  <a:pt x="2302194" y="3788890"/>
-                  <a:pt x="1860557" y="3880910"/>
-                </a:cubicBezTo>
-                <a:cubicBezTo>
-                  <a:pt x="1435974" y="3969444"/>
-                  <a:pt x="1008052" y="4017957"/>
-                  <a:pt x="573715" y="3983764"/>
-                </a:cubicBezTo>
-                <a:cubicBezTo>
-                  <a:pt x="415134" y="3971300"/>
-                  <a:pt x="259585" y="3947743"/>
-                  <a:pt x="108410" y="3908816"/>
-                </a:cubicBezTo>
-                <a:lnTo>
-                  <a:pt x="0" y="3876793"/>
-                </a:lnTo>
-                <a:lnTo>
-                  <a:pt x="0" y="3802912"/>
-                </a:lnTo>
-                <a:lnTo>
-                  <a:pt x="36975" y="3815954"/>
-                </a:lnTo>
-                <a:cubicBezTo>
-                  <a:pt x="206404" y="3867475"/>
-                  <a:pt x="382020" y="3897326"/>
-                  <a:pt x="561628" y="3912655"/>
-                </a:cubicBezTo>
-                <a:cubicBezTo>
-                  <a:pt x="938583" y="3944832"/>
-                  <a:pt x="1311814" y="3910697"/>
-                  <a:pt x="1683086" y="3844334"/>
-                </a:cubicBezTo>
-                <a:cubicBezTo>
-                  <a:pt x="1724123" y="3837151"/>
-                  <a:pt x="1765097" y="3829374"/>
-                  <a:pt x="1806023" y="3820992"/>
-                </a:cubicBezTo>
-                <a:cubicBezTo>
-                  <a:pt x="1844740" y="3813079"/>
-                  <a:pt x="1883218" y="3804161"/>
-                  <a:pt x="1921817" y="3795747"/>
-                </a:cubicBezTo>
-                <a:cubicBezTo>
-                  <a:pt x="1697011" y="3826435"/>
-                  <a:pt x="1470551" y="3843387"/>
-                  <a:pt x="1243689" y="3846539"/>
-                </a:cubicBezTo>
-                <a:cubicBezTo>
-                  <a:pt x="839058" y="3849054"/>
-                  <a:pt x="443424" y="3800206"/>
-                  <a:pt x="62875" y="3668143"/>
-                </a:cubicBezTo>
-                <a:lnTo>
-                  <a:pt x="0" y="3644185"/>
-                </a:lnTo>
-                <a:close/>
-              </a:path>
-            </a:pathLst>
-          </a:custGeom>
-          <a:solidFill>
-            <a:schemeClr val="accent2"/>
-          </a:solidFill>
-          <a:ln>
-            <a:noFill/>
-          </a:ln>
-        </p:spPr>
-        <p:style>
-          <a:lnRef idx="2">
-            <a:schemeClr val="accent1">
-              <a:shade val="50000"/>
-            </a:schemeClr>
-          </a:lnRef>
-          <a:fillRef idx="1">
-            <a:schemeClr val="accent1"/>
-          </a:fillRef>
-          <a:effectRef idx="0">
-            <a:schemeClr val="accent1"/>
-          </a:effectRef>
-          <a:fontRef idx="minor">
-            <a:schemeClr val="lt1"/>
-          </a:fontRef>
-        </p:style>
-        <p:txBody>
-          <a:bodyPr wrap="square" rtlCol="0" anchor="ctr">
-            <a:noAutofit/>
-          </a:bodyPr>
-          <a:lstStyle/>
-          <a:p>
-            <a:pPr algn="ctr"/>
-            <a:endParaRPr lang="en-US"/>
-          </a:p>
-        </p:txBody>
-      </p:sp>
-      <p:pic>
-        <p:nvPicPr>
-          <p:cNvPr id="4" name="Picture 3" descr="A puppet sitting at a desk with a computer&#10;&#10;Description automatically generated with low confidence">
-            <a:extLst>
-              <a:ext uri="{FF2B5EF4-FFF2-40B4-BE49-F238E27FC236}">
-                <a16:creationId xmlns:a16="http://schemas.microsoft.com/office/drawing/2014/main" id="{29E0D5D8-A48A-F4AC-EBBD-AF091068E30B}"/>
-              </a:ext>
-            </a:extLst>
-          </p:cNvPr>
-          <p:cNvPicPr>
-            <a:picLocks noChangeAspect="1"/>
-          </p:cNvPicPr>
-          <p:nvPr/>
-        </p:nvPicPr>
-        <p:blipFill>
-          <a:blip r:embed="rId3"/>
-          <a:stretch>
-            <a:fillRect/>
-          </a:stretch>
-        </p:blipFill>
-        <p:spPr>
-          <a:xfrm>
-            <a:off x="-1" y="0"/>
-            <a:ext cx="6890012" cy="6890012"/>
-          </a:xfrm>
-          <a:prstGeom prst="rect">
-            <a:avLst/>
-          </a:prstGeom>
-        </p:spPr>
-      </p:pic>
-      <p:sp>
-        <p:nvSpPr>
-          <p:cNvPr id="12" name="Oval Callout 11">
-            <a:extLst>
-              <a:ext uri="{FF2B5EF4-FFF2-40B4-BE49-F238E27FC236}">
-                <a16:creationId xmlns:a16="http://schemas.microsoft.com/office/drawing/2014/main" id="{8E9D7D5D-3A78-6F25-F53F-46CEB00364C3}"/>
-              </a:ext>
-            </a:extLst>
-          </p:cNvPr>
-          <p:cNvSpPr/>
-          <p:nvPr/>
-        </p:nvSpPr>
-        <p:spPr>
-          <a:xfrm rot="662834">
-            <a:off x="2864667" y="63642"/>
-            <a:ext cx="3013191" cy="1667765"/>
-          </a:xfrm>
-          <a:custGeom>
-            <a:avLst/>
-            <a:gdLst>
-              <a:gd name="connsiteX0" fmla="*/ 878857 w 3013191"/>
-              <a:gd name="connsiteY0" fmla="*/ 1876236 h 1667765"/>
-              <a:gd name="connsiteX1" fmla="*/ 766208 w 3013191"/>
-              <a:gd name="connsiteY1" fmla="*/ 1560125 h 1667765"/>
-              <a:gd name="connsiteX2" fmla="*/ 624824 w 3013191"/>
-              <a:gd name="connsiteY2" fmla="*/ 157741 h 1667765"/>
-              <a:gd name="connsiteX3" fmla="*/ 1955312 w 3013191"/>
-              <a:gd name="connsiteY3" fmla="*/ 37844 h 1667765"/>
-              <a:gd name="connsiteX4" fmla="*/ 2737495 w 3013191"/>
-              <a:gd name="connsiteY4" fmla="*/ 1314724 h 1667765"/>
-              <a:gd name="connsiteX5" fmla="*/ 1311649 w 3013191"/>
-              <a:gd name="connsiteY5" fmla="*/ 1660756 h 1667765"/>
-              <a:gd name="connsiteX6" fmla="*/ 878857 w 3013191"/>
-              <a:gd name="connsiteY6" fmla="*/ 1876236 h 1667765"/>
-            </a:gdLst>
-            <a:ahLst/>
-            <a:cxnLst>
-              <a:cxn ang="0">
-                <a:pos x="connsiteX0" y="connsiteY0"/>
-              </a:cxn>
-              <a:cxn ang="0">
-                <a:pos x="connsiteX1" y="connsiteY1"/>
-              </a:cxn>
-              <a:cxn ang="0">
-                <a:pos x="connsiteX2" y="connsiteY2"/>
-              </a:cxn>
-              <a:cxn ang="0">
-                <a:pos x="connsiteX3" y="connsiteY3"/>
-              </a:cxn>
-              <a:cxn ang="0">
-                <a:pos x="connsiteX4" y="connsiteY4"/>
-              </a:cxn>
-              <a:cxn ang="0">
-                <a:pos x="connsiteX5" y="connsiteY5"/>
-              </a:cxn>
-              <a:cxn ang="0">
-                <a:pos x="connsiteX6" y="connsiteY6"/>
-              </a:cxn>
-            </a:cxnLst>
-            <a:rect l="l" t="t" r="r" b="b"/>
-            <a:pathLst>
-              <a:path w="3013191" h="1667765" fill="none" extrusionOk="0">
-                <a:moveTo>
-                  <a:pt x="878857" y="1876236"/>
-                </a:moveTo>
-                <a:cubicBezTo>
-                  <a:pt x="840226" y="1832838"/>
-                  <a:pt x="800813" y="1608104"/>
-                  <a:pt x="766208" y="1560125"/>
-                </a:cubicBezTo>
-                <a:cubicBezTo>
-                  <a:pt x="-165198" y="1275629"/>
-                  <a:pt x="-200309" y="529685"/>
-                  <a:pt x="624824" y="157741"/>
-                </a:cubicBezTo>
-                <a:cubicBezTo>
-                  <a:pt x="1001867" y="2832"/>
-                  <a:pt x="1558016" y="5088"/>
-                  <a:pt x="1955312" y="37844"/>
-                </a:cubicBezTo>
-                <a:cubicBezTo>
-                  <a:pt x="3006122" y="317902"/>
-                  <a:pt x="3328531" y="868638"/>
-                  <a:pt x="2737495" y="1314724"/>
-                </a:cubicBezTo>
-                <a:cubicBezTo>
-                  <a:pt x="2456381" y="1631234"/>
-                  <a:pt x="1887433" y="1726908"/>
-                  <a:pt x="1311649" y="1660756"/>
-                </a:cubicBezTo>
-                <a:cubicBezTo>
-                  <a:pt x="1178110" y="1734558"/>
-                  <a:pt x="1023774" y="1819649"/>
-                  <a:pt x="878857" y="1876236"/>
-                </a:cubicBezTo>
-                <a:close/>
-              </a:path>
-              <a:path w="3013191" h="1667765" stroke="0" extrusionOk="0">
-                <a:moveTo>
-                  <a:pt x="878857" y="1876236"/>
-                </a:moveTo>
-                <a:cubicBezTo>
-                  <a:pt x="855819" y="1829649"/>
-                  <a:pt x="825437" y="1705543"/>
-                  <a:pt x="766208" y="1560125"/>
-                </a:cubicBezTo>
-                <a:cubicBezTo>
-                  <a:pt x="-61280" y="1288478"/>
-                  <a:pt x="-304706" y="515014"/>
-                  <a:pt x="624824" y="157741"/>
-                </a:cubicBezTo>
-                <a:cubicBezTo>
-                  <a:pt x="1002042" y="11329"/>
-                  <a:pt x="1493603" y="8515"/>
-                  <a:pt x="1955312" y="37844"/>
-                </a:cubicBezTo>
-                <a:cubicBezTo>
-                  <a:pt x="2915503" y="197779"/>
-                  <a:pt x="3451177" y="911795"/>
-                  <a:pt x="2737495" y="1314724"/>
-                </a:cubicBezTo>
-                <a:cubicBezTo>
-                  <a:pt x="2491642" y="1576670"/>
-                  <a:pt x="1897130" y="1636990"/>
-                  <a:pt x="1311649" y="1660756"/>
-                </a:cubicBezTo>
-                <a:cubicBezTo>
-                  <a:pt x="1236975" y="1737294"/>
-                  <a:pt x="924335" y="1845524"/>
-                  <a:pt x="878857" y="1876236"/>
-                </a:cubicBezTo>
-                <a:close/>
-              </a:path>
-            </a:pathLst>
-          </a:custGeom>
-          <a:solidFill>
-            <a:srgbClr val="4472C4"/>
-          </a:solidFill>
-          <a:ln w="76200">
-            <a:solidFill>
-              <a:srgbClr val="7030A0"/>
-            </a:solidFill>
-            <a:extLst>
-              <a:ext uri="{C807C97D-BFC1-408E-A445-0C87EB9F89A2}">
-                <ask:lineSketchStyleProps xmlns:ask="http://schemas.microsoft.com/office/drawing/2018/sketchyshapes" sd="1219033472">
-                  <a:prstGeom prst="wedgeEllipseCallout">
-                    <a:avLst/>
-                  </a:prstGeom>
-                  <ask:type>
-                    <ask:lineSketchCurved/>
-                  </ask:type>
-                </ask:lineSketchStyleProps>
-              </a:ext>
-            </a:extLst>
-          </a:ln>
-        </p:spPr>
-        <p:style>
-          <a:lnRef idx="2">
-            <a:schemeClr val="accent1">
-              <a:shade val="50000"/>
-            </a:schemeClr>
-          </a:lnRef>
-          <a:fillRef idx="1">
-            <a:schemeClr val="accent1"/>
-          </a:fillRef>
-          <a:effectRef idx="0">
-            <a:schemeClr val="accent1"/>
-          </a:effectRef>
-          <a:fontRef idx="minor">
-            <a:schemeClr val="lt1"/>
-          </a:fontRef>
-        </p:style>
-        <p:txBody>
-          <a:bodyPr rtlCol="0" anchor="ctr"/>
-          <a:lstStyle/>
-          <a:p>
-            <a:pPr algn="ctr"/>
-            <a:r>
-              <a:rPr lang="en-US" sz="2000" b="0" dirty="0">
-                <a:solidFill>
-                  <a:schemeClr val="accent6">
-                    <a:lumMod val="40000"/>
-                    <a:lumOff val="60000"/>
-                  </a:schemeClr>
-                </a:solidFill>
-                <a:effectLst/>
-                <a:latin typeface="Arial Rounded MT Bold" panose="020F0704030504030204" pitchFamily="34" charset="77"/>
-              </a:rPr>
-              <a:t>I want to specialize in NLP!</a:t>
-            </a:r>
-          </a:p>
-          <a:p>
-            <a:pPr algn="ctr"/>
-            <a:endParaRPr lang="en-US" dirty="0"/>
-          </a:p>
-        </p:txBody>
-      </p:sp>
-      <p:sp>
-        <p:nvSpPr>
-          <p:cNvPr id="2" name="Rectangle 1">
-            <a:extLst>
-              <a:ext uri="{FF2B5EF4-FFF2-40B4-BE49-F238E27FC236}">
-                <a16:creationId xmlns:a16="http://schemas.microsoft.com/office/drawing/2014/main" id="{29C2A692-5175-CC81-4144-9F57A97C5A1D}"/>
-              </a:ext>
-            </a:extLst>
-          </p:cNvPr>
-          <p:cNvSpPr/>
-          <p:nvPr/>
-        </p:nvSpPr>
-        <p:spPr>
-          <a:xfrm>
-            <a:off x="6890011" y="16006"/>
-            <a:ext cx="5333998" cy="6858000"/>
-          </a:xfrm>
-          <a:prstGeom prst="rect">
-            <a:avLst/>
-          </a:prstGeom>
-        </p:spPr>
-        <p:style>
-          <a:lnRef idx="2">
-            <a:schemeClr val="accent1">
-              <a:shade val="50000"/>
-            </a:schemeClr>
-          </a:lnRef>
-          <a:fillRef idx="1">
-            <a:schemeClr val="accent1"/>
-          </a:fillRef>
-          <a:effectRef idx="0">
-            <a:schemeClr val="accent1"/>
-          </a:effectRef>
-          <a:fontRef idx="minor">
-            <a:schemeClr val="lt1"/>
-          </a:fontRef>
-        </p:style>
-        <p:txBody>
-          <a:bodyPr rtlCol="0" anchor="ctr"/>
-          <a:lstStyle/>
-          <a:p>
-            <a:pPr algn="ctr"/>
-            <a:endParaRPr lang="en-US" dirty="0"/>
-          </a:p>
-        </p:txBody>
-      </p:sp>
-      <p:sp>
-        <p:nvSpPr>
-          <p:cNvPr id="3" name="TextBox 2">
-            <a:extLst>
-              <a:ext uri="{FF2B5EF4-FFF2-40B4-BE49-F238E27FC236}">
-                <a16:creationId xmlns:a16="http://schemas.microsoft.com/office/drawing/2014/main" id="{30DF1EB7-ADEE-3B17-4844-E9AFC4ABDBB3}"/>
-              </a:ext>
-            </a:extLst>
-          </p:cNvPr>
-          <p:cNvSpPr txBox="1"/>
-          <p:nvPr/>
-        </p:nvSpPr>
-        <p:spPr>
-          <a:xfrm>
-            <a:off x="7488663" y="3429000"/>
-            <a:ext cx="4016869" cy="1138773"/>
+            <a:off x="7489682" y="3554961"/>
+            <a:ext cx="4459512" cy="2000548"/>
           </a:xfrm>
           <a:prstGeom prst="rect">
             <a:avLst/>
@@ -7492,7 +7051,7 @@
           <a:noFill/>
         </p:spPr>
         <p:txBody>
-          <a:bodyPr wrap="none" rtlCol="0">
+          <a:bodyPr wrap="square" rtlCol="0">
             <a:spAutoFit/>
           </a:bodyPr>
           <a:lstStyle/>
@@ -7511,6 +7070,48 @@
             </a:r>
           </a:p>
           <a:p>
+            <a:pPr marL="457200" indent="-457200">
+              <a:buFontTx/>
+              <a:buChar char="-"/>
+            </a:pPr>
+            <a:r>
+              <a:rPr lang="en-US" sz="2800" dirty="0">
+                <a:solidFill>
+                  <a:schemeClr val="accent6">
+                    <a:lumMod val="40000"/>
+                    <a:lumOff val="60000"/>
+                  </a:schemeClr>
+                </a:solidFill>
+                <a:latin typeface="Arial Rounded MT Bold" panose="020F0704030504030204" pitchFamily="34" charset="77"/>
+              </a:rPr>
+              <a:t>Hugging Face </a:t>
+            </a:r>
+            <a:r>
+              <a:rPr lang="en-US" sz="2800" dirty="0" err="1">
+                <a:solidFill>
+                  <a:schemeClr val="accent6">
+                    <a:lumMod val="40000"/>
+                    <a:lumOff val="60000"/>
+                  </a:schemeClr>
+                </a:solidFill>
+                <a:latin typeface="Arial Rounded MT Bold" panose="020F0704030504030204" pitchFamily="34" charset="77"/>
+              </a:rPr>
+              <a:t>Youtube</a:t>
+            </a:r>
+            <a:r>
+              <a:rPr lang="en-US" sz="2800" dirty="0">
+                <a:solidFill>
+                  <a:schemeClr val="accent6">
+                    <a:lumMod val="40000"/>
+                    <a:lumOff val="60000"/>
+                  </a:schemeClr>
+                </a:solidFill>
+                <a:latin typeface="Arial Rounded MT Bold" panose="020F0704030504030204" pitchFamily="34" charset="77"/>
+              </a:rPr>
+              <a:t> Series</a:t>
+            </a:r>
+          </a:p>
+          <a:p>
             <a:endParaRPr lang="en-US" sz="2000" dirty="0">
               <a:solidFill>
                 <a:schemeClr val="accent6">
@@ -7536,10 +7137,10 @@
       </p:sp>
       <p:sp>
         <p:nvSpPr>
-          <p:cNvPr id="5" name="TextBox 4">
-            <a:extLst>
-              <a:ext uri="{FF2B5EF4-FFF2-40B4-BE49-F238E27FC236}">
-                <a16:creationId xmlns:a16="http://schemas.microsoft.com/office/drawing/2014/main" id="{5E3BC038-85C4-28D5-E575-C59632BE0BA5}"/>
+          <p:cNvPr id="11" name="TextBox 10">
+            <a:extLst>
+              <a:ext uri="{FF2B5EF4-FFF2-40B4-BE49-F238E27FC236}">
+                <a16:creationId xmlns:a16="http://schemas.microsoft.com/office/drawing/2014/main" id="{106BDF14-836D-C035-989D-B9BB48199F86}"/>
               </a:ext>
             </a:extLst>
           </p:cNvPr>
@@ -7549,7 +7150,7 @@
         <p:spPr>
           <a:xfrm>
             <a:off x="7408385" y="858616"/>
-            <a:ext cx="4897303" cy="2431435"/>
+            <a:ext cx="4459512" cy="3724096"/>
           </a:xfrm>
           <a:prstGeom prst="rect">
             <a:avLst/>
@@ -7557,7 +7158,7 @@
           <a:noFill/>
         </p:spPr>
         <p:txBody>
-          <a:bodyPr wrap="none" rtlCol="0">
+          <a:bodyPr wrap="square" rtlCol="0">
             <a:spAutoFit/>
           </a:bodyPr>
           <a:lstStyle/>
@@ -7572,7 +7173,7 @@
                 </a:solidFill>
                 <a:latin typeface="Arial Rounded MT Bold" panose="020F0704030504030204" pitchFamily="34" charset="77"/>
               </a:rPr>
-              <a:t>Tune in to Part 2:</a:t>
+              <a:t>Tune in to Parts 3 and 4:</a:t>
             </a:r>
           </a:p>
           <a:p>
@@ -7590,7 +7191,7 @@
                 </a:solidFill>
                 <a:latin typeface="Arial Rounded MT Bold" panose="020F0704030504030204" pitchFamily="34" charset="77"/>
               </a:rPr>
-              <a:t>Vocab</a:t>
+              <a:t>Reusing our code to train on a new data set for a new objective</a:t>
             </a:r>
           </a:p>
           <a:p>
@@ -7608,7 +7209,7 @@
                 </a:solidFill>
                 <a:latin typeface="Arial Rounded MT Bold" panose="020F0704030504030204" pitchFamily="34" charset="77"/>
               </a:rPr>
-              <a:t>Evaluating the Tokenizer</a:t>
+              <a:t>The SOTA Landscape</a:t>
             </a:r>
           </a:p>
           <a:p>
@@ -7646,10 +7247,65 @@
           </a:p>
         </p:txBody>
       </p:sp>
+      <p:sp>
+        <p:nvSpPr>
+          <p:cNvPr id="2" name="TextBox 1">
+            <a:extLst>
+              <a:ext uri="{FF2B5EF4-FFF2-40B4-BE49-F238E27FC236}">
+                <a16:creationId xmlns:a16="http://schemas.microsoft.com/office/drawing/2014/main" id="{29B87635-27B3-FE5D-4E7E-61A0892F942F}"/>
+              </a:ext>
+            </a:extLst>
+          </p:cNvPr>
+          <p:cNvSpPr txBox="1"/>
+          <p:nvPr/>
+        </p:nvSpPr>
+        <p:spPr>
+          <a:xfrm>
+            <a:off x="7054794" y="6396335"/>
+            <a:ext cx="5137206" cy="461665"/>
+          </a:xfrm>
+          <a:prstGeom prst="rect">
+            <a:avLst/>
+          </a:prstGeom>
+          <a:noFill/>
+        </p:spPr>
+        <p:txBody>
+          <a:bodyPr wrap="square" rtlCol="0">
+            <a:spAutoFit/>
+          </a:bodyPr>
+          <a:lstStyle/>
+          <a:p>
+            <a:r>
+              <a:rPr lang="en-US" sz="1200" dirty="0">
+                <a:solidFill>
+                  <a:schemeClr val="accent5">
+                    <a:lumMod val="60000"/>
+                    <a:lumOff val="40000"/>
+                  </a:schemeClr>
+                </a:solidFill>
+              </a:rPr>
+              <a:t>Image generated by stable-diffusion. </a:t>
+            </a:r>
+          </a:p>
+          <a:p>
+            <a:r>
+              <a:rPr lang="en-US" sz="1200" dirty="0">
+                <a:solidFill>
+                  <a:schemeClr val="accent5">
+                    <a:lumMod val="60000"/>
+                    <a:lumOff val="40000"/>
+                  </a:schemeClr>
+                </a:solidFill>
+              </a:rPr>
+              <a:t>Prompt: A sesame street character who is a software engineer sitting at a desk</a:t>
+            </a:r>
+          </a:p>
+        </p:txBody>
+      </p:sp>
     </p:spTree>
     <p:extLst>
       <p:ext uri="{BB962C8B-B14F-4D97-AF65-F5344CB8AC3E}">
-        <p14:creationId xmlns:p14="http://schemas.microsoft.com/office/powerpoint/2010/main" val="89120223"/>
+        <p14:creationId xmlns:p14="http://schemas.microsoft.com/office/powerpoint/2010/main" val="684992848"/>
       </p:ext>
     </p:extLst>
   </p:cSld>
@@ -7686,1360 +7342,6 @@
       </p:grpSpPr>
       <p:sp useBgFill="1">
         <p:nvSpPr>
-          <p:cNvPr id="11" name="Rectangle 10">
-            <a:extLst>
-              <a:ext uri="{FF2B5EF4-FFF2-40B4-BE49-F238E27FC236}">
-                <a16:creationId xmlns:a16="http://schemas.microsoft.com/office/drawing/2014/main" id="{C05CBC3C-2E5A-4839-8B9B-2E5A6ADF0F58}"/>
-              </a:ext>
-              <a:ext uri="{C183D7F6-B498-43B3-948B-1728B52AA6E4}">
-                <adec:decorative xmlns:adec="http://schemas.microsoft.com/office/drawing/2017/decorative" val="1"/>
-              </a:ext>
-            </a:extLst>
-          </p:cNvPr>
-          <p:cNvSpPr>
-            <a:spLocks noGrp="1" noRot="1" noChangeAspect="1" noMove="1" noResize="1" noEditPoints="1" noAdjustHandles="1" noChangeArrowheads="1" noChangeShapeType="1" noTextEdit="1"/>
-          </p:cNvSpPr>
-          <p:nvPr>
-            <p:extLst>
-              <p:ext uri="{386F3935-93C4-4BCD-93E2-E3B085C9AB24}">
-                <p16:designElem xmlns:p16="http://schemas.microsoft.com/office/powerpoint/2015/main" val="1"/>
-              </p:ext>
-            </p:extLst>
-          </p:nvPr>
-        </p:nvSpPr>
-        <p:spPr>
-          <a:xfrm>
-            <a:off x="0" y="0"/>
-            <a:ext cx="12188952" cy="6858000"/>
-          </a:xfrm>
-          <a:prstGeom prst="rect">
-            <a:avLst/>
-          </a:prstGeom>
-          <a:ln>
-            <a:noFill/>
-          </a:ln>
-        </p:spPr>
-        <p:style>
-          <a:lnRef idx="2">
-            <a:schemeClr val="accent1">
-              <a:shade val="50000"/>
-            </a:schemeClr>
-          </a:lnRef>
-          <a:fillRef idx="1">
-            <a:schemeClr val="accent1"/>
-          </a:fillRef>
-          <a:effectRef idx="0">
-            <a:schemeClr val="accent1"/>
-          </a:effectRef>
-          <a:fontRef idx="minor">
-            <a:schemeClr val="lt1"/>
-          </a:fontRef>
-        </p:style>
-        <p:txBody>
-          <a:bodyPr rtlCol="0" anchor="ctr"/>
-          <a:lstStyle/>
-          <a:p>
-            <a:pPr algn="ctr"/>
-            <a:endParaRPr lang="en-US"/>
-          </a:p>
-        </p:txBody>
-      </p:sp>
-      <p:sp>
-        <p:nvSpPr>
-          <p:cNvPr id="13" name="Freeform: Shape 12">
-            <a:extLst>
-              <a:ext uri="{FF2B5EF4-FFF2-40B4-BE49-F238E27FC236}">
-                <a16:creationId xmlns:a16="http://schemas.microsoft.com/office/drawing/2014/main" id="{DB5B423A-57CC-4C58-AA26-8E2E862B03A0}"/>
-              </a:ext>
-              <a:ext uri="{C183D7F6-B498-43B3-948B-1728B52AA6E4}">
-                <adec:decorative xmlns:adec="http://schemas.microsoft.com/office/drawing/2017/decorative" val="1"/>
-              </a:ext>
-            </a:extLst>
-          </p:cNvPr>
-          <p:cNvSpPr>
-            <a:spLocks noGrp="1" noRot="1" noChangeAspect="1" noMove="1" noResize="1" noEditPoints="1" noAdjustHandles="1" noChangeArrowheads="1" noChangeShapeType="1" noTextEdit="1"/>
-          </p:cNvSpPr>
-          <p:nvPr>
-            <p:extLst>
-              <p:ext uri="{386F3935-93C4-4BCD-93E2-E3B085C9AB24}">
-                <p16:designElem xmlns:p16="http://schemas.microsoft.com/office/powerpoint/2015/main" val="1"/>
-              </p:ext>
-            </p:extLst>
-          </p:nvPr>
-        </p:nvSpPr>
-        <p:spPr>
-          <a:xfrm>
-            <a:off x="1" y="1"/>
-            <a:ext cx="5217023" cy="3994777"/>
-          </a:xfrm>
-          <a:custGeom>
-            <a:avLst/>
-            <a:gdLst>
-              <a:gd name="connsiteX0" fmla="*/ 1945461 w 5217023"/>
-              <a:gd name="connsiteY0" fmla="*/ 3787398 h 3994777"/>
-              <a:gd name="connsiteX1" fmla="*/ 1942113 w 5217023"/>
-              <a:gd name="connsiteY1" fmla="*/ 3790053 h 3994777"/>
-              <a:gd name="connsiteX2" fmla="*/ 1946982 w 5217023"/>
-              <a:gd name="connsiteY2" fmla="*/ 3787990 h 3994777"/>
-              <a:gd name="connsiteX3" fmla="*/ 1945461 w 5217023"/>
-              <a:gd name="connsiteY3" fmla="*/ 3787398 h 3994777"/>
-              <a:gd name="connsiteX4" fmla="*/ 0 w 5217023"/>
-              <a:gd name="connsiteY4" fmla="*/ 0 h 3994777"/>
-              <a:gd name="connsiteX5" fmla="*/ 5030958 w 5217023"/>
-              <a:gd name="connsiteY5" fmla="*/ 0 h 3994777"/>
-              <a:gd name="connsiteX6" fmla="*/ 5046198 w 5217023"/>
-              <a:gd name="connsiteY6" fmla="*/ 153449 h 3994777"/>
-              <a:gd name="connsiteX7" fmla="*/ 5055729 w 5217023"/>
-              <a:gd name="connsiteY7" fmla="*/ 415828 h 3994777"/>
-              <a:gd name="connsiteX8" fmla="*/ 4735242 w 5217023"/>
-              <a:gd name="connsiteY8" fmla="*/ 1867130 h 3994777"/>
-              <a:gd name="connsiteX9" fmla="*/ 3907395 w 5217023"/>
-              <a:gd name="connsiteY9" fmla="*/ 2938441 h 3994777"/>
-              <a:gd name="connsiteX10" fmla="*/ 3946497 w 5217023"/>
-              <a:gd name="connsiteY10" fmla="*/ 2908567 h 3994777"/>
-              <a:gd name="connsiteX11" fmla="*/ 4585421 w 5217023"/>
-              <a:gd name="connsiteY11" fmla="*/ 2188401 h 3994777"/>
-              <a:gd name="connsiteX12" fmla="*/ 5142585 w 5217023"/>
-              <a:gd name="connsiteY12" fmla="*/ 276891 h 3994777"/>
-              <a:gd name="connsiteX13" fmla="*/ 5121833 w 5217023"/>
-              <a:gd name="connsiteY13" fmla="*/ 30208 h 3994777"/>
-              <a:gd name="connsiteX14" fmla="*/ 5116229 w 5217023"/>
-              <a:gd name="connsiteY14" fmla="*/ 0 h 3994777"/>
-              <a:gd name="connsiteX15" fmla="*/ 5184724 w 5217023"/>
-              <a:gd name="connsiteY15" fmla="*/ 0 h 3994777"/>
-              <a:gd name="connsiteX16" fmla="*/ 5196265 w 5217023"/>
-              <a:gd name="connsiteY16" fmla="*/ 66113 h 3994777"/>
-              <a:gd name="connsiteX17" fmla="*/ 5058603 w 5217023"/>
-              <a:gd name="connsiteY17" fmla="*/ 1368242 h 3994777"/>
-              <a:gd name="connsiteX18" fmla="*/ 4096624 w 5217023"/>
-              <a:gd name="connsiteY18" fmla="*/ 2870829 h 3994777"/>
-              <a:gd name="connsiteX19" fmla="*/ 3833203 w 5217023"/>
-              <a:gd name="connsiteY19" fmla="*/ 3092190 h 3994777"/>
-              <a:gd name="connsiteX20" fmla="*/ 3536509 w 5217023"/>
-              <a:gd name="connsiteY20" fmla="*/ 3297128 h 3994777"/>
-              <a:gd name="connsiteX21" fmla="*/ 3148966 w 5217023"/>
-              <a:gd name="connsiteY21" fmla="*/ 3485478 h 3994777"/>
-              <a:gd name="connsiteX22" fmla="*/ 1860557 w 5217023"/>
-              <a:gd name="connsiteY22" fmla="*/ 3880910 h 3994777"/>
-              <a:gd name="connsiteX23" fmla="*/ 573715 w 5217023"/>
-              <a:gd name="connsiteY23" fmla="*/ 3983764 h 3994777"/>
-              <a:gd name="connsiteX24" fmla="*/ 108410 w 5217023"/>
-              <a:gd name="connsiteY24" fmla="*/ 3908816 h 3994777"/>
-              <a:gd name="connsiteX25" fmla="*/ 0 w 5217023"/>
-              <a:gd name="connsiteY25" fmla="*/ 3876793 h 3994777"/>
-              <a:gd name="connsiteX26" fmla="*/ 0 w 5217023"/>
-              <a:gd name="connsiteY26" fmla="*/ 3802912 h 3994777"/>
-              <a:gd name="connsiteX27" fmla="*/ 36975 w 5217023"/>
-              <a:gd name="connsiteY27" fmla="*/ 3815954 h 3994777"/>
-              <a:gd name="connsiteX28" fmla="*/ 561628 w 5217023"/>
-              <a:gd name="connsiteY28" fmla="*/ 3912655 h 3994777"/>
-              <a:gd name="connsiteX29" fmla="*/ 1683086 w 5217023"/>
-              <a:gd name="connsiteY29" fmla="*/ 3844334 h 3994777"/>
-              <a:gd name="connsiteX30" fmla="*/ 1806023 w 5217023"/>
-              <a:gd name="connsiteY30" fmla="*/ 3820992 h 3994777"/>
-              <a:gd name="connsiteX31" fmla="*/ 1921817 w 5217023"/>
-              <a:gd name="connsiteY31" fmla="*/ 3795747 h 3994777"/>
-              <a:gd name="connsiteX32" fmla="*/ 1243689 w 5217023"/>
-              <a:gd name="connsiteY32" fmla="*/ 3846539 h 3994777"/>
-              <a:gd name="connsiteX33" fmla="*/ 62875 w 5217023"/>
-              <a:gd name="connsiteY33" fmla="*/ 3668143 h 3994777"/>
-              <a:gd name="connsiteX34" fmla="*/ 0 w 5217023"/>
-              <a:gd name="connsiteY34" fmla="*/ 3644185 h 3994777"/>
-            </a:gdLst>
-            <a:ahLst/>
-            <a:cxnLst>
-              <a:cxn ang="0">
-                <a:pos x="connsiteX0" y="connsiteY0"/>
-              </a:cxn>
-              <a:cxn ang="0">
-                <a:pos x="connsiteX1" y="connsiteY1"/>
-              </a:cxn>
-              <a:cxn ang="0">
-                <a:pos x="connsiteX2" y="connsiteY2"/>
-              </a:cxn>
-              <a:cxn ang="0">
-                <a:pos x="connsiteX3" y="connsiteY3"/>
-              </a:cxn>
-              <a:cxn ang="0">
-                <a:pos x="connsiteX4" y="connsiteY4"/>
-              </a:cxn>
-              <a:cxn ang="0">
-                <a:pos x="connsiteX5" y="connsiteY5"/>
-              </a:cxn>
-              <a:cxn ang="0">
-                <a:pos x="connsiteX6" y="connsiteY6"/>
-              </a:cxn>
-              <a:cxn ang="0">
-                <a:pos x="connsiteX7" y="connsiteY7"/>
-              </a:cxn>
-              <a:cxn ang="0">
-                <a:pos x="connsiteX8" y="connsiteY8"/>
-              </a:cxn>
-              <a:cxn ang="0">
-                <a:pos x="connsiteX9" y="connsiteY9"/>
-              </a:cxn>
-              <a:cxn ang="0">
-                <a:pos x="connsiteX10" y="connsiteY10"/>
-              </a:cxn>
-              <a:cxn ang="0">
-                <a:pos x="connsiteX11" y="connsiteY11"/>
-              </a:cxn>
-              <a:cxn ang="0">
-                <a:pos x="connsiteX12" y="connsiteY12"/>
-              </a:cxn>
-              <a:cxn ang="0">
-                <a:pos x="connsiteX13" y="connsiteY13"/>
-              </a:cxn>
-              <a:cxn ang="0">
-                <a:pos x="connsiteX14" y="connsiteY14"/>
-              </a:cxn>
-              <a:cxn ang="0">
-                <a:pos x="connsiteX15" y="connsiteY15"/>
-              </a:cxn>
-              <a:cxn ang="0">
-                <a:pos x="connsiteX16" y="connsiteY16"/>
-              </a:cxn>
-              <a:cxn ang="0">
-                <a:pos x="connsiteX17" y="connsiteY17"/>
-              </a:cxn>
-              <a:cxn ang="0">
-                <a:pos x="connsiteX18" y="connsiteY18"/>
-              </a:cxn>
-              <a:cxn ang="0">
-                <a:pos x="connsiteX19" y="connsiteY19"/>
-              </a:cxn>
-              <a:cxn ang="0">
-                <a:pos x="connsiteX20" y="connsiteY20"/>
-              </a:cxn>
-              <a:cxn ang="0">
-                <a:pos x="connsiteX21" y="connsiteY21"/>
-              </a:cxn>
-              <a:cxn ang="0">
-                <a:pos x="connsiteX22" y="connsiteY22"/>
-              </a:cxn>
-              <a:cxn ang="0">
-                <a:pos x="connsiteX23" y="connsiteY23"/>
-              </a:cxn>
-              <a:cxn ang="0">
-                <a:pos x="connsiteX24" y="connsiteY24"/>
-              </a:cxn>
-              <a:cxn ang="0">
-                <a:pos x="connsiteX25" y="connsiteY25"/>
-              </a:cxn>
-              <a:cxn ang="0">
-                <a:pos x="connsiteX26" y="connsiteY26"/>
-              </a:cxn>
-              <a:cxn ang="0">
-                <a:pos x="connsiteX27" y="connsiteY27"/>
-              </a:cxn>
-              <a:cxn ang="0">
-                <a:pos x="connsiteX28" y="connsiteY28"/>
-              </a:cxn>
-              <a:cxn ang="0">
-                <a:pos x="connsiteX29" y="connsiteY29"/>
-              </a:cxn>
-              <a:cxn ang="0">
-                <a:pos x="connsiteX30" y="connsiteY30"/>
-              </a:cxn>
-              <a:cxn ang="0">
-                <a:pos x="connsiteX31" y="connsiteY31"/>
-              </a:cxn>
-              <a:cxn ang="0">
-                <a:pos x="connsiteX32" y="connsiteY32"/>
-              </a:cxn>
-              <a:cxn ang="0">
-                <a:pos x="connsiteX33" y="connsiteY33"/>
-              </a:cxn>
-              <a:cxn ang="0">
-                <a:pos x="connsiteX34" y="connsiteY34"/>
-              </a:cxn>
-            </a:cxnLst>
-            <a:rect l="l" t="t" r="r" b="b"/>
-            <a:pathLst>
-              <a:path w="5217023" h="3994777">
-                <a:moveTo>
-                  <a:pt x="1945461" y="3787398"/>
-                </a:moveTo>
-                <a:lnTo>
-                  <a:pt x="1942113" y="3790053"/>
-                </a:lnTo>
-                <a:lnTo>
-                  <a:pt x="1946982" y="3787990"/>
-                </a:lnTo>
-                <a:cubicBezTo>
-                  <a:pt x="1946982" y="3787990"/>
-                  <a:pt x="1946379" y="3787019"/>
-                  <a:pt x="1945461" y="3787398"/>
-                </a:cubicBezTo>
-                <a:close/>
-                <a:moveTo>
-                  <a:pt x="0" y="0"/>
-                </a:moveTo>
-                <a:lnTo>
-                  <a:pt x="5030958" y="0"/>
-                </a:lnTo>
-                <a:lnTo>
-                  <a:pt x="5046198" y="153449"/>
-                </a:lnTo>
-                <a:cubicBezTo>
-                  <a:pt x="5052189" y="240558"/>
-                  <a:pt x="5055458" y="328007"/>
-                  <a:pt x="5055729" y="415828"/>
-                </a:cubicBezTo>
-                <a:cubicBezTo>
-                  <a:pt x="5057604" y="923672"/>
-                  <a:pt x="4959210" y="1409054"/>
-                  <a:pt x="4735242" y="1867130"/>
-                </a:cubicBezTo>
-                <a:cubicBezTo>
-                  <a:pt x="4533284" y="2280198"/>
-                  <a:pt x="4248921" y="2629330"/>
-                  <a:pt x="3907395" y="2938441"/>
-                </a:cubicBezTo>
-                <a:cubicBezTo>
-                  <a:pt x="3922498" y="2931535"/>
-                  <a:pt x="3935859" y="2921330"/>
-                  <a:pt x="3946497" y="2908567"/>
-                </a:cubicBezTo>
-                <a:cubicBezTo>
-                  <a:pt x="4193494" y="2700987"/>
-                  <a:pt x="4408756" y="2458364"/>
-                  <a:pt x="4585421" y="2188401"/>
-                </a:cubicBezTo>
-                <a:cubicBezTo>
-                  <a:pt x="4967641" y="1608533"/>
-                  <a:pt x="5169304" y="975361"/>
-                  <a:pt x="5142585" y="276891"/>
-                </a:cubicBezTo>
-                <a:cubicBezTo>
-                  <a:pt x="5139764" y="194215"/>
-                  <a:pt x="5132824" y="111888"/>
-                  <a:pt x="5121833" y="30208"/>
-                </a:cubicBezTo>
-                <a:lnTo>
-                  <a:pt x="5116229" y="0"/>
-                </a:lnTo>
-                <a:lnTo>
-                  <a:pt x="5184724" y="0"/>
-                </a:lnTo>
-                <a:lnTo>
-                  <a:pt x="5196265" y="66113"/>
-                </a:lnTo>
-                <a:cubicBezTo>
-                  <a:pt x="5249921" y="496647"/>
-                  <a:pt x="5197997" y="931171"/>
-                  <a:pt x="5058603" y="1368242"/>
-                </a:cubicBezTo>
-                <a:cubicBezTo>
-                  <a:pt x="4872414" y="1953929"/>
-                  <a:pt x="4544298" y="2451351"/>
-                  <a:pt x="4096624" y="2870829"/>
-                </a:cubicBezTo>
-                <a:cubicBezTo>
-                  <a:pt x="4012832" y="2949426"/>
-                  <a:pt x="3924415" y="3022439"/>
-                  <a:pt x="3833203" y="3092190"/>
-                </a:cubicBezTo>
-                <a:cubicBezTo>
-                  <a:pt x="3741992" y="3161943"/>
-                  <a:pt x="3648667" y="3225510"/>
-                  <a:pt x="3536509" y="3297128"/>
-                </a:cubicBezTo>
-                <a:cubicBezTo>
-                  <a:pt x="3427215" y="3372735"/>
-                  <a:pt x="3288598" y="3430233"/>
-                  <a:pt x="3148966" y="3485478"/>
-                </a:cubicBezTo>
-                <a:cubicBezTo>
-                  <a:pt x="2729930" y="3651299"/>
-                  <a:pt x="2302194" y="3788890"/>
-                  <a:pt x="1860557" y="3880910"/>
-                </a:cubicBezTo>
-                <a:cubicBezTo>
-                  <a:pt x="1435974" y="3969444"/>
-                  <a:pt x="1008052" y="4017957"/>
-                  <a:pt x="573715" y="3983764"/>
-                </a:cubicBezTo>
-                <a:cubicBezTo>
-                  <a:pt x="415134" y="3971300"/>
-                  <a:pt x="259585" y="3947743"/>
-                  <a:pt x="108410" y="3908816"/>
-                </a:cubicBezTo>
-                <a:lnTo>
-                  <a:pt x="0" y="3876793"/>
-                </a:lnTo>
-                <a:lnTo>
-                  <a:pt x="0" y="3802912"/>
-                </a:lnTo>
-                <a:lnTo>
-                  <a:pt x="36975" y="3815954"/>
-                </a:lnTo>
-                <a:cubicBezTo>
-                  <a:pt x="206404" y="3867475"/>
-                  <a:pt x="382020" y="3897326"/>
-                  <a:pt x="561628" y="3912655"/>
-                </a:cubicBezTo>
-                <a:cubicBezTo>
-                  <a:pt x="938583" y="3944832"/>
-                  <a:pt x="1311814" y="3910697"/>
-                  <a:pt x="1683086" y="3844334"/>
-                </a:cubicBezTo>
-                <a:cubicBezTo>
-                  <a:pt x="1724123" y="3837151"/>
-                  <a:pt x="1765097" y="3829374"/>
-                  <a:pt x="1806023" y="3820992"/>
-                </a:cubicBezTo>
-                <a:cubicBezTo>
-                  <a:pt x="1844740" y="3813079"/>
-                  <a:pt x="1883218" y="3804161"/>
-                  <a:pt x="1921817" y="3795747"/>
-                </a:cubicBezTo>
-                <a:cubicBezTo>
-                  <a:pt x="1697011" y="3826435"/>
-                  <a:pt x="1470551" y="3843387"/>
-                  <a:pt x="1243689" y="3846539"/>
-                </a:cubicBezTo>
-                <a:cubicBezTo>
-                  <a:pt x="839058" y="3849054"/>
-                  <a:pt x="443424" y="3800206"/>
-                  <a:pt x="62875" y="3668143"/>
-                </a:cubicBezTo>
-                <a:lnTo>
-                  <a:pt x="0" y="3644185"/>
-                </a:lnTo>
-                <a:close/>
-              </a:path>
-            </a:pathLst>
-          </a:custGeom>
-          <a:solidFill>
-            <a:schemeClr val="accent2"/>
-          </a:solidFill>
-          <a:ln>
-            <a:noFill/>
-          </a:ln>
-        </p:spPr>
-        <p:style>
-          <a:lnRef idx="2">
-            <a:schemeClr val="accent1">
-              <a:shade val="50000"/>
-            </a:schemeClr>
-          </a:lnRef>
-          <a:fillRef idx="1">
-            <a:schemeClr val="accent1"/>
-          </a:fillRef>
-          <a:effectRef idx="0">
-            <a:schemeClr val="accent1"/>
-          </a:effectRef>
-          <a:fontRef idx="minor">
-            <a:schemeClr val="lt1"/>
-          </a:fontRef>
-        </p:style>
-        <p:txBody>
-          <a:bodyPr wrap="square" rtlCol="0" anchor="ctr">
-            <a:noAutofit/>
-          </a:bodyPr>
-          <a:lstStyle/>
-          <a:p>
-            <a:pPr algn="ctr"/>
-            <a:endParaRPr lang="en-US"/>
-          </a:p>
-        </p:txBody>
-      </p:sp>
-      <p:pic>
-        <p:nvPicPr>
-          <p:cNvPr id="15" name="Picture 14" descr="A picture containing text, colorful&#10;&#10;Description automatically generated">
-            <a:extLst>
-              <a:ext uri="{FF2B5EF4-FFF2-40B4-BE49-F238E27FC236}">
-                <a16:creationId xmlns:a16="http://schemas.microsoft.com/office/drawing/2014/main" id="{C06E2DC6-D615-48CC-1913-D3A559085CA5}"/>
-              </a:ext>
-            </a:extLst>
-          </p:cNvPr>
-          <p:cNvPicPr>
-            <a:picLocks noChangeAspect="1"/>
-          </p:cNvPicPr>
-          <p:nvPr/>
-        </p:nvPicPr>
-        <p:blipFill>
-          <a:blip r:embed="rId3"/>
-          <a:stretch>
-            <a:fillRect/>
-          </a:stretch>
-        </p:blipFill>
-        <p:spPr>
-          <a:xfrm>
-            <a:off x="5301987" y="-16007"/>
-            <a:ext cx="6890013" cy="6890013"/>
-          </a:xfrm>
-          <a:prstGeom prst="rect">
-            <a:avLst/>
-          </a:prstGeom>
-        </p:spPr>
-      </p:pic>
-      <p:sp>
-        <p:nvSpPr>
-          <p:cNvPr id="16" name="Oval Callout 15">
-            <a:extLst>
-              <a:ext uri="{FF2B5EF4-FFF2-40B4-BE49-F238E27FC236}">
-                <a16:creationId xmlns:a16="http://schemas.microsoft.com/office/drawing/2014/main" id="{A4ABB862-F198-AE03-D7D0-781A43A610B8}"/>
-              </a:ext>
-            </a:extLst>
-          </p:cNvPr>
-          <p:cNvSpPr/>
-          <p:nvPr/>
-        </p:nvSpPr>
-        <p:spPr>
-          <a:xfrm rot="21159718" flipH="1">
-            <a:off x="5580805" y="103375"/>
-            <a:ext cx="4493036" cy="2230515"/>
-          </a:xfrm>
-          <a:custGeom>
-            <a:avLst/>
-            <a:gdLst>
-              <a:gd name="connsiteX0" fmla="*/ 1310484 w 4493036"/>
-              <a:gd name="connsiteY0" fmla="*/ 2509329 h 2230515"/>
-              <a:gd name="connsiteX1" fmla="*/ 1142510 w 4493036"/>
-              <a:gd name="connsiteY1" fmla="*/ 2086554 h 2230515"/>
-              <a:gd name="connsiteX2" fmla="*/ 1107896 w 4493036"/>
-              <a:gd name="connsiteY2" fmla="*/ 153860 h 2230515"/>
-              <a:gd name="connsiteX3" fmla="*/ 2904899 w 4493036"/>
-              <a:gd name="connsiteY3" fmla="*/ 48969 h 2230515"/>
-              <a:gd name="connsiteX4" fmla="*/ 3946613 w 4493036"/>
-              <a:gd name="connsiteY4" fmla="*/ 1844284 h 2230515"/>
-              <a:gd name="connsiteX5" fmla="*/ 1955829 w 4493036"/>
-              <a:gd name="connsiteY5" fmla="*/ 2221141 h 2230515"/>
-              <a:gd name="connsiteX6" fmla="*/ 1310484 w 4493036"/>
-              <a:gd name="connsiteY6" fmla="*/ 2509329 h 2230515"/>
-            </a:gdLst>
-            <a:ahLst/>
-            <a:cxnLst>
-              <a:cxn ang="0">
-                <a:pos x="connsiteX0" y="connsiteY0"/>
-              </a:cxn>
-              <a:cxn ang="0">
-                <a:pos x="connsiteX1" y="connsiteY1"/>
-              </a:cxn>
-              <a:cxn ang="0">
-                <a:pos x="connsiteX2" y="connsiteY2"/>
-              </a:cxn>
-              <a:cxn ang="0">
-                <a:pos x="connsiteX3" y="connsiteY3"/>
-              </a:cxn>
-              <a:cxn ang="0">
-                <a:pos x="connsiteX4" y="connsiteY4"/>
-              </a:cxn>
-              <a:cxn ang="0">
-                <a:pos x="connsiteX5" y="connsiteY5"/>
-              </a:cxn>
-              <a:cxn ang="0">
-                <a:pos x="connsiteX6" y="connsiteY6"/>
-              </a:cxn>
-            </a:cxnLst>
-            <a:rect l="l" t="t" r="r" b="b"/>
-            <a:pathLst>
-              <a:path w="4493036" h="2230515" fill="none" extrusionOk="0">
-                <a:moveTo>
-                  <a:pt x="1310484" y="2509329"/>
-                </a:moveTo>
-                <a:cubicBezTo>
-                  <a:pt x="1269030" y="2461374"/>
-                  <a:pt x="1216801" y="2254991"/>
-                  <a:pt x="1142510" y="2086554"/>
-                </a:cubicBezTo>
-                <a:cubicBezTo>
-                  <a:pt x="-295865" y="1703058"/>
-                  <a:pt x="-239588" y="624345"/>
-                  <a:pt x="1107896" y="153860"/>
-                </a:cubicBezTo>
-                <a:cubicBezTo>
-                  <a:pt x="1537920" y="-22862"/>
-                  <a:pt x="2350481" y="-3634"/>
-                  <a:pt x="2904899" y="48969"/>
-                </a:cubicBezTo>
-                <a:cubicBezTo>
-                  <a:pt x="4545451" y="417826"/>
-                  <a:pt x="5012763" y="1291520"/>
-                  <a:pt x="3946613" y="1844284"/>
-                </a:cubicBezTo>
-                <a:cubicBezTo>
-                  <a:pt x="3494838" y="2192755"/>
-                  <a:pt x="2773919" y="2354273"/>
-                  <a:pt x="1955829" y="2221141"/>
-                </a:cubicBezTo>
-                <a:cubicBezTo>
-                  <a:pt x="1634255" y="2302976"/>
-                  <a:pt x="1461453" y="2457103"/>
-                  <a:pt x="1310484" y="2509329"/>
-                </a:cubicBezTo>
-                <a:close/>
-              </a:path>
-              <a:path w="4493036" h="2230515" stroke="0" extrusionOk="0">
-                <a:moveTo>
-                  <a:pt x="1310484" y="2509329"/>
-                </a:moveTo>
-                <a:cubicBezTo>
-                  <a:pt x="1274534" y="2387667"/>
-                  <a:pt x="1219755" y="2299717"/>
-                  <a:pt x="1142510" y="2086554"/>
-                </a:cubicBezTo>
-                <a:cubicBezTo>
-                  <a:pt x="-258422" y="1686677"/>
-                  <a:pt x="-400944" y="590006"/>
-                  <a:pt x="1107896" y="153860"/>
-                </a:cubicBezTo>
-                <a:cubicBezTo>
-                  <a:pt x="1569318" y="74969"/>
-                  <a:pt x="2285274" y="54005"/>
-                  <a:pt x="2904899" y="48969"/>
-                </a:cubicBezTo>
-                <a:cubicBezTo>
-                  <a:pt x="4376680" y="241506"/>
-                  <a:pt x="5083335" y="1271034"/>
-                  <a:pt x="3946613" y="1844284"/>
-                </a:cubicBezTo>
-                <a:cubicBezTo>
-                  <a:pt x="3467475" y="2129803"/>
-                  <a:pt x="2746737" y="2183452"/>
-                  <a:pt x="1955829" y="2221141"/>
-                </a:cubicBezTo>
-                <a:cubicBezTo>
-                  <a:pt x="1883738" y="2290425"/>
-                  <a:pt x="1479424" y="2432158"/>
-                  <a:pt x="1310484" y="2509329"/>
-                </a:cubicBezTo>
-                <a:close/>
-              </a:path>
-            </a:pathLst>
-          </a:custGeom>
-          <a:solidFill>
-            <a:srgbClr val="4472C4"/>
-          </a:solidFill>
-          <a:ln w="76200">
-            <a:solidFill>
-              <a:srgbClr val="7030A0"/>
-            </a:solidFill>
-            <a:extLst>
-              <a:ext uri="{C807C97D-BFC1-408E-A445-0C87EB9F89A2}">
-                <ask:lineSketchStyleProps xmlns:ask="http://schemas.microsoft.com/office/drawing/2018/sketchyshapes" sd="1219033472">
-                  <a:prstGeom prst="wedgeEllipseCallout">
-                    <a:avLst/>
-                  </a:prstGeom>
-                  <ask:type>
-                    <ask:lineSketchCurved/>
-                  </ask:type>
-                </ask:lineSketchStyleProps>
-              </a:ext>
-            </a:extLst>
-          </a:ln>
-        </p:spPr>
-        <p:style>
-          <a:lnRef idx="2">
-            <a:schemeClr val="accent1">
-              <a:shade val="50000"/>
-            </a:schemeClr>
-          </a:lnRef>
-          <a:fillRef idx="1">
-            <a:schemeClr val="accent1"/>
-          </a:fillRef>
-          <a:effectRef idx="0">
-            <a:schemeClr val="accent1"/>
-          </a:effectRef>
-          <a:fontRef idx="minor">
-            <a:schemeClr val="lt1"/>
-          </a:fontRef>
-        </p:style>
-        <p:txBody>
-          <a:bodyPr rtlCol="0" anchor="ctr"/>
-          <a:lstStyle/>
-          <a:p>
-            <a:endParaRPr lang="en-US" sz="2000" dirty="0">
-              <a:solidFill>
-                <a:schemeClr val="accent6">
-                  <a:lumMod val="40000"/>
-                  <a:lumOff val="60000"/>
-                </a:schemeClr>
-              </a:solidFill>
-              <a:latin typeface="Arial Rounded MT Bold" panose="020F0704030504030204" pitchFamily="34" charset="77"/>
-            </a:endParaRPr>
-          </a:p>
-          <a:p>
-            <a:r>
-              <a:rPr lang="en-US" sz="2000" dirty="0">
-                <a:solidFill>
-                  <a:schemeClr val="accent6">
-                    <a:lumMod val="40000"/>
-                    <a:lumOff val="60000"/>
-                  </a:schemeClr>
-                </a:solidFill>
-                <a:latin typeface="Arial Rounded MT Bold" panose="020F0704030504030204" pitchFamily="34" charset="77"/>
-              </a:rPr>
-              <a:t>I</a:t>
-            </a:r>
-            <a:r>
-              <a:rPr lang="en-US" sz="2000" b="0" dirty="0">
-                <a:solidFill>
-                  <a:schemeClr val="accent6">
-                    <a:lumMod val="40000"/>
-                    <a:lumOff val="60000"/>
-                  </a:schemeClr>
-                </a:solidFill>
-                <a:effectLst/>
-                <a:latin typeface="Arial Rounded MT Bold" panose="020F0704030504030204" pitchFamily="34" charset="77"/>
-              </a:rPr>
-              <a:t> want to understand the process of fine-tuning and apply it to other use-cases, including vision tasks</a:t>
-            </a:r>
-          </a:p>
-          <a:p>
-            <a:pPr algn="ctr"/>
-            <a:endParaRPr lang="en-US" dirty="0"/>
-          </a:p>
-        </p:txBody>
-      </p:sp>
-      <p:sp>
-        <p:nvSpPr>
-          <p:cNvPr id="2" name="Rectangle 1">
-            <a:extLst>
-              <a:ext uri="{FF2B5EF4-FFF2-40B4-BE49-F238E27FC236}">
-                <a16:creationId xmlns:a16="http://schemas.microsoft.com/office/drawing/2014/main" id="{F8F6E5A1-8453-44BF-D702-520D058025C5}"/>
-              </a:ext>
-            </a:extLst>
-          </p:cNvPr>
-          <p:cNvSpPr/>
-          <p:nvPr/>
-        </p:nvSpPr>
-        <p:spPr>
-          <a:xfrm>
-            <a:off x="0" y="0"/>
-            <a:ext cx="5333998" cy="6858000"/>
-          </a:xfrm>
-          <a:prstGeom prst="rect">
-            <a:avLst/>
-          </a:prstGeom>
-        </p:spPr>
-        <p:style>
-          <a:lnRef idx="2">
-            <a:schemeClr val="accent1">
-              <a:shade val="50000"/>
-            </a:schemeClr>
-          </a:lnRef>
-          <a:fillRef idx="1">
-            <a:schemeClr val="accent1"/>
-          </a:fillRef>
-          <a:effectRef idx="0">
-            <a:schemeClr val="accent1"/>
-          </a:effectRef>
-          <a:fontRef idx="minor">
-            <a:schemeClr val="lt1"/>
-          </a:fontRef>
-        </p:style>
-        <p:txBody>
-          <a:bodyPr rtlCol="0" anchor="ctr"/>
-          <a:lstStyle/>
-          <a:p>
-            <a:pPr algn="ctr"/>
-            <a:endParaRPr lang="en-US"/>
-          </a:p>
-        </p:txBody>
-      </p:sp>
-      <p:sp>
-        <p:nvSpPr>
-          <p:cNvPr id="3" name="TextBox 2">
-            <a:extLst>
-              <a:ext uri="{FF2B5EF4-FFF2-40B4-BE49-F238E27FC236}">
-                <a16:creationId xmlns:a16="http://schemas.microsoft.com/office/drawing/2014/main" id="{3862F2D1-1950-8100-EAB3-BC7CF5D177E6}"/>
-              </a:ext>
-            </a:extLst>
-          </p:cNvPr>
-          <p:cNvSpPr txBox="1"/>
-          <p:nvPr/>
-        </p:nvSpPr>
-        <p:spPr>
-          <a:xfrm>
-            <a:off x="557694" y="3011777"/>
-            <a:ext cx="4016869" cy="1138773"/>
-          </a:xfrm>
-          <a:prstGeom prst="rect">
-            <a:avLst/>
-          </a:prstGeom>
-          <a:noFill/>
-        </p:spPr>
-        <p:txBody>
-          <a:bodyPr wrap="none" rtlCol="0">
-            <a:spAutoFit/>
-          </a:bodyPr>
-          <a:lstStyle/>
-          <a:p>
-            <a:r>
-              <a:rPr lang="en-US" sz="2800" dirty="0">
-                <a:solidFill>
-                  <a:schemeClr val="accent6">
-                    <a:lumMod val="40000"/>
-                    <a:lumOff val="60000"/>
-                  </a:schemeClr>
-                </a:solidFill>
-                <a:latin typeface="Arial Rounded MT Bold" panose="020F0704030504030204" pitchFamily="34" charset="77"/>
-              </a:rPr>
-              <a:t>Additional Resources:</a:t>
-            </a:r>
-          </a:p>
-          <a:p>
-            <a:endParaRPr lang="en-US" sz="2000" dirty="0">
-              <a:solidFill>
-                <a:schemeClr val="accent6">
-                  <a:lumMod val="40000"/>
-                  <a:lumOff val="60000"/>
-                </a:schemeClr>
-              </a:solidFill>
-              <a:latin typeface="Arial Rounded MT Bold" panose="020F0704030504030204" pitchFamily="34" charset="77"/>
-            </a:endParaRPr>
-          </a:p>
-          <a:p>
-            <a:endParaRPr lang="en-US" sz="2000" dirty="0">
-              <a:solidFill>
-                <a:schemeClr val="accent6">
-                  <a:lumMod val="40000"/>
-                  <a:lumOff val="60000"/>
-                </a:schemeClr>
-              </a:solidFill>
-              <a:latin typeface="Arial Rounded MT Bold" panose="020F0704030504030204" pitchFamily="34" charset="77"/>
-            </a:endParaRPr>
-          </a:p>
-        </p:txBody>
-      </p:sp>
-      <p:sp>
-        <p:nvSpPr>
-          <p:cNvPr id="5" name="TextBox 4">
-            <a:extLst>
-              <a:ext uri="{FF2B5EF4-FFF2-40B4-BE49-F238E27FC236}">
-                <a16:creationId xmlns:a16="http://schemas.microsoft.com/office/drawing/2014/main" id="{4D97A11E-D400-FB5D-C626-5CAEF5610D7A}"/>
-              </a:ext>
-            </a:extLst>
-          </p:cNvPr>
-          <p:cNvSpPr txBox="1"/>
-          <p:nvPr/>
-        </p:nvSpPr>
-        <p:spPr>
-          <a:xfrm>
-            <a:off x="766585" y="425159"/>
-            <a:ext cx="4365671" cy="2862322"/>
-          </a:xfrm>
-          <a:prstGeom prst="rect">
-            <a:avLst/>
-          </a:prstGeom>
-          <a:noFill/>
-        </p:spPr>
-        <p:txBody>
-          <a:bodyPr wrap="square" rtlCol="0">
-            <a:spAutoFit/>
-          </a:bodyPr>
-          <a:lstStyle/>
-          <a:p>
-            <a:r>
-              <a:rPr lang="en-US" sz="2800" dirty="0">
-                <a:solidFill>
-                  <a:schemeClr val="accent6">
-                    <a:lumMod val="40000"/>
-                    <a:lumOff val="60000"/>
-                  </a:schemeClr>
-                </a:solidFill>
-                <a:latin typeface="Arial Rounded MT Bold" panose="020F0704030504030204" pitchFamily="34" charset="77"/>
-              </a:rPr>
-              <a:t>Tune in to Parts 3 and 4</a:t>
-            </a:r>
-          </a:p>
-          <a:p>
-            <a:pPr marL="457200" indent="-457200">
-              <a:buFontTx/>
-              <a:buChar char="-"/>
-            </a:pPr>
-            <a:r>
-              <a:rPr lang="en-US" sz="2800" dirty="0">
-                <a:solidFill>
-                  <a:schemeClr val="accent6">
-                    <a:lumMod val="40000"/>
-                    <a:lumOff val="60000"/>
-                  </a:schemeClr>
-                </a:solidFill>
-                <a:latin typeface="Arial Rounded MT Bold" panose="020F0704030504030204" pitchFamily="34" charset="77"/>
-              </a:rPr>
-              <a:t>Reusing our code to train on a new objective</a:t>
-            </a:r>
-          </a:p>
-          <a:p>
-            <a:pPr marL="457200" indent="-457200">
-              <a:buFontTx/>
-              <a:buChar char="-"/>
-            </a:pPr>
-            <a:r>
-              <a:rPr lang="en-US" sz="2800" dirty="0">
-                <a:solidFill>
-                  <a:schemeClr val="accent6">
-                    <a:lumMod val="40000"/>
-                    <a:lumOff val="60000"/>
-                  </a:schemeClr>
-                </a:solidFill>
-                <a:latin typeface="Arial Rounded MT Bold" panose="020F0704030504030204" pitchFamily="34" charset="77"/>
-              </a:rPr>
-              <a:t>The Landscape</a:t>
-            </a:r>
-          </a:p>
-          <a:p>
-            <a:endParaRPr lang="en-US" sz="2000" dirty="0">
-              <a:solidFill>
-                <a:schemeClr val="accent6">
-                  <a:lumMod val="40000"/>
-                  <a:lumOff val="60000"/>
-                </a:schemeClr>
-              </a:solidFill>
-              <a:latin typeface="Arial Rounded MT Bold" panose="020F0704030504030204" pitchFamily="34" charset="77"/>
-            </a:endParaRPr>
-          </a:p>
-          <a:p>
-            <a:endParaRPr lang="en-US" sz="2000" dirty="0">
-              <a:solidFill>
-                <a:schemeClr val="accent6">
-                  <a:lumMod val="40000"/>
-                  <a:lumOff val="60000"/>
-                </a:schemeClr>
-              </a:solidFill>
-              <a:latin typeface="Arial Rounded MT Bold" panose="020F0704030504030204" pitchFamily="34" charset="77"/>
-            </a:endParaRPr>
-          </a:p>
-        </p:txBody>
-      </p:sp>
-    </p:spTree>
-    <p:extLst>
-      <p:ext uri="{BB962C8B-B14F-4D97-AF65-F5344CB8AC3E}">
-        <p14:creationId xmlns:p14="http://schemas.microsoft.com/office/powerpoint/2010/main" val="1752483957"/>
-      </p:ext>
-    </p:extLst>
-  </p:cSld>
-  <p:clrMapOvr>
-    <a:masterClrMapping/>
-  </p:clrMapOvr>
-</p:sld>
-</file>
-
-<file path=ppt/slides/slide7.xml><?xml version="1.0" encoding="utf-8"?>
-<p:sld xmlns:a="http://schemas.openxmlformats.org/drawingml/2006/main" xmlns:r="http://schemas.openxmlformats.org/officeDocument/2006/relationships" xmlns:p="http://schemas.openxmlformats.org/presentationml/2006/main">
-  <p:cSld>
-    <p:spTree>
-      <p:nvGrpSpPr>
-        <p:cNvPr id="1" name=""/>
-        <p:cNvGrpSpPr/>
-        <p:nvPr/>
-      </p:nvGrpSpPr>
-      <p:grpSpPr>
-        <a:xfrm>
-          <a:off x="0" y="0"/>
-          <a:ext cx="0" cy="0"/>
-          <a:chOff x="0" y="0"/>
-          <a:chExt cx="0" cy="0"/>
-        </a:xfrm>
-      </p:grpSpPr>
-      <p:pic>
-        <p:nvPicPr>
-          <p:cNvPr id="5" name="Picture 4" descr="A puppet sitting at a desk&#10;&#10;Description automatically generated with low confidence">
-            <a:extLst>
-              <a:ext uri="{FF2B5EF4-FFF2-40B4-BE49-F238E27FC236}">
-                <a16:creationId xmlns:a16="http://schemas.microsoft.com/office/drawing/2014/main" id="{5DAC2BAD-7CEA-C7FF-3B18-5A4017E9EB01}"/>
-              </a:ext>
-            </a:extLst>
-          </p:cNvPr>
-          <p:cNvPicPr>
-            <a:picLocks noChangeAspect="1"/>
-          </p:cNvPicPr>
-          <p:nvPr/>
-        </p:nvPicPr>
-        <p:blipFill>
-          <a:blip r:embed="rId2"/>
-          <a:stretch>
-            <a:fillRect/>
-          </a:stretch>
-        </p:blipFill>
-        <p:spPr>
-          <a:xfrm>
-            <a:off x="0" y="0"/>
-            <a:ext cx="6858000" cy="6858000"/>
-          </a:xfrm>
-          <a:prstGeom prst="rect">
-            <a:avLst/>
-          </a:prstGeom>
-        </p:spPr>
-      </p:pic>
-      <p:sp>
-        <p:nvSpPr>
-          <p:cNvPr id="8" name="Cloud Callout 7">
-            <a:extLst>
-              <a:ext uri="{FF2B5EF4-FFF2-40B4-BE49-F238E27FC236}">
-                <a16:creationId xmlns:a16="http://schemas.microsoft.com/office/drawing/2014/main" id="{D0A5B3C1-92AE-FA02-66A0-35440EAA9C9E}"/>
-              </a:ext>
-            </a:extLst>
-          </p:cNvPr>
-          <p:cNvSpPr/>
-          <p:nvPr/>
-        </p:nvSpPr>
-        <p:spPr>
-          <a:xfrm>
-            <a:off x="2005072" y="25935"/>
-            <a:ext cx="4287239" cy="1832955"/>
-          </a:xfrm>
-          <a:prstGeom prst="cloudCallout">
-            <a:avLst/>
-          </a:prstGeom>
-          <a:ln w="38100">
-            <a:solidFill>
-              <a:srgbClr val="7030A0"/>
-            </a:solidFill>
-          </a:ln>
-        </p:spPr>
-        <p:style>
-          <a:lnRef idx="2">
-            <a:schemeClr val="accent1">
-              <a:shade val="50000"/>
-            </a:schemeClr>
-          </a:lnRef>
-          <a:fillRef idx="1">
-            <a:schemeClr val="accent1"/>
-          </a:fillRef>
-          <a:effectRef idx="0">
-            <a:schemeClr val="accent1"/>
-          </a:effectRef>
-          <a:fontRef idx="minor">
-            <a:schemeClr val="lt1"/>
-          </a:fontRef>
-        </p:style>
-        <p:txBody>
-          <a:bodyPr vert="horz" lIns="91440" tIns="45720" rIns="91440" bIns="45720" rtlCol="0" anchor="t">
-            <a:noAutofit/>
-          </a:bodyPr>
-          <a:lstStyle/>
-          <a:p>
-            <a:pPr>
-              <a:lnSpc>
-                <a:spcPct val="90000"/>
-              </a:lnSpc>
-              <a:spcAft>
-                <a:spcPts val="600"/>
-              </a:spcAft>
-            </a:pPr>
-            <a:r>
-              <a:rPr lang="en-US" b="0" dirty="0">
-                <a:solidFill>
-                  <a:schemeClr val="accent6">
-                    <a:lumMod val="40000"/>
-                    <a:lumOff val="60000"/>
-                  </a:schemeClr>
-                </a:solidFill>
-                <a:effectLst/>
-                <a:latin typeface="Arial Rounded MT Bold" panose="020F0704030504030204" pitchFamily="34" charset="77"/>
-              </a:rPr>
-              <a:t>I was laid off and I want to transition from software engineering to a role in AI.</a:t>
-            </a:r>
-            <a:endParaRPr lang="en-US" dirty="0">
-              <a:solidFill>
-                <a:schemeClr val="accent6">
-                  <a:lumMod val="40000"/>
-                  <a:lumOff val="60000"/>
-                </a:schemeClr>
-              </a:solidFill>
-              <a:latin typeface="Arial Rounded MT Bold" panose="020F0704030504030204" pitchFamily="34" charset="77"/>
-            </a:endParaRPr>
-          </a:p>
-        </p:txBody>
-      </p:sp>
-      <p:sp>
-        <p:nvSpPr>
-          <p:cNvPr id="4" name="Rectangle 3">
-            <a:extLst>
-              <a:ext uri="{FF2B5EF4-FFF2-40B4-BE49-F238E27FC236}">
-                <a16:creationId xmlns:a16="http://schemas.microsoft.com/office/drawing/2014/main" id="{49BB250C-8331-7189-1EFB-0A18C5974E44}"/>
-              </a:ext>
-            </a:extLst>
-          </p:cNvPr>
-          <p:cNvSpPr/>
-          <p:nvPr/>
-        </p:nvSpPr>
-        <p:spPr>
-          <a:xfrm>
-            <a:off x="6858002" y="0"/>
-            <a:ext cx="5333998" cy="6858000"/>
-          </a:xfrm>
-          <a:prstGeom prst="rect">
-            <a:avLst/>
-          </a:prstGeom>
-          <a:solidFill>
-            <a:srgbClr val="4472C4"/>
-          </a:solidFill>
-          <a:ln w="38100">
-            <a:noFill/>
-          </a:ln>
-        </p:spPr>
-        <p:style>
-          <a:lnRef idx="2">
-            <a:schemeClr val="accent1">
-              <a:shade val="50000"/>
-            </a:schemeClr>
-          </a:lnRef>
-          <a:fillRef idx="1">
-            <a:schemeClr val="accent1"/>
-          </a:fillRef>
-          <a:effectRef idx="0">
-            <a:schemeClr val="accent1"/>
-          </a:effectRef>
-          <a:fontRef idx="minor">
-            <a:schemeClr val="lt1"/>
-          </a:fontRef>
-        </p:style>
-        <p:txBody>
-          <a:bodyPr rtlCol="0" anchor="ctr"/>
-          <a:lstStyle/>
-          <a:p>
-            <a:pPr algn="ctr"/>
-            <a:endParaRPr lang="en-US"/>
-          </a:p>
-        </p:txBody>
-      </p:sp>
-      <p:sp>
-        <p:nvSpPr>
-          <p:cNvPr id="10" name="TextBox 9">
-            <a:extLst>
-              <a:ext uri="{FF2B5EF4-FFF2-40B4-BE49-F238E27FC236}">
-                <a16:creationId xmlns:a16="http://schemas.microsoft.com/office/drawing/2014/main" id="{47740309-4EC8-5230-4C2C-5E852684572E}"/>
-              </a:ext>
-            </a:extLst>
-          </p:cNvPr>
-          <p:cNvSpPr txBox="1"/>
-          <p:nvPr/>
-        </p:nvSpPr>
-        <p:spPr>
-          <a:xfrm>
-            <a:off x="7489682" y="3554961"/>
-            <a:ext cx="4459512" cy="2000548"/>
-          </a:xfrm>
-          <a:prstGeom prst="rect">
-            <a:avLst/>
-          </a:prstGeom>
-          <a:noFill/>
-        </p:spPr>
-        <p:txBody>
-          <a:bodyPr wrap="square" rtlCol="0">
-            <a:spAutoFit/>
-          </a:bodyPr>
-          <a:lstStyle/>
-          <a:p>
-            <a:r>
-              <a:rPr lang="en-US" sz="2800" dirty="0">
-                <a:solidFill>
-                  <a:schemeClr val="accent6">
-                    <a:lumMod val="40000"/>
-                    <a:lumOff val="60000"/>
-                  </a:schemeClr>
-                </a:solidFill>
-                <a:latin typeface="Arial Rounded MT Bold" panose="020F0704030504030204" pitchFamily="34" charset="77"/>
-              </a:rPr>
-              <a:t>Additional Resources:</a:t>
-            </a:r>
-          </a:p>
-          <a:p>
-            <a:pPr marL="457200" indent="-457200">
-              <a:buFontTx/>
-              <a:buChar char="-"/>
-            </a:pPr>
-            <a:r>
-              <a:rPr lang="en-US" sz="2800" dirty="0">
-                <a:solidFill>
-                  <a:schemeClr val="accent6">
-                    <a:lumMod val="40000"/>
-                    <a:lumOff val="60000"/>
-                  </a:schemeClr>
-                </a:solidFill>
-                <a:latin typeface="Arial Rounded MT Bold" panose="020F0704030504030204" pitchFamily="34" charset="77"/>
-              </a:rPr>
-              <a:t>Hugging Face </a:t>
-            </a:r>
-            <a:r>
-              <a:rPr lang="en-US" sz="2800" dirty="0" err="1">
-                <a:solidFill>
-                  <a:schemeClr val="accent6">
-                    <a:lumMod val="40000"/>
-                    <a:lumOff val="60000"/>
-                  </a:schemeClr>
-                </a:solidFill>
-                <a:latin typeface="Arial Rounded MT Bold" panose="020F0704030504030204" pitchFamily="34" charset="77"/>
-              </a:rPr>
-              <a:t>Youtube</a:t>
-            </a:r>
-            <a:r>
-              <a:rPr lang="en-US" sz="2800" dirty="0">
-                <a:solidFill>
-                  <a:schemeClr val="accent6">
-                    <a:lumMod val="40000"/>
-                    <a:lumOff val="60000"/>
-                  </a:schemeClr>
-                </a:solidFill>
-                <a:latin typeface="Arial Rounded MT Bold" panose="020F0704030504030204" pitchFamily="34" charset="77"/>
-              </a:rPr>
-              <a:t> Series</a:t>
-            </a:r>
-          </a:p>
-          <a:p>
-            <a:endParaRPr lang="en-US" sz="2000" dirty="0">
-              <a:solidFill>
-                <a:schemeClr val="accent6">
-                  <a:lumMod val="40000"/>
-                  <a:lumOff val="60000"/>
-                </a:schemeClr>
-              </a:solidFill>
-              <a:latin typeface="Arial Rounded MT Bold" panose="020F0704030504030204" pitchFamily="34" charset="77"/>
-            </a:endParaRPr>
-          </a:p>
-          <a:p>
-            <a:endParaRPr lang="en-US" sz="2000" dirty="0">
-              <a:solidFill>
-                <a:schemeClr val="accent6">
-                  <a:lumMod val="40000"/>
-                  <a:lumOff val="60000"/>
-                </a:schemeClr>
-              </a:solidFill>
-              <a:latin typeface="Arial Rounded MT Bold" panose="020F0704030504030204" pitchFamily="34" charset="77"/>
-            </a:endParaRPr>
-          </a:p>
-        </p:txBody>
-      </p:sp>
-      <p:sp>
-        <p:nvSpPr>
-          <p:cNvPr id="11" name="TextBox 10">
-            <a:extLst>
-              <a:ext uri="{FF2B5EF4-FFF2-40B4-BE49-F238E27FC236}">
-                <a16:creationId xmlns:a16="http://schemas.microsoft.com/office/drawing/2014/main" id="{106BDF14-836D-C035-989D-B9BB48199F86}"/>
-              </a:ext>
-            </a:extLst>
-          </p:cNvPr>
-          <p:cNvSpPr txBox="1"/>
-          <p:nvPr/>
-        </p:nvSpPr>
-        <p:spPr>
-          <a:xfrm>
-            <a:off x="7408385" y="858616"/>
-            <a:ext cx="3105402" cy="2000548"/>
-          </a:xfrm>
-          <a:prstGeom prst="rect">
-            <a:avLst/>
-          </a:prstGeom>
-          <a:noFill/>
-        </p:spPr>
-        <p:txBody>
-          <a:bodyPr wrap="none" rtlCol="0">
-            <a:spAutoFit/>
-          </a:bodyPr>
-          <a:lstStyle/>
-          <a:p>
-            <a:r>
-              <a:rPr lang="en-US" sz="2800" dirty="0">
-                <a:solidFill>
-                  <a:schemeClr val="accent6">
-                    <a:lumMod val="40000"/>
-                    <a:lumOff val="60000"/>
-                  </a:schemeClr>
-                </a:solidFill>
-                <a:latin typeface="Arial Rounded MT Bold" panose="020F0704030504030204" pitchFamily="34" charset="77"/>
-              </a:rPr>
-              <a:t>Tune in to Part 4:</a:t>
-            </a:r>
-          </a:p>
-          <a:p>
-            <a:pPr marL="457200" indent="-457200">
-              <a:buFontTx/>
-              <a:buChar char="-"/>
-            </a:pPr>
-            <a:r>
-              <a:rPr lang="en-US" sz="2800" dirty="0">
-                <a:solidFill>
-                  <a:schemeClr val="accent6">
-                    <a:lumMod val="40000"/>
-                    <a:lumOff val="60000"/>
-                  </a:schemeClr>
-                </a:solidFill>
-                <a:latin typeface="Arial Rounded MT Bold" panose="020F0704030504030204" pitchFamily="34" charset="77"/>
-              </a:rPr>
-              <a:t>Landscape</a:t>
-            </a:r>
-          </a:p>
-          <a:p>
-            <a:endParaRPr lang="en-US" sz="2800" dirty="0">
-              <a:solidFill>
-                <a:schemeClr val="accent6">
-                  <a:lumMod val="40000"/>
-                  <a:lumOff val="60000"/>
-                </a:schemeClr>
-              </a:solidFill>
-              <a:latin typeface="Arial Rounded MT Bold" panose="020F0704030504030204" pitchFamily="34" charset="77"/>
-            </a:endParaRPr>
-          </a:p>
-          <a:p>
-            <a:endParaRPr lang="en-US" sz="2000" dirty="0">
-              <a:solidFill>
-                <a:schemeClr val="accent6">
-                  <a:lumMod val="40000"/>
-                  <a:lumOff val="60000"/>
-                </a:schemeClr>
-              </a:solidFill>
-              <a:latin typeface="Arial Rounded MT Bold" panose="020F0704030504030204" pitchFamily="34" charset="77"/>
-            </a:endParaRPr>
-          </a:p>
-          <a:p>
-            <a:endParaRPr lang="en-US" sz="2000" dirty="0">
-              <a:solidFill>
-                <a:schemeClr val="accent6">
-                  <a:lumMod val="40000"/>
-                  <a:lumOff val="60000"/>
-                </a:schemeClr>
-              </a:solidFill>
-              <a:latin typeface="Arial Rounded MT Bold" panose="020F0704030504030204" pitchFamily="34" charset="77"/>
-            </a:endParaRPr>
-          </a:p>
-        </p:txBody>
-      </p:sp>
-    </p:spTree>
-    <p:extLst>
-      <p:ext uri="{BB962C8B-B14F-4D97-AF65-F5344CB8AC3E}">
-        <p14:creationId xmlns:p14="http://schemas.microsoft.com/office/powerpoint/2010/main" val="684992848"/>
-      </p:ext>
-    </p:extLst>
-  </p:cSld>
-  <p:clrMapOvr>
-    <a:masterClrMapping/>
-  </p:clrMapOvr>
-</p:sld>
-</file>
-
-<file path=ppt/slides/slide8.xml><?xml version="1.0" encoding="utf-8"?>
-<p:sld xmlns:a="http://schemas.openxmlformats.org/drawingml/2006/main" xmlns:r="http://schemas.openxmlformats.org/officeDocument/2006/relationships" xmlns:p="http://schemas.openxmlformats.org/presentationml/2006/main">
-  <p:cSld>
-    <p:bg>
-      <p:bgPr>
-        <a:solidFill>
-          <a:schemeClr val="bg1"/>
-        </a:solidFill>
-        <a:effectLst/>
-      </p:bgPr>
-    </p:bg>
-    <p:spTree>
-      <p:nvGrpSpPr>
-        <p:cNvPr id="1" name=""/>
-        <p:cNvGrpSpPr/>
-        <p:nvPr/>
-      </p:nvGrpSpPr>
-      <p:grpSpPr>
-        <a:xfrm>
-          <a:off x="0" y="0"/>
-          <a:ext cx="0" cy="0"/>
-          <a:chOff x="0" y="0"/>
-          <a:chExt cx="0" cy="0"/>
-        </a:xfrm>
-      </p:grpSpPr>
-      <p:sp useBgFill="1">
-        <p:nvSpPr>
           <p:cNvPr id="7" name="Rectangle 6">
             <a:extLst>
               <a:ext uri="{FF2B5EF4-FFF2-40B4-BE49-F238E27FC236}">
@@ -9516,7 +7818,7 @@
 </p:sld>
 </file>
 
-<file path=ppt/slides/slide9.xml><?xml version="1.0" encoding="utf-8"?>
+<file path=ppt/slides/slide7.xml><?xml version="1.0" encoding="utf-8"?>
 <p:sld xmlns:a="http://schemas.openxmlformats.org/drawingml/2006/main" xmlns:r="http://schemas.openxmlformats.org/officeDocument/2006/relationships" xmlns:p="http://schemas.openxmlformats.org/presentationml/2006/main">
   <p:cSld>
     <p:bg>
@@ -9668,6 +7970,36 @@
           </a:p>
         </p:txBody>
       </p:sp>
+      <p:pic>
+        <p:nvPicPr>
+          <p:cNvPr id="5" name="Picture 4" descr="A picture containing building, outdoor, person, colorful&#10;&#10;Description automatically generated">
+            <a:extLst>
+              <a:ext uri="{FF2B5EF4-FFF2-40B4-BE49-F238E27FC236}">
+                <a16:creationId xmlns:a16="http://schemas.microsoft.com/office/drawing/2014/main" id="{815C6A23-38C9-A6A3-CA15-46B7177B2C7A}"/>
+              </a:ext>
+            </a:extLst>
+          </p:cNvPr>
+          <p:cNvPicPr>
+            <a:picLocks noChangeAspect="1"/>
+          </p:cNvPicPr>
+          <p:nvPr/>
+        </p:nvPicPr>
+        <p:blipFill>
+          <a:blip r:embed="rId3"/>
+          <a:stretch>
+            <a:fillRect/>
+          </a:stretch>
+        </p:blipFill>
+        <p:spPr>
+          <a:xfrm>
+            <a:off x="1091374" y="3296539"/>
+            <a:ext cx="2949404" cy="2949404"/>
+          </a:xfrm>
+          <a:prstGeom prst="rect">
+            <a:avLst/>
+          </a:prstGeom>
+        </p:spPr>
+      </p:pic>
       <p:sp>
         <p:nvSpPr>
           <p:cNvPr id="11" name="Rectangle 10">
@@ -9838,7 +8170,7 @@
             <a:r>
               <a:rPr lang="en-US" sz="3300" b="1" kern="1200" dirty="0">
                 <a:solidFill>
-                  <a:schemeClr val="bg1"/>
+                  <a:srgbClr val="7030A0"/>
                 </a:solidFill>
                 <a:effectLst/>
                 <a:latin typeface="Arial Rounded MT Bold" panose="020F0704030504030204" pitchFamily="34" charset="77"/>
@@ -10008,101 +8340,20 @@
       </p:sp>
       <p:sp>
         <p:nvSpPr>
-          <p:cNvPr id="4" name="Title 1">
-            <a:extLst>
-              <a:ext uri="{FF2B5EF4-FFF2-40B4-BE49-F238E27FC236}">
-                <a16:creationId xmlns:a16="http://schemas.microsoft.com/office/drawing/2014/main" id="{12889E2B-9702-D3AF-0D29-8273B89DEEDB}"/>
-              </a:ext>
-            </a:extLst>
-          </p:cNvPr>
-          <p:cNvSpPr txBox="1">
-            <a:spLocks/>
-          </p:cNvSpPr>
+          <p:cNvPr id="3" name="TextBox 2">
+            <a:extLst>
+              <a:ext uri="{FF2B5EF4-FFF2-40B4-BE49-F238E27FC236}">
+                <a16:creationId xmlns:a16="http://schemas.microsoft.com/office/drawing/2014/main" id="{5F1A79EC-4E43-C1E8-2501-6BB0BBB31B6D}"/>
+              </a:ext>
+            </a:extLst>
+          </p:cNvPr>
+          <p:cNvSpPr txBox="1"/>
           <p:nvPr/>
         </p:nvSpPr>
         <p:spPr>
           <a:xfrm>
-            <a:off x="3011516" y="4376306"/>
-            <a:ext cx="6168967" cy="1337716"/>
-          </a:xfrm>
-          <a:prstGeom prst="rect">
-            <a:avLst/>
-          </a:prstGeom>
-        </p:spPr>
-        <p:txBody>
-          <a:bodyPr vert="horz" lIns="91440" tIns="45720" rIns="91440" bIns="45720" rtlCol="0" anchor="b">
-            <a:normAutofit/>
-          </a:bodyPr>
-          <a:lstStyle>
-            <a:lvl1pPr algn="l" defTabSz="914400" rtl="0" eaLnBrk="1" latinLnBrk="0" hangingPunct="1">
-              <a:lnSpc>
-                <a:spcPct val="90000"/>
-              </a:lnSpc>
-              <a:spcBef>
-                <a:spcPct val="0"/>
-              </a:spcBef>
-              <a:buNone/>
-              <a:defRPr sz="4400" kern="1200">
-                <a:solidFill>
-                  <a:schemeClr val="tx1"/>
-                </a:solidFill>
-                <a:latin typeface="+mj-lt"/>
-                <a:ea typeface="+mj-ea"/>
-                <a:cs typeface="+mj-cs"/>
-              </a:defRPr>
-            </a:lvl1pPr>
-          </a:lstStyle>
-          <a:p>
-            <a:pPr algn="ctr"/>
-            <a:r>
-              <a:rPr lang="en-US" sz="4000" dirty="0" err="1">
-                <a:solidFill>
-                  <a:schemeClr val="bg1"/>
-                </a:solidFill>
-                <a:latin typeface="Arial Rounded MT Bold" panose="020F0704030504030204" pitchFamily="34" charset="77"/>
-              </a:rPr>
-              <a:t>transfer</a:t>
-            </a:r>
-            <a:r>
-              <a:rPr lang="en-US" sz="3800" b="1" dirty="0" err="1">
-                <a:solidFill>
-                  <a:srgbClr val="7030A0"/>
-                </a:solidFill>
-                <a:latin typeface="Arial Rounded MT Bold" panose="020F0704030504030204" pitchFamily="34" charset="77"/>
-              </a:rPr>
-              <a:t>learning</a:t>
-            </a:r>
-            <a:br>
-              <a:rPr lang="en-US" sz="3300" dirty="0">
-                <a:solidFill>
-                  <a:srgbClr val="7030A0"/>
-                </a:solidFill>
-              </a:rPr>
-            </a:br>
-            <a:endParaRPr lang="en-US" sz="3300" dirty="0">
-              <a:solidFill>
-                <a:srgbClr val="7030A0"/>
-              </a:solidFill>
-            </a:endParaRPr>
-          </a:p>
-        </p:txBody>
-      </p:sp>
-      <p:sp>
-        <p:nvSpPr>
-          <p:cNvPr id="3" name="TextBox 2">
-            <a:extLst>
-              <a:ext uri="{FF2B5EF4-FFF2-40B4-BE49-F238E27FC236}">
-                <a16:creationId xmlns:a16="http://schemas.microsoft.com/office/drawing/2014/main" id="{B36972D8-E147-562D-CC5F-9EACA6A66295}"/>
-              </a:ext>
-            </a:extLst>
-          </p:cNvPr>
-          <p:cNvSpPr txBox="1"/>
-          <p:nvPr/>
-        </p:nvSpPr>
-        <p:spPr>
-          <a:xfrm>
-            <a:off x="3315031" y="2391837"/>
-            <a:ext cx="1965666" cy="646331"/>
+            <a:off x="3353149" y="3990013"/>
+            <a:ext cx="5523820" cy="830997"/>
           </a:xfrm>
           <a:prstGeom prst="rect">
             <a:avLst/>
@@ -10116,13 +8367,68 @@
           <a:lstStyle/>
           <a:p>
             <a:r>
-              <a:rPr lang="en-US" sz="3600" b="1" dirty="0">
+              <a:rPr lang="en-US" sz="4800" dirty="0">
                 <a:solidFill>
-                  <a:srgbClr val="7030A0"/>
+                  <a:srgbClr val="4472C4"/>
                 </a:solidFill>
                 <a:latin typeface="Arial Rounded MT Bold" panose="020F0704030504030204" pitchFamily="34" charset="77"/>
               </a:rPr>
-              <a:t>transfer</a:t>
+              <a:t>Transfer Learning</a:t>
+            </a:r>
+          </a:p>
+        </p:txBody>
+      </p:sp>
+      <p:sp>
+        <p:nvSpPr>
+          <p:cNvPr id="8" name="TextBox 7">
+            <a:extLst>
+              <a:ext uri="{FF2B5EF4-FFF2-40B4-BE49-F238E27FC236}">
+                <a16:creationId xmlns:a16="http://schemas.microsoft.com/office/drawing/2014/main" id="{9FDDE68B-F066-5AA7-1A5B-52634F9277A5}"/>
+              </a:ext>
+            </a:extLst>
+          </p:cNvPr>
+          <p:cNvSpPr txBox="1"/>
+          <p:nvPr/>
+        </p:nvSpPr>
+        <p:spPr>
+          <a:xfrm>
+            <a:off x="0" y="6321870"/>
+            <a:ext cx="4809137" cy="461665"/>
+          </a:xfrm>
+          <a:prstGeom prst="rect">
+            <a:avLst/>
+          </a:prstGeom>
+          <a:noFill/>
+        </p:spPr>
+        <p:txBody>
+          <a:bodyPr wrap="none" rtlCol="0">
+            <a:spAutoFit/>
+          </a:bodyPr>
+          <a:lstStyle/>
+          <a:p>
+            <a:r>
+              <a:rPr lang="en-US" sz="1200" dirty="0">
+                <a:solidFill>
+                  <a:schemeClr val="accent2">
+                    <a:lumMod val="40000"/>
+                    <a:lumOff val="60000"/>
+                  </a:schemeClr>
+                </a:solidFill>
+              </a:rPr>
+              <a:t>Image generated by stable-diffusion. </a:t>
+            </a:r>
+          </a:p>
+          <a:p>
+            <a:r>
+              <a:rPr lang="en-US" sz="1200" dirty="0">
+                <a:solidFill>
+                  <a:schemeClr val="accent2">
+                    <a:lumMod val="40000"/>
+                    <a:lumOff val="60000"/>
+                  </a:schemeClr>
+                </a:solidFill>
+              </a:rPr>
+              <a:t>Prompt: sesame street character amazed by understanding a new concept</a:t>
             </a:r>
           </a:p>
         </p:txBody>
@@ -10130,131 +8436,344 @@
     </p:spTree>
     <p:extLst>
       <p:ext uri="{BB962C8B-B14F-4D97-AF65-F5344CB8AC3E}">
-        <p14:creationId xmlns:p14="http://schemas.microsoft.com/office/powerpoint/2010/main" val="3168143456"/>
+        <p14:creationId xmlns:p14="http://schemas.microsoft.com/office/powerpoint/2010/main" val="3828702689"/>
       </p:ext>
     </p:extLst>
   </p:cSld>
   <p:clrMapOvr>
     <a:masterClrMapping/>
   </p:clrMapOvr>
-  <p:timing>
-    <p:tnLst>
-      <p:par>
-        <p:cTn id="1" dur="indefinite" restart="never" nodeType="tmRoot">
-          <p:childTnLst>
-            <p:seq concurrent="1" nextAc="seek">
-              <p:cTn id="2" dur="indefinite" nodeType="mainSeq">
-                <p:childTnLst>
-                  <p:par>
-                    <p:cTn id="3" fill="hold">
-                      <p:stCondLst>
-                        <p:cond delay="indefinite"/>
-                      </p:stCondLst>
-                      <p:childTnLst>
-                        <p:par>
-                          <p:cTn id="4" fill="hold">
-                            <p:stCondLst>
-                              <p:cond delay="0"/>
-                            </p:stCondLst>
-                            <p:childTnLst>
-                              <p:par>
-                                <p:cTn id="5" presetID="0" presetClass="path" presetSubtype="0" accel="50000" decel="50000" fill="hold" grpId="0" nodeType="clickEffect">
-                                  <p:stCondLst>
-                                    <p:cond delay="0"/>
-                                  </p:stCondLst>
-                                  <p:childTnLst>
-                                    <p:animMotion origin="layout" path="M -3.95833E-6 -3.33333E-6 L 0.06446 0.31945 " pathEditMode="relative" rAng="0" ptsTypes="AA">
-                                      <p:cBhvr>
-                                        <p:cTn id="6" dur="2000" fill="hold"/>
-                                        <p:tgtEl>
-                                          <p:spTgt spid="3"/>
-                                        </p:tgtEl>
-                                        <p:attrNameLst>
-                                          <p:attrName>ppt_x</p:attrName>
-                                          <p:attrName>ppt_y</p:attrName>
-                                        </p:attrNameLst>
-                                      </p:cBhvr>
-                                      <p:rCtr x="3216" y="15972"/>
-                                    </p:animMotion>
-                                  </p:childTnLst>
-                                </p:cTn>
-                              </p:par>
-                            </p:childTnLst>
-                          </p:cTn>
-                        </p:par>
-                        <p:par>
-                          <p:cTn id="7" fill="hold">
-                            <p:stCondLst>
-                              <p:cond delay="2000"/>
-                            </p:stCondLst>
-                            <p:childTnLst>
-                              <p:par>
-                                <p:cTn id="8" presetID="9" presetClass="entr" presetSubtype="0" fill="hold" grpId="0" nodeType="afterEffect">
-                                  <p:stCondLst>
-                                    <p:cond delay="0"/>
-                                  </p:stCondLst>
-                                  <p:childTnLst>
-                                    <p:set>
-                                      <p:cBhvr>
-                                        <p:cTn id="9" dur="1" fill="hold">
-                                          <p:stCondLst>
-                                            <p:cond delay="0"/>
-                                          </p:stCondLst>
-                                        </p:cTn>
-                                        <p:tgtEl>
-                                          <p:spTgt spid="4"/>
-                                        </p:tgtEl>
-                                        <p:attrNameLst>
-                                          <p:attrName>style.visibility</p:attrName>
-                                        </p:attrNameLst>
-                                      </p:cBhvr>
-                                      <p:to>
-                                        <p:strVal val="visible"/>
-                                      </p:to>
-                                    </p:set>
-                                    <p:animEffect transition="in" filter="dissolve">
-                                      <p:cBhvr>
-                                        <p:cTn id="10" dur="500"/>
-                                        <p:tgtEl>
-                                          <p:spTgt spid="4"/>
-                                        </p:tgtEl>
-                                      </p:cBhvr>
-                                    </p:animEffect>
-                                  </p:childTnLst>
-                                </p:cTn>
-                              </p:par>
-                            </p:childTnLst>
-                          </p:cTn>
-                        </p:par>
-                      </p:childTnLst>
-                    </p:cTn>
-                  </p:par>
-                </p:childTnLst>
-              </p:cTn>
-              <p:prevCondLst>
-                <p:cond evt="onPrev" delay="0">
-                  <p:tgtEl>
-                    <p:sldTgt/>
-                  </p:tgtEl>
-                </p:cond>
-              </p:prevCondLst>
-              <p:nextCondLst>
-                <p:cond evt="onNext" delay="0">
-                  <p:tgtEl>
-                    <p:sldTgt/>
-                  </p:tgtEl>
-                </p:cond>
-              </p:nextCondLst>
-            </p:seq>
-          </p:childTnLst>
-        </p:cTn>
-      </p:par>
-    </p:tnLst>
-    <p:bldLst>
-      <p:bldP spid="4" grpId="0"/>
-      <p:bldP spid="3" grpId="0"/>
-    </p:bldLst>
-  </p:timing>
+</p:sld>
+</file>
+
+<file path=ppt/slides/slide8.xml><?xml version="1.0" encoding="utf-8"?>
+<p:sld xmlns:a="http://schemas.openxmlformats.org/drawingml/2006/main" xmlns:r="http://schemas.openxmlformats.org/officeDocument/2006/relationships" xmlns:p="http://schemas.openxmlformats.org/presentationml/2006/main">
+  <p:cSld>
+    <p:spTree>
+      <p:nvGrpSpPr>
+        <p:cNvPr id="1" name=""/>
+        <p:cNvGrpSpPr/>
+        <p:nvPr/>
+      </p:nvGrpSpPr>
+      <p:grpSpPr>
+        <a:xfrm>
+          <a:off x="0" y="0"/>
+          <a:ext cx="0" cy="0"/>
+          <a:chOff x="0" y="0"/>
+          <a:chExt cx="0" cy="0"/>
+        </a:xfrm>
+      </p:grpSpPr>
+      <p:sp>
+        <p:nvSpPr>
+          <p:cNvPr id="2" name="Title 1">
+            <a:extLst>
+              <a:ext uri="{FF2B5EF4-FFF2-40B4-BE49-F238E27FC236}">
+                <a16:creationId xmlns:a16="http://schemas.microsoft.com/office/drawing/2014/main" id="{6C30AB85-D04F-4EE5-8BAF-0F9816B94B29}"/>
+              </a:ext>
+            </a:extLst>
+          </p:cNvPr>
+          <p:cNvSpPr>
+            <a:spLocks noGrp="1"/>
+          </p:cNvSpPr>
+          <p:nvPr>
+            <p:ph type="title"/>
+          </p:nvPr>
+        </p:nvSpPr>
+        <p:spPr/>
+        <p:txBody>
+          <a:bodyPr/>
+          <a:lstStyle/>
+          <a:p>
+            <a:r>
+              <a:rPr lang="en-US" dirty="0">
+                <a:latin typeface="Arial Rounded MT Bold" panose="020F0704030504030204" pitchFamily="34" charset="77"/>
+              </a:rPr>
+              <a:t>Transfer Learning</a:t>
+            </a:r>
+          </a:p>
+        </p:txBody>
+      </p:sp>
+      <p:sp>
+        <p:nvSpPr>
+          <p:cNvPr id="3" name="Content Placeholder 2">
+            <a:extLst>
+              <a:ext uri="{FF2B5EF4-FFF2-40B4-BE49-F238E27FC236}">
+                <a16:creationId xmlns:a16="http://schemas.microsoft.com/office/drawing/2014/main" id="{9A39B4AB-ADF5-A47E-1380-B2992815D3DB}"/>
+              </a:ext>
+            </a:extLst>
+          </p:cNvPr>
+          <p:cNvSpPr>
+            <a:spLocks noGrp="1"/>
+          </p:cNvSpPr>
+          <p:nvPr>
+            <p:ph idx="1"/>
+          </p:nvPr>
+        </p:nvSpPr>
+        <p:spPr/>
+        <p:txBody>
+          <a:bodyPr>
+            <a:normAutofit/>
+          </a:bodyPr>
+          <a:lstStyle/>
+          <a:p>
+            <a:pPr marL="0" indent="0" algn="l">
+              <a:buNone/>
+            </a:pPr>
+            <a:r>
+              <a:rPr lang="en-US" sz="1400" b="0" i="0" dirty="0">
+                <a:solidFill>
+                  <a:srgbClr val="202122"/>
+                </a:solidFill>
+                <a:effectLst/>
+                <a:latin typeface="Arial" panose="020B0604020202020204" pitchFamily="34" charset="0"/>
+              </a:rPr>
+              <a:t>From Wikipedia</a:t>
+            </a:r>
+          </a:p>
+          <a:p>
+            <a:pPr marL="0" indent="0" algn="l">
+              <a:buNone/>
+            </a:pPr>
+            <a:r>
+              <a:rPr lang="en-US" b="1" i="0" dirty="0">
+                <a:solidFill>
+                  <a:srgbClr val="202122"/>
+                </a:solidFill>
+                <a:effectLst/>
+                <a:latin typeface="Arial" panose="020B0604020202020204" pitchFamily="34" charset="0"/>
+              </a:rPr>
+              <a:t>Transfer learning</a:t>
+            </a:r>
+            <a:r>
+              <a:rPr lang="en-US" b="0" i="0" dirty="0">
+                <a:solidFill>
+                  <a:srgbClr val="202122"/>
+                </a:solidFill>
+                <a:effectLst/>
+                <a:latin typeface="Arial" panose="020B0604020202020204" pitchFamily="34" charset="0"/>
+              </a:rPr>
+              <a:t> (</a:t>
+            </a:r>
+            <a:r>
+              <a:rPr lang="en-US" b="1" i="0" dirty="0">
+                <a:solidFill>
+                  <a:srgbClr val="202122"/>
+                </a:solidFill>
+                <a:effectLst/>
+                <a:latin typeface="Arial" panose="020B0604020202020204" pitchFamily="34" charset="0"/>
+              </a:rPr>
+              <a:t>TL</a:t>
+            </a:r>
+            <a:r>
+              <a:rPr lang="en-US" b="0" i="0" dirty="0">
+                <a:solidFill>
+                  <a:srgbClr val="202122"/>
+                </a:solidFill>
+                <a:effectLst/>
+                <a:latin typeface="Arial" panose="020B0604020202020204" pitchFamily="34" charset="0"/>
+              </a:rPr>
+              <a:t>) is a research problem in </a:t>
+            </a:r>
+            <a:r>
+              <a:rPr lang="en-US" b="0" i="0" u="none" strike="noStrike" dirty="0">
+                <a:solidFill>
+                  <a:srgbClr val="3366CC"/>
+                </a:solidFill>
+                <a:effectLst/>
+                <a:latin typeface="Arial" panose="020B0604020202020204" pitchFamily="34" charset="0"/>
+                <a:hlinkClick r:id="rId2" tooltip="Machine learning"/>
+              </a:rPr>
+              <a:t>machine learning</a:t>
+            </a:r>
+            <a:r>
+              <a:rPr lang="en-US" b="0" i="0" dirty="0">
+                <a:solidFill>
+                  <a:srgbClr val="202122"/>
+                </a:solidFill>
+                <a:effectLst/>
+                <a:latin typeface="Arial" panose="020B0604020202020204" pitchFamily="34" charset="0"/>
+              </a:rPr>
+              <a:t> (ML) that focuses on applying knowledge gained while solving one task to a related task.</a:t>
+            </a:r>
+            <a:r>
+              <a:rPr lang="en-US" b="0" i="0" u="none" strike="noStrike" baseline="30000" dirty="0">
+                <a:solidFill>
+                  <a:srgbClr val="3366CC"/>
+                </a:solidFill>
+                <a:effectLst/>
+                <a:latin typeface="Arial" panose="020B0604020202020204" pitchFamily="34" charset="0"/>
+                <a:hlinkClick r:id="rId3"/>
+              </a:rPr>
+              <a:t>[1]</a:t>
+            </a:r>
+            <a:r>
+              <a:rPr lang="en-US" b="0" i="0" dirty="0">
+                <a:solidFill>
+                  <a:srgbClr val="202122"/>
+                </a:solidFill>
+                <a:effectLst/>
+                <a:latin typeface="Arial" panose="020B0604020202020204" pitchFamily="34" charset="0"/>
+              </a:rPr>
+              <a:t> For example, knowledge gained while learning to </a:t>
+            </a:r>
+            <a:r>
+              <a:rPr lang="en-US" b="0" i="0" u="none" strike="noStrike" dirty="0">
+                <a:solidFill>
+                  <a:srgbClr val="3366CC"/>
+                </a:solidFill>
+                <a:effectLst/>
+                <a:latin typeface="Arial" panose="020B0604020202020204" pitchFamily="34" charset="0"/>
+                <a:hlinkClick r:id="rId4" tooltip="Computer vision"/>
+              </a:rPr>
+              <a:t>recognize</a:t>
+            </a:r>
+            <a:r>
+              <a:rPr lang="en-US" b="0" i="0" dirty="0">
+                <a:solidFill>
+                  <a:srgbClr val="202122"/>
+                </a:solidFill>
+                <a:effectLst/>
+                <a:latin typeface="Arial" panose="020B0604020202020204" pitchFamily="34" charset="0"/>
+              </a:rPr>
+              <a:t> cars could be applied when trying to recognize trucks. This topic is related to the psychological literature on </a:t>
+            </a:r>
+            <a:r>
+              <a:rPr lang="en-US" b="0" i="0" u="none" strike="noStrike" dirty="0">
+                <a:solidFill>
+                  <a:srgbClr val="3366CC"/>
+                </a:solidFill>
+                <a:effectLst/>
+                <a:latin typeface="Arial" panose="020B0604020202020204" pitchFamily="34" charset="0"/>
+                <a:hlinkClick r:id="rId5" tooltip="Transfer of learning"/>
+              </a:rPr>
+              <a:t>transfer of learning</a:t>
+            </a:r>
+            <a:r>
+              <a:rPr lang="en-US" b="0" i="0" dirty="0">
+                <a:solidFill>
+                  <a:srgbClr val="202122"/>
+                </a:solidFill>
+                <a:effectLst/>
+                <a:latin typeface="Arial" panose="020B0604020202020204" pitchFamily="34" charset="0"/>
+              </a:rPr>
+              <a:t>, although practical ties between the two fields are limited. Reusing/transferring information from previously learned tasks to new tasks has the potential to significantly improve learning efficiency.</a:t>
+            </a:r>
+            <a:r>
+              <a:rPr lang="en-US" b="0" i="0" u="none" strike="noStrike" baseline="30000" dirty="0">
+                <a:solidFill>
+                  <a:srgbClr val="3366CC"/>
+                </a:solidFill>
+                <a:effectLst/>
+                <a:latin typeface="Arial" panose="020B0604020202020204" pitchFamily="34" charset="0"/>
+                <a:hlinkClick r:id="rId6"/>
+              </a:rPr>
+              <a:t>[2]</a:t>
+            </a:r>
+            <a:endParaRPr lang="en-US" b="0" i="0" dirty="0">
+              <a:solidFill>
+                <a:srgbClr val="202122"/>
+              </a:solidFill>
+              <a:effectLst/>
+              <a:latin typeface="Arial" panose="020B0604020202020204" pitchFamily="34" charset="0"/>
+            </a:endParaRPr>
+          </a:p>
+        </p:txBody>
+      </p:sp>
+    </p:spTree>
+    <p:extLst>
+      <p:ext uri="{BB962C8B-B14F-4D97-AF65-F5344CB8AC3E}">
+        <p14:creationId xmlns:p14="http://schemas.microsoft.com/office/powerpoint/2010/main" val="3958029402"/>
+      </p:ext>
+    </p:extLst>
+  </p:cSld>
+  <p:clrMapOvr>
+    <a:masterClrMapping/>
+  </p:clrMapOvr>
+</p:sld>
+</file>
+
+<file path=ppt/slides/slide9.xml><?xml version="1.0" encoding="utf-8"?>
+<p:sld xmlns:a="http://schemas.openxmlformats.org/drawingml/2006/main" xmlns:r="http://schemas.openxmlformats.org/officeDocument/2006/relationships" xmlns:p="http://schemas.openxmlformats.org/presentationml/2006/main">
+  <p:cSld>
+    <p:spTree>
+      <p:nvGrpSpPr>
+        <p:cNvPr id="1" name=""/>
+        <p:cNvGrpSpPr/>
+        <p:nvPr/>
+      </p:nvGrpSpPr>
+      <p:grpSpPr>
+        <a:xfrm>
+          <a:off x="0" y="0"/>
+          <a:ext cx="0" cy="0"/>
+          <a:chOff x="0" y="0"/>
+          <a:chExt cx="0" cy="0"/>
+        </a:xfrm>
+      </p:grpSpPr>
+      <p:sp>
+        <p:nvSpPr>
+          <p:cNvPr id="2" name="Title 1">
+            <a:extLst>
+              <a:ext uri="{FF2B5EF4-FFF2-40B4-BE49-F238E27FC236}">
+                <a16:creationId xmlns:a16="http://schemas.microsoft.com/office/drawing/2014/main" id="{C7F65800-AF6C-3E2B-9F3C-BB7A2DD69597}"/>
+              </a:ext>
+            </a:extLst>
+          </p:cNvPr>
+          <p:cNvSpPr>
+            <a:spLocks noGrp="1"/>
+          </p:cNvSpPr>
+          <p:nvPr>
+            <p:ph type="title"/>
+          </p:nvPr>
+        </p:nvSpPr>
+        <p:spPr/>
+        <p:txBody>
+          <a:bodyPr/>
+          <a:lstStyle/>
+          <a:p>
+            <a:r>
+              <a:rPr lang="en-US" dirty="0">
+                <a:latin typeface="Arial Rounded MT Bold" panose="020F0704030504030204" pitchFamily="34" charset="77"/>
+              </a:rPr>
+              <a:t>Fine Tuning</a:t>
+            </a:r>
+          </a:p>
+        </p:txBody>
+      </p:sp>
+      <p:sp>
+        <p:nvSpPr>
+          <p:cNvPr id="3" name="Content Placeholder 2">
+            <a:extLst>
+              <a:ext uri="{FF2B5EF4-FFF2-40B4-BE49-F238E27FC236}">
+                <a16:creationId xmlns:a16="http://schemas.microsoft.com/office/drawing/2014/main" id="{D9CE928D-DF8F-B165-1FF9-B25EC18F2FBC}"/>
+              </a:ext>
+            </a:extLst>
+          </p:cNvPr>
+          <p:cNvSpPr>
+            <a:spLocks noGrp="1"/>
+          </p:cNvSpPr>
+          <p:nvPr>
+            <p:ph idx="1"/>
+          </p:nvPr>
+        </p:nvSpPr>
+        <p:spPr/>
+        <p:txBody>
+          <a:bodyPr/>
+          <a:lstStyle/>
+          <a:p>
+            <a:endParaRPr lang="en-US"/>
+          </a:p>
+        </p:txBody>
+      </p:sp>
+    </p:spTree>
+    <p:extLst>
+      <p:ext uri="{BB962C8B-B14F-4D97-AF65-F5344CB8AC3E}">
+        <p14:creationId xmlns:p14="http://schemas.microsoft.com/office/powerpoint/2010/main" val="2859973748"/>
+      </p:ext>
+    </p:extLst>
+  </p:cSld>
+  <p:clrMapOvr>
+    <a:masterClrMapping/>
+  </p:clrMapOvr>
 </p:sld>
 </file>
 

</xml_diff>